<commit_message>
nueva version memoria avances en el estado del arte, falta conclusiones y metrias de rendimiento
</commit_message>
<xml_diff>
--- a/memoria/images/Presentación1.pptx
+++ b/memoria/images/Presentación1.pptx
@@ -8,6 +8,7 @@
     <p:sldId id="256" r:id="rId2"/>
     <p:sldId id="257" r:id="rId3"/>
     <p:sldId id="258" r:id="rId4"/>
+    <p:sldId id="259" r:id="rId5"/>
   </p:sldIdLst>
   <p:sldSz cx="12192000" cy="6858000"/>
   <p:notesSz cx="6858000" cy="9144000"/>
@@ -106,6 +107,11 @@
       </a:defRPr>
     </a:lvl9pPr>
   </p:defaultTextStyle>
+  <p:extLst>
+    <p:ext uri="{EFAFB233-063F-42B5-8137-9DF3F51BA10A}">
+      <p15:sldGuideLst xmlns:p15="http://schemas.microsoft.com/office/powerpoint/2012/main"/>
+    </p:ext>
+  </p:extLst>
 </p:presentation>
 </file>
 
@@ -240,7 +246,7 @@
           <a:p>
             <a:fld id="{9C28449B-7E7F-4B22-B31C-7455ACE0523B}" type="datetimeFigureOut">
               <a:rPr lang="es-ES" smtClean="0"/>
-              <a:t>16/10/2017</a:t>
+              <a:t>24/10/2017</a:t>
             </a:fld>
             <a:endParaRPr lang="es-ES"/>
           </a:p>
@@ -410,7 +416,7 @@
           <a:p>
             <a:fld id="{9C28449B-7E7F-4B22-B31C-7455ACE0523B}" type="datetimeFigureOut">
               <a:rPr lang="es-ES" smtClean="0"/>
-              <a:t>16/10/2017</a:t>
+              <a:t>24/10/2017</a:t>
             </a:fld>
             <a:endParaRPr lang="es-ES"/>
           </a:p>
@@ -590,7 +596,7 @@
           <a:p>
             <a:fld id="{9C28449B-7E7F-4B22-B31C-7455ACE0523B}" type="datetimeFigureOut">
               <a:rPr lang="es-ES" smtClean="0"/>
-              <a:t>16/10/2017</a:t>
+              <a:t>24/10/2017</a:t>
             </a:fld>
             <a:endParaRPr lang="es-ES"/>
           </a:p>
@@ -760,7 +766,7 @@
           <a:p>
             <a:fld id="{9C28449B-7E7F-4B22-B31C-7455ACE0523B}" type="datetimeFigureOut">
               <a:rPr lang="es-ES" smtClean="0"/>
-              <a:t>16/10/2017</a:t>
+              <a:t>24/10/2017</a:t>
             </a:fld>
             <a:endParaRPr lang="es-ES"/>
           </a:p>
@@ -1006,7 +1012,7 @@
           <a:p>
             <a:fld id="{9C28449B-7E7F-4B22-B31C-7455ACE0523B}" type="datetimeFigureOut">
               <a:rPr lang="es-ES" smtClean="0"/>
-              <a:t>16/10/2017</a:t>
+              <a:t>24/10/2017</a:t>
             </a:fld>
             <a:endParaRPr lang="es-ES"/>
           </a:p>
@@ -1238,7 +1244,7 @@
           <a:p>
             <a:fld id="{9C28449B-7E7F-4B22-B31C-7455ACE0523B}" type="datetimeFigureOut">
               <a:rPr lang="es-ES" smtClean="0"/>
-              <a:t>16/10/2017</a:t>
+              <a:t>24/10/2017</a:t>
             </a:fld>
             <a:endParaRPr lang="es-ES"/>
           </a:p>
@@ -1605,7 +1611,7 @@
           <a:p>
             <a:fld id="{9C28449B-7E7F-4B22-B31C-7455ACE0523B}" type="datetimeFigureOut">
               <a:rPr lang="es-ES" smtClean="0"/>
-              <a:t>16/10/2017</a:t>
+              <a:t>24/10/2017</a:t>
             </a:fld>
             <a:endParaRPr lang="es-ES"/>
           </a:p>
@@ -1723,7 +1729,7 @@
           <a:p>
             <a:fld id="{9C28449B-7E7F-4B22-B31C-7455ACE0523B}" type="datetimeFigureOut">
               <a:rPr lang="es-ES" smtClean="0"/>
-              <a:t>16/10/2017</a:t>
+              <a:t>24/10/2017</a:t>
             </a:fld>
             <a:endParaRPr lang="es-ES"/>
           </a:p>
@@ -1818,7 +1824,7 @@
           <a:p>
             <a:fld id="{9C28449B-7E7F-4B22-B31C-7455ACE0523B}" type="datetimeFigureOut">
               <a:rPr lang="es-ES" smtClean="0"/>
-              <a:t>16/10/2017</a:t>
+              <a:t>24/10/2017</a:t>
             </a:fld>
             <a:endParaRPr lang="es-ES"/>
           </a:p>
@@ -2095,7 +2101,7 @@
           <a:p>
             <a:fld id="{9C28449B-7E7F-4B22-B31C-7455ACE0523B}" type="datetimeFigureOut">
               <a:rPr lang="es-ES" smtClean="0"/>
-              <a:t>16/10/2017</a:t>
+              <a:t>24/10/2017</a:t>
             </a:fld>
             <a:endParaRPr lang="es-ES"/>
           </a:p>
@@ -2348,7 +2354,7 @@
           <a:p>
             <a:fld id="{9C28449B-7E7F-4B22-B31C-7455ACE0523B}" type="datetimeFigureOut">
               <a:rPr lang="es-ES" smtClean="0"/>
-              <a:t>16/10/2017</a:t>
+              <a:t>24/10/2017</a:t>
             </a:fld>
             <a:endParaRPr lang="es-ES"/>
           </a:p>
@@ -2561,7 +2567,7 @@
           <a:p>
             <a:fld id="{9C28449B-7E7F-4B22-B31C-7455ACE0523B}" type="datetimeFigureOut">
               <a:rPr lang="es-ES" smtClean="0"/>
-              <a:t>16/10/2017</a:t>
+              <a:t>24/10/2017</a:t>
             </a:fld>
             <a:endParaRPr lang="es-ES"/>
           </a:p>
@@ -3267,18 +3273,6 @@
                       </a:rPr>
                       <a:t>ORCHESTRATION</a:t>
                     </a:r>
-                    <a:endParaRPr kumimoji="0" lang="es-ES" sz="1400" b="1" i="0" u="none" strike="noStrike" cap="none" normalizeH="0" baseline="0" dirty="0" smtClean="0">
-                      <a:ln>
-                        <a:noFill/>
-                      </a:ln>
-                      <a:solidFill>
-                        <a:schemeClr val="tx1">
-                          <a:lumMod val="75000"/>
-                          <a:lumOff val="25000"/>
-                        </a:schemeClr>
-                      </a:solidFill>
-                      <a:effectLst/>
-                    </a:endParaRPr>
                   </a:p>
                   <a:p>
                     <a:pPr marL="0" marR="0" indent="0" algn="ctr" defTabSz="914400" rtl="0" eaLnBrk="1" fontAlgn="base" latinLnBrk="0" hangingPunct="1">
@@ -4600,15 +4594,6 @@
                       </a:rPr>
                       <a:t>ORCHESTRATION</a:t>
                     </a:r>
-                    <a:endParaRPr kumimoji="0" lang="es-ES" sz="1600" b="1" i="0" u="none" strike="noStrike" cap="none" normalizeH="0" baseline="0" dirty="0" smtClean="0">
-                      <a:ln>
-                        <a:noFill/>
-                      </a:ln>
-                      <a:solidFill>
-                        <a:srgbClr val="00B050"/>
-                      </a:solidFill>
-                      <a:effectLst/>
-                    </a:endParaRPr>
                   </a:p>
                   <a:p>
                     <a:pPr marL="0" marR="0" indent="0" algn="ctr" defTabSz="914400" rtl="0" eaLnBrk="1" fontAlgn="base" latinLnBrk="0" hangingPunct="1">
@@ -5711,7 +5696,7 @@
             <p:nvPr/>
           </p:nvPicPr>
           <p:blipFill>
-            <a:blip r:embed="rId11">
+            <a:blip r:embed="rId11" cstate="print">
               <a:extLst>
                 <a:ext uri="{28A0092B-C50C-407E-A947-70E740481C1C}">
                   <a14:useLocalDpi xmlns:a14="http://schemas.microsoft.com/office/drawing/2010/main" val="0"/>
@@ -5737,6 +5722,328 @@
     <p:extLst>
       <p:ext uri="{BB962C8B-B14F-4D97-AF65-F5344CB8AC3E}">
         <p14:creationId xmlns:p14="http://schemas.microsoft.com/office/powerpoint/2010/main" val="1101081178"/>
+      </p:ext>
+    </p:extLst>
+  </p:cSld>
+  <p:clrMapOvr>
+    <a:masterClrMapping/>
+  </p:clrMapOvr>
+</p:sld>
+</file>
+
+<file path=ppt/slides/slide4.xml><?xml version="1.0" encoding="utf-8"?>
+<p:sld xmlns:a="http://schemas.openxmlformats.org/drawingml/2006/main" xmlns:r="http://schemas.openxmlformats.org/officeDocument/2006/relationships" xmlns:p="http://schemas.openxmlformats.org/presentationml/2006/main">
+  <p:cSld>
+    <p:spTree>
+      <p:nvGrpSpPr>
+        <p:cNvPr id="1" name=""/>
+        <p:cNvGrpSpPr/>
+        <p:nvPr/>
+      </p:nvGrpSpPr>
+      <p:grpSpPr>
+        <a:xfrm>
+          <a:off x="0" y="0"/>
+          <a:ext cx="0" cy="0"/>
+          <a:chOff x="0" y="0"/>
+          <a:chExt cx="0" cy="0"/>
+        </a:xfrm>
+      </p:grpSpPr>
+      <p:grpSp>
+        <p:nvGrpSpPr>
+          <p:cNvPr id="12" name="Grupo 11"/>
+          <p:cNvGrpSpPr/>
+          <p:nvPr/>
+        </p:nvGrpSpPr>
+        <p:grpSpPr>
+          <a:xfrm>
+            <a:off x="2183028" y="584062"/>
+            <a:ext cx="5623980" cy="3946980"/>
+            <a:chOff x="2183028" y="584062"/>
+            <a:chExt cx="5623980" cy="3946980"/>
+          </a:xfrm>
+        </p:grpSpPr>
+        <p:pic>
+          <p:nvPicPr>
+            <p:cNvPr id="2" name="Imagen 1"/>
+            <p:cNvPicPr/>
+            <p:nvPr/>
+          </p:nvPicPr>
+          <p:blipFill rotWithShape="1">
+            <a:blip r:embed="rId2">
+              <a:extLst>
+                <a:ext uri="{28A0092B-C50C-407E-A947-70E740481C1C}">
+                  <a14:useLocalDpi xmlns:a14="http://schemas.microsoft.com/office/drawing/2010/main" val="0"/>
+                </a:ext>
+              </a:extLst>
+            </a:blip>
+            <a:srcRect l="1050" t="12619" r="53813" b="44710"/>
+            <a:stretch/>
+          </p:blipFill>
+          <p:spPr bwMode="auto">
+            <a:xfrm>
+              <a:off x="2183028" y="1610686"/>
+              <a:ext cx="5623980" cy="2920356"/>
+            </a:xfrm>
+            <a:prstGeom prst="rect">
+              <a:avLst/>
+            </a:prstGeom>
+            <a:ln>
+              <a:noFill/>
+            </a:ln>
+            <a:extLst>
+              <a:ext uri="{53640926-AAD7-44D8-BBD7-CCE9431645EC}">
+                <a14:shadowObscured xmlns:a14="http://schemas.microsoft.com/office/drawing/2010/main"/>
+              </a:ext>
+            </a:extLst>
+          </p:spPr>
+        </p:pic>
+        <p:sp>
+          <p:nvSpPr>
+            <p:cNvPr id="3" name="Rectángulo 2"/>
+            <p:cNvSpPr/>
+            <p:nvPr/>
+          </p:nvSpPr>
+          <p:spPr>
+            <a:xfrm>
+              <a:off x="6771503" y="3196281"/>
+              <a:ext cx="815545" cy="378941"/>
+            </a:xfrm>
+            <a:prstGeom prst="rect">
+              <a:avLst/>
+            </a:prstGeom>
+            <a:solidFill>
+              <a:schemeClr val="bg1"/>
+            </a:solidFill>
+            <a:ln>
+              <a:noFill/>
+            </a:ln>
+          </p:spPr>
+          <p:style>
+            <a:lnRef idx="2">
+              <a:schemeClr val="accent1">
+                <a:shade val="50000"/>
+              </a:schemeClr>
+            </a:lnRef>
+            <a:fillRef idx="1">
+              <a:schemeClr val="accent1"/>
+            </a:fillRef>
+            <a:effectRef idx="0">
+              <a:schemeClr val="accent1"/>
+            </a:effectRef>
+            <a:fontRef idx="minor">
+              <a:schemeClr val="lt1"/>
+            </a:fontRef>
+          </p:style>
+          <p:txBody>
+            <a:bodyPr rtlCol="0" anchor="ctr"/>
+            <a:lstStyle/>
+            <a:p>
+              <a:pPr algn="ctr"/>
+              <a:endParaRPr lang="es-ES"/>
+            </a:p>
+          </p:txBody>
+        </p:sp>
+        <p:pic>
+          <p:nvPicPr>
+            <p:cNvPr id="4" name="Imagen 3"/>
+            <p:cNvPicPr>
+              <a:picLocks noChangeAspect="1"/>
+            </p:cNvPicPr>
+            <p:nvPr/>
+          </p:nvPicPr>
+          <p:blipFill rotWithShape="1">
+            <a:blip r:embed="rId3" cstate="print">
+              <a:extLst>
+                <a:ext uri="{28A0092B-C50C-407E-A947-70E740481C1C}">
+                  <a14:useLocalDpi xmlns:a14="http://schemas.microsoft.com/office/drawing/2010/main" val="0"/>
+                </a:ext>
+              </a:extLst>
+            </a:blip>
+            <a:srcRect l="24791" t="15481" r="26968" b="13890"/>
+            <a:stretch/>
+          </p:blipFill>
+          <p:spPr>
+            <a:xfrm>
+              <a:off x="2891482" y="3018974"/>
+              <a:ext cx="425050" cy="430953"/>
+            </a:xfrm>
+            <a:prstGeom prst="rect">
+              <a:avLst/>
+            </a:prstGeom>
+          </p:spPr>
+        </p:pic>
+        <p:pic>
+          <p:nvPicPr>
+            <p:cNvPr id="5" name="Imagen 4"/>
+            <p:cNvPicPr>
+              <a:picLocks noChangeAspect="1"/>
+            </p:cNvPicPr>
+            <p:nvPr/>
+          </p:nvPicPr>
+          <p:blipFill rotWithShape="1">
+            <a:blip r:embed="rId4" cstate="print">
+              <a:extLst>
+                <a:ext uri="{28A0092B-C50C-407E-A947-70E740481C1C}">
+                  <a14:useLocalDpi xmlns:a14="http://schemas.microsoft.com/office/drawing/2010/main" val="0"/>
+                </a:ext>
+              </a:extLst>
+            </a:blip>
+            <a:srcRect l="24791" t="15481" r="26968" b="13890"/>
+            <a:stretch/>
+          </p:blipFill>
+          <p:spPr>
+            <a:xfrm>
+              <a:off x="6109386" y="1204514"/>
+              <a:ext cx="362465" cy="367499"/>
+            </a:xfrm>
+            <a:prstGeom prst="rect">
+              <a:avLst/>
+            </a:prstGeom>
+          </p:spPr>
+        </p:pic>
+        <p:pic>
+          <p:nvPicPr>
+            <p:cNvPr id="6" name="Imagen 5"/>
+            <p:cNvPicPr>
+              <a:picLocks noChangeAspect="1"/>
+            </p:cNvPicPr>
+            <p:nvPr/>
+          </p:nvPicPr>
+          <p:blipFill rotWithShape="1">
+            <a:blip r:embed="rId5" cstate="print">
+              <a:extLst>
+                <a:ext uri="{28A0092B-C50C-407E-A947-70E740481C1C}">
+                  <a14:useLocalDpi xmlns:a14="http://schemas.microsoft.com/office/drawing/2010/main" val="0"/>
+                </a:ext>
+              </a:extLst>
+            </a:blip>
+            <a:srcRect l="36580" t="10190" r="43358" b="76801"/>
+            <a:stretch/>
+          </p:blipFill>
+          <p:spPr>
+            <a:xfrm>
+              <a:off x="6520248" y="1347286"/>
+              <a:ext cx="436606" cy="159302"/>
+            </a:xfrm>
+            <a:prstGeom prst="rect">
+              <a:avLst/>
+            </a:prstGeom>
+          </p:spPr>
+        </p:pic>
+        <p:sp>
+          <p:nvSpPr>
+            <p:cNvPr id="7" name="Rectángulo 6"/>
+            <p:cNvSpPr/>
+            <p:nvPr/>
+          </p:nvSpPr>
+          <p:spPr>
+            <a:xfrm>
+              <a:off x="6060988" y="1165842"/>
+              <a:ext cx="918520" cy="444844"/>
+            </a:xfrm>
+            <a:prstGeom prst="rect">
+              <a:avLst/>
+            </a:prstGeom>
+            <a:noFill/>
+            <a:ln>
+              <a:solidFill>
+                <a:schemeClr val="accent1">
+                  <a:lumMod val="40000"/>
+                  <a:lumOff val="60000"/>
+                </a:schemeClr>
+              </a:solidFill>
+              <a:prstDash val="sysDot"/>
+            </a:ln>
+          </p:spPr>
+          <p:style>
+            <a:lnRef idx="2">
+              <a:schemeClr val="accent1">
+                <a:shade val="50000"/>
+              </a:schemeClr>
+            </a:lnRef>
+            <a:fillRef idx="1">
+              <a:schemeClr val="accent1"/>
+            </a:fillRef>
+            <a:effectRef idx="0">
+              <a:schemeClr val="accent1"/>
+            </a:effectRef>
+            <a:fontRef idx="minor">
+              <a:schemeClr val="lt1"/>
+            </a:fontRef>
+          </p:style>
+          <p:txBody>
+            <a:bodyPr rtlCol="0" anchor="ctr"/>
+            <a:lstStyle/>
+            <a:p>
+              <a:pPr algn="ctr"/>
+              <a:endParaRPr lang="es-ES"/>
+            </a:p>
+          </p:txBody>
+        </p:sp>
+        <p:pic>
+          <p:nvPicPr>
+            <p:cNvPr id="10" name="Imagen 9"/>
+            <p:cNvPicPr>
+              <a:picLocks noChangeAspect="1"/>
+            </p:cNvPicPr>
+            <p:nvPr/>
+          </p:nvPicPr>
+          <p:blipFill rotWithShape="1">
+            <a:blip r:embed="rId6">
+              <a:extLst>
+                <a:ext uri="{28A0092B-C50C-407E-A947-70E740481C1C}">
+                  <a14:useLocalDpi xmlns:a14="http://schemas.microsoft.com/office/drawing/2010/main" val="0"/>
+                </a:ext>
+              </a:extLst>
+            </a:blip>
+            <a:srcRect l="36580" t="10189" r="52443" b="75233"/>
+            <a:stretch/>
+          </p:blipFill>
+          <p:spPr>
+            <a:xfrm>
+              <a:off x="3355259" y="3174721"/>
+              <a:ext cx="327055" cy="244377"/>
+            </a:xfrm>
+            <a:prstGeom prst="rect">
+              <a:avLst/>
+            </a:prstGeom>
+          </p:spPr>
+        </p:pic>
+        <p:pic>
+          <p:nvPicPr>
+            <p:cNvPr id="11" name="Imagen 10"/>
+            <p:cNvPicPr>
+              <a:picLocks noChangeAspect="1"/>
+            </p:cNvPicPr>
+            <p:nvPr/>
+          </p:nvPicPr>
+          <p:blipFill>
+            <a:blip r:embed="rId7" cstate="print">
+              <a:extLst>
+                <a:ext uri="{28A0092B-C50C-407E-A947-70E740481C1C}">
+                  <a14:useLocalDpi xmlns:a14="http://schemas.microsoft.com/office/drawing/2010/main" val="0"/>
+                </a:ext>
+              </a:extLst>
+            </a:blip>
+            <a:stretch>
+              <a:fillRect/>
+            </a:stretch>
+          </p:blipFill>
+          <p:spPr>
+            <a:xfrm>
+              <a:off x="6060988" y="584062"/>
+              <a:ext cx="918520" cy="518373"/>
+            </a:xfrm>
+            <a:prstGeom prst="rect">
+              <a:avLst/>
+            </a:prstGeom>
+          </p:spPr>
+        </p:pic>
+      </p:grpSp>
+    </p:spTree>
+    <p:extLst>
+      <p:ext uri="{BB962C8B-B14F-4D97-AF65-F5344CB8AC3E}">
+        <p14:creationId xmlns:p14="http://schemas.microsoft.com/office/powerpoint/2010/main" val="3437486167"/>
       </p:ext>
     </p:extLst>
   </p:cSld>

</xml_diff>

<commit_message>
estado del arte a falta de rendimiento
</commit_message>
<xml_diff>
--- a/memoria/images/Presentación1.pptx
+++ b/memoria/images/Presentación1.pptx
@@ -5750,275 +5750,320 @@
       </p:grpSpPr>
       <p:grpSp>
         <p:nvGrpSpPr>
-          <p:cNvPr id="12" name="Grupo 11"/>
+          <p:cNvPr id="14" name="Grupo 13"/>
           <p:cNvGrpSpPr/>
           <p:nvPr/>
         </p:nvGrpSpPr>
         <p:grpSpPr>
           <a:xfrm>
-            <a:off x="2183028" y="584062"/>
-            <a:ext cx="5623980" cy="3946980"/>
-            <a:chOff x="2183028" y="584062"/>
-            <a:chExt cx="5623980" cy="3946980"/>
+            <a:off x="2042984" y="584062"/>
+            <a:ext cx="5764024" cy="3946980"/>
+            <a:chOff x="2042984" y="584062"/>
+            <a:chExt cx="5764024" cy="3946980"/>
           </a:xfrm>
         </p:grpSpPr>
+        <p:grpSp>
+          <p:nvGrpSpPr>
+            <p:cNvPr id="12" name="Grupo 11"/>
+            <p:cNvGrpSpPr/>
+            <p:nvPr/>
+          </p:nvGrpSpPr>
+          <p:grpSpPr>
+            <a:xfrm>
+              <a:off x="2183028" y="584062"/>
+              <a:ext cx="5623980" cy="3946980"/>
+              <a:chOff x="2183028" y="584062"/>
+              <a:chExt cx="5623980" cy="3946980"/>
+            </a:xfrm>
+          </p:grpSpPr>
+          <p:pic>
+            <p:nvPicPr>
+              <p:cNvPr id="2" name="Imagen 1"/>
+              <p:cNvPicPr/>
+              <p:nvPr/>
+            </p:nvPicPr>
+            <p:blipFill rotWithShape="1">
+              <a:blip r:embed="rId2">
+                <a:extLst>
+                  <a:ext uri="{28A0092B-C50C-407E-A947-70E740481C1C}">
+                    <a14:useLocalDpi xmlns:a14="http://schemas.microsoft.com/office/drawing/2010/main" val="0"/>
+                  </a:ext>
+                </a:extLst>
+              </a:blip>
+              <a:srcRect l="1050" t="12619" r="53813" b="44710"/>
+              <a:stretch/>
+            </p:blipFill>
+            <p:spPr bwMode="auto">
+              <a:xfrm>
+                <a:off x="2183028" y="1610686"/>
+                <a:ext cx="5623980" cy="2920356"/>
+              </a:xfrm>
+              <a:prstGeom prst="rect">
+                <a:avLst/>
+              </a:prstGeom>
+              <a:ln>
+                <a:noFill/>
+              </a:ln>
+              <a:extLst>
+                <a:ext uri="{53640926-AAD7-44D8-BBD7-CCE9431645EC}">
+                  <a14:shadowObscured xmlns:a14="http://schemas.microsoft.com/office/drawing/2010/main"/>
+                </a:ext>
+              </a:extLst>
+            </p:spPr>
+          </p:pic>
+          <p:sp>
+            <p:nvSpPr>
+              <p:cNvPr id="3" name="Rectángulo 2"/>
+              <p:cNvSpPr/>
+              <p:nvPr/>
+            </p:nvSpPr>
+            <p:spPr>
+              <a:xfrm>
+                <a:off x="6771503" y="3196281"/>
+                <a:ext cx="815545" cy="378941"/>
+              </a:xfrm>
+              <a:prstGeom prst="rect">
+                <a:avLst/>
+              </a:prstGeom>
+              <a:solidFill>
+                <a:schemeClr val="bg1"/>
+              </a:solidFill>
+              <a:ln>
+                <a:noFill/>
+              </a:ln>
+            </p:spPr>
+            <p:style>
+              <a:lnRef idx="2">
+                <a:schemeClr val="accent1">
+                  <a:shade val="50000"/>
+                </a:schemeClr>
+              </a:lnRef>
+              <a:fillRef idx="1">
+                <a:schemeClr val="accent1"/>
+              </a:fillRef>
+              <a:effectRef idx="0">
+                <a:schemeClr val="accent1"/>
+              </a:effectRef>
+              <a:fontRef idx="minor">
+                <a:schemeClr val="lt1"/>
+              </a:fontRef>
+            </p:style>
+            <p:txBody>
+              <a:bodyPr rtlCol="0" anchor="ctr"/>
+              <a:lstStyle/>
+              <a:p>
+                <a:pPr algn="ctr"/>
+                <a:endParaRPr lang="es-ES"/>
+              </a:p>
+            </p:txBody>
+          </p:sp>
+          <p:pic>
+            <p:nvPicPr>
+              <p:cNvPr id="4" name="Imagen 3"/>
+              <p:cNvPicPr>
+                <a:picLocks noChangeAspect="1"/>
+              </p:cNvPicPr>
+              <p:nvPr/>
+            </p:nvPicPr>
+            <p:blipFill rotWithShape="1">
+              <a:blip r:embed="rId3" cstate="print">
+                <a:extLst>
+                  <a:ext uri="{28A0092B-C50C-407E-A947-70E740481C1C}">
+                    <a14:useLocalDpi xmlns:a14="http://schemas.microsoft.com/office/drawing/2010/main" val="0"/>
+                  </a:ext>
+                </a:extLst>
+              </a:blip>
+              <a:srcRect l="24791" t="15481" r="26968" b="13890"/>
+              <a:stretch/>
+            </p:blipFill>
+            <p:spPr>
+              <a:xfrm>
+                <a:off x="3143877" y="3515873"/>
+                <a:ext cx="339546" cy="344262"/>
+              </a:xfrm>
+              <a:prstGeom prst="rect">
+                <a:avLst/>
+              </a:prstGeom>
+            </p:spPr>
+          </p:pic>
+          <p:pic>
+            <p:nvPicPr>
+              <p:cNvPr id="5" name="Imagen 4"/>
+              <p:cNvPicPr>
+                <a:picLocks noChangeAspect="1"/>
+              </p:cNvPicPr>
+              <p:nvPr/>
+            </p:nvPicPr>
+            <p:blipFill rotWithShape="1">
+              <a:blip r:embed="rId4" cstate="print">
+                <a:extLst>
+                  <a:ext uri="{28A0092B-C50C-407E-A947-70E740481C1C}">
+                    <a14:useLocalDpi xmlns:a14="http://schemas.microsoft.com/office/drawing/2010/main" val="0"/>
+                  </a:ext>
+                </a:extLst>
+              </a:blip>
+              <a:srcRect l="24791" t="15481" r="26968" b="13890"/>
+              <a:stretch/>
+            </p:blipFill>
+            <p:spPr>
+              <a:xfrm>
+                <a:off x="6109386" y="1204514"/>
+                <a:ext cx="362465" cy="367499"/>
+              </a:xfrm>
+              <a:prstGeom prst="rect">
+                <a:avLst/>
+              </a:prstGeom>
+            </p:spPr>
+          </p:pic>
+          <p:pic>
+            <p:nvPicPr>
+              <p:cNvPr id="6" name="Imagen 5"/>
+              <p:cNvPicPr>
+                <a:picLocks noChangeAspect="1"/>
+              </p:cNvPicPr>
+              <p:nvPr/>
+            </p:nvPicPr>
+            <p:blipFill rotWithShape="1">
+              <a:blip r:embed="rId5" cstate="print">
+                <a:extLst>
+                  <a:ext uri="{28A0092B-C50C-407E-A947-70E740481C1C}">
+                    <a14:useLocalDpi xmlns:a14="http://schemas.microsoft.com/office/drawing/2010/main" val="0"/>
+                  </a:ext>
+                </a:extLst>
+              </a:blip>
+              <a:srcRect l="36580" t="10190" r="43358" b="76801"/>
+              <a:stretch/>
+            </p:blipFill>
+            <p:spPr>
+              <a:xfrm>
+                <a:off x="6520248" y="1347286"/>
+                <a:ext cx="436606" cy="159302"/>
+              </a:xfrm>
+              <a:prstGeom prst="rect">
+                <a:avLst/>
+              </a:prstGeom>
+            </p:spPr>
+          </p:pic>
+          <p:sp>
+            <p:nvSpPr>
+              <p:cNvPr id="7" name="Rectángulo 6"/>
+              <p:cNvSpPr/>
+              <p:nvPr/>
+            </p:nvSpPr>
+            <p:spPr>
+              <a:xfrm>
+                <a:off x="6060988" y="1165842"/>
+                <a:ext cx="918520" cy="444844"/>
+              </a:xfrm>
+              <a:prstGeom prst="rect">
+                <a:avLst/>
+              </a:prstGeom>
+              <a:noFill/>
+              <a:ln>
+                <a:solidFill>
+                  <a:schemeClr val="accent1">
+                    <a:lumMod val="40000"/>
+                    <a:lumOff val="60000"/>
+                  </a:schemeClr>
+                </a:solidFill>
+                <a:prstDash val="sysDot"/>
+              </a:ln>
+            </p:spPr>
+            <p:style>
+              <a:lnRef idx="2">
+                <a:schemeClr val="accent1">
+                  <a:shade val="50000"/>
+                </a:schemeClr>
+              </a:lnRef>
+              <a:fillRef idx="1">
+                <a:schemeClr val="accent1"/>
+              </a:fillRef>
+              <a:effectRef idx="0">
+                <a:schemeClr val="accent1"/>
+              </a:effectRef>
+              <a:fontRef idx="minor">
+                <a:schemeClr val="lt1"/>
+              </a:fontRef>
+            </p:style>
+            <p:txBody>
+              <a:bodyPr rtlCol="0" anchor="ctr"/>
+              <a:lstStyle/>
+              <a:p>
+                <a:pPr algn="ctr"/>
+                <a:endParaRPr lang="es-ES"/>
+              </a:p>
+            </p:txBody>
+          </p:sp>
+          <p:pic>
+            <p:nvPicPr>
+              <p:cNvPr id="10" name="Imagen 9"/>
+              <p:cNvPicPr>
+                <a:picLocks noChangeAspect="1"/>
+              </p:cNvPicPr>
+              <p:nvPr/>
+            </p:nvPicPr>
+            <p:blipFill rotWithShape="1">
+              <a:blip r:embed="rId6">
+                <a:extLst>
+                  <a:ext uri="{28A0092B-C50C-407E-A947-70E740481C1C}">
+                    <a14:useLocalDpi xmlns:a14="http://schemas.microsoft.com/office/drawing/2010/main" val="0"/>
+                  </a:ext>
+                </a:extLst>
+              </a:blip>
+              <a:srcRect l="36580" t="10189" r="52443" b="75233"/>
+              <a:stretch/>
+            </p:blipFill>
+            <p:spPr>
+              <a:xfrm>
+                <a:off x="3483423" y="3565815"/>
+                <a:ext cx="327055" cy="244377"/>
+              </a:xfrm>
+              <a:prstGeom prst="rect">
+                <a:avLst/>
+              </a:prstGeom>
+            </p:spPr>
+          </p:pic>
+          <p:pic>
+            <p:nvPicPr>
+              <p:cNvPr id="11" name="Imagen 10"/>
+              <p:cNvPicPr>
+                <a:picLocks noChangeAspect="1"/>
+              </p:cNvPicPr>
+              <p:nvPr/>
+            </p:nvPicPr>
+            <p:blipFill>
+              <a:blip r:embed="rId7" cstate="print">
+                <a:extLst>
+                  <a:ext uri="{28A0092B-C50C-407E-A947-70E740481C1C}">
+                    <a14:useLocalDpi xmlns:a14="http://schemas.microsoft.com/office/drawing/2010/main" val="0"/>
+                  </a:ext>
+                </a:extLst>
+              </a:blip>
+              <a:stretch>
+                <a:fillRect/>
+              </a:stretch>
+            </p:blipFill>
+            <p:spPr>
+              <a:xfrm>
+                <a:off x="6060988" y="584062"/>
+                <a:ext cx="918520" cy="518373"/>
+              </a:xfrm>
+              <a:prstGeom prst="rect">
+                <a:avLst/>
+              </a:prstGeom>
+            </p:spPr>
+          </p:pic>
+        </p:grpSp>
         <p:pic>
           <p:nvPicPr>
-            <p:cNvPr id="2" name="Imagen 1"/>
-            <p:cNvPicPr/>
-            <p:nvPr/>
-          </p:nvPicPr>
-          <p:blipFill rotWithShape="1">
-            <a:blip r:embed="rId2">
-              <a:extLst>
-                <a:ext uri="{28A0092B-C50C-407E-A947-70E740481C1C}">
-                  <a14:useLocalDpi xmlns:a14="http://schemas.microsoft.com/office/drawing/2010/main" val="0"/>
-                </a:ext>
-              </a:extLst>
-            </a:blip>
-            <a:srcRect l="1050" t="12619" r="53813" b="44710"/>
-            <a:stretch/>
-          </p:blipFill>
-          <p:spPr bwMode="auto">
-            <a:xfrm>
-              <a:off x="2183028" y="1610686"/>
-              <a:ext cx="5623980" cy="2920356"/>
-            </a:xfrm>
-            <a:prstGeom prst="rect">
-              <a:avLst/>
-            </a:prstGeom>
-            <a:ln>
-              <a:noFill/>
-            </a:ln>
-            <a:extLst>
-              <a:ext uri="{53640926-AAD7-44D8-BBD7-CCE9431645EC}">
-                <a14:shadowObscured xmlns:a14="http://schemas.microsoft.com/office/drawing/2010/main"/>
-              </a:ext>
-            </a:extLst>
-          </p:spPr>
-        </p:pic>
-        <p:sp>
-          <p:nvSpPr>
-            <p:cNvPr id="3" name="Rectángulo 2"/>
-            <p:cNvSpPr/>
-            <p:nvPr/>
-          </p:nvSpPr>
-          <p:spPr>
-            <a:xfrm>
-              <a:off x="6771503" y="3196281"/>
-              <a:ext cx="815545" cy="378941"/>
-            </a:xfrm>
-            <a:prstGeom prst="rect">
-              <a:avLst/>
-            </a:prstGeom>
-            <a:solidFill>
-              <a:schemeClr val="bg1"/>
-            </a:solidFill>
-            <a:ln>
-              <a:noFill/>
-            </a:ln>
-          </p:spPr>
-          <p:style>
-            <a:lnRef idx="2">
-              <a:schemeClr val="accent1">
-                <a:shade val="50000"/>
-              </a:schemeClr>
-            </a:lnRef>
-            <a:fillRef idx="1">
-              <a:schemeClr val="accent1"/>
-            </a:fillRef>
-            <a:effectRef idx="0">
-              <a:schemeClr val="accent1"/>
-            </a:effectRef>
-            <a:fontRef idx="minor">
-              <a:schemeClr val="lt1"/>
-            </a:fontRef>
-          </p:style>
-          <p:txBody>
-            <a:bodyPr rtlCol="0" anchor="ctr"/>
-            <a:lstStyle/>
-            <a:p>
-              <a:pPr algn="ctr"/>
-              <a:endParaRPr lang="es-ES"/>
-            </a:p>
-          </p:txBody>
-        </p:sp>
-        <p:pic>
-          <p:nvPicPr>
-            <p:cNvPr id="4" name="Imagen 3"/>
-            <p:cNvPicPr>
-              <a:picLocks noChangeAspect="1"/>
-            </p:cNvPicPr>
-            <p:nvPr/>
-          </p:nvPicPr>
-          <p:blipFill rotWithShape="1">
-            <a:blip r:embed="rId3" cstate="print">
-              <a:extLst>
-                <a:ext uri="{28A0092B-C50C-407E-A947-70E740481C1C}">
-                  <a14:useLocalDpi xmlns:a14="http://schemas.microsoft.com/office/drawing/2010/main" val="0"/>
-                </a:ext>
-              </a:extLst>
-            </a:blip>
-            <a:srcRect l="24791" t="15481" r="26968" b="13890"/>
-            <a:stretch/>
-          </p:blipFill>
-          <p:spPr>
-            <a:xfrm>
-              <a:off x="2891482" y="3018974"/>
-              <a:ext cx="425050" cy="430953"/>
-            </a:xfrm>
-            <a:prstGeom prst="rect">
-              <a:avLst/>
-            </a:prstGeom>
-          </p:spPr>
-        </p:pic>
-        <p:pic>
-          <p:nvPicPr>
-            <p:cNvPr id="5" name="Imagen 4"/>
-            <p:cNvPicPr>
-              <a:picLocks noChangeAspect="1"/>
-            </p:cNvPicPr>
-            <p:nvPr/>
-          </p:nvPicPr>
-          <p:blipFill rotWithShape="1">
-            <a:blip r:embed="rId4" cstate="print">
-              <a:extLst>
-                <a:ext uri="{28A0092B-C50C-407E-A947-70E740481C1C}">
-                  <a14:useLocalDpi xmlns:a14="http://schemas.microsoft.com/office/drawing/2010/main" val="0"/>
-                </a:ext>
-              </a:extLst>
-            </a:blip>
-            <a:srcRect l="24791" t="15481" r="26968" b="13890"/>
-            <a:stretch/>
-          </p:blipFill>
-          <p:spPr>
-            <a:xfrm>
-              <a:off x="6109386" y="1204514"/>
-              <a:ext cx="362465" cy="367499"/>
-            </a:xfrm>
-            <a:prstGeom prst="rect">
-              <a:avLst/>
-            </a:prstGeom>
-          </p:spPr>
-        </p:pic>
-        <p:pic>
-          <p:nvPicPr>
-            <p:cNvPr id="6" name="Imagen 5"/>
-            <p:cNvPicPr>
-              <a:picLocks noChangeAspect="1"/>
-            </p:cNvPicPr>
-            <p:nvPr/>
-          </p:nvPicPr>
-          <p:blipFill rotWithShape="1">
-            <a:blip r:embed="rId5" cstate="print">
-              <a:extLst>
-                <a:ext uri="{28A0092B-C50C-407E-A947-70E740481C1C}">
-                  <a14:useLocalDpi xmlns:a14="http://schemas.microsoft.com/office/drawing/2010/main" val="0"/>
-                </a:ext>
-              </a:extLst>
-            </a:blip>
-            <a:srcRect l="36580" t="10190" r="43358" b="76801"/>
-            <a:stretch/>
-          </p:blipFill>
-          <p:spPr>
-            <a:xfrm>
-              <a:off x="6520248" y="1347286"/>
-              <a:ext cx="436606" cy="159302"/>
-            </a:xfrm>
-            <a:prstGeom prst="rect">
-              <a:avLst/>
-            </a:prstGeom>
-          </p:spPr>
-        </p:pic>
-        <p:sp>
-          <p:nvSpPr>
-            <p:cNvPr id="7" name="Rectángulo 6"/>
-            <p:cNvSpPr/>
-            <p:nvPr/>
-          </p:nvSpPr>
-          <p:spPr>
-            <a:xfrm>
-              <a:off x="6060988" y="1165842"/>
-              <a:ext cx="918520" cy="444844"/>
-            </a:xfrm>
-            <a:prstGeom prst="rect">
-              <a:avLst/>
-            </a:prstGeom>
-            <a:noFill/>
-            <a:ln>
-              <a:solidFill>
-                <a:schemeClr val="accent1">
-                  <a:lumMod val="40000"/>
-                  <a:lumOff val="60000"/>
-                </a:schemeClr>
-              </a:solidFill>
-              <a:prstDash val="sysDot"/>
-            </a:ln>
-          </p:spPr>
-          <p:style>
-            <a:lnRef idx="2">
-              <a:schemeClr val="accent1">
-                <a:shade val="50000"/>
-              </a:schemeClr>
-            </a:lnRef>
-            <a:fillRef idx="1">
-              <a:schemeClr val="accent1"/>
-            </a:fillRef>
-            <a:effectRef idx="0">
-              <a:schemeClr val="accent1"/>
-            </a:effectRef>
-            <a:fontRef idx="minor">
-              <a:schemeClr val="lt1"/>
-            </a:fontRef>
-          </p:style>
-          <p:txBody>
-            <a:bodyPr rtlCol="0" anchor="ctr"/>
-            <a:lstStyle/>
-            <a:p>
-              <a:pPr algn="ctr"/>
-              <a:endParaRPr lang="es-ES"/>
-            </a:p>
-          </p:txBody>
-        </p:sp>
-        <p:pic>
-          <p:nvPicPr>
-            <p:cNvPr id="10" name="Imagen 9"/>
-            <p:cNvPicPr>
-              <a:picLocks noChangeAspect="1"/>
-            </p:cNvPicPr>
-            <p:nvPr/>
-          </p:nvPicPr>
-          <p:blipFill rotWithShape="1">
-            <a:blip r:embed="rId6">
-              <a:extLst>
-                <a:ext uri="{28A0092B-C50C-407E-A947-70E740481C1C}">
-                  <a14:useLocalDpi xmlns:a14="http://schemas.microsoft.com/office/drawing/2010/main" val="0"/>
-                </a:ext>
-              </a:extLst>
-            </a:blip>
-            <a:srcRect l="36580" t="10189" r="52443" b="75233"/>
-            <a:stretch/>
-          </p:blipFill>
-          <p:spPr>
-            <a:xfrm>
-              <a:off x="3355259" y="3174721"/>
-              <a:ext cx="327055" cy="244377"/>
-            </a:xfrm>
-            <a:prstGeom prst="rect">
-              <a:avLst/>
-            </a:prstGeom>
-          </p:spPr>
-        </p:pic>
-        <p:pic>
-          <p:nvPicPr>
-            <p:cNvPr id="11" name="Imagen 10"/>
+            <p:cNvPr id="9" name="Imagen 8"/>
             <p:cNvPicPr>
               <a:picLocks noChangeAspect="1"/>
             </p:cNvPicPr>
             <p:nvPr/>
           </p:nvPicPr>
           <p:blipFill>
-            <a:blip r:embed="rId7" cstate="print">
+            <a:blip r:embed="rId8" cstate="print">
               <a:extLst>
                 <a:ext uri="{28A0092B-C50C-407E-A947-70E740481C1C}">
                   <a14:useLocalDpi xmlns:a14="http://schemas.microsoft.com/office/drawing/2010/main" val="0"/>
@@ -6031,8 +6076,38 @@
           </p:blipFill>
           <p:spPr>
             <a:xfrm>
-              <a:off x="6060988" y="584062"/>
-              <a:ext cx="918520" cy="518373"/>
+              <a:off x="2042984" y="2981206"/>
+              <a:ext cx="574271" cy="430149"/>
+            </a:xfrm>
+            <a:prstGeom prst="rect">
+              <a:avLst/>
+            </a:prstGeom>
+          </p:spPr>
+        </p:pic>
+        <p:pic>
+          <p:nvPicPr>
+            <p:cNvPr id="13" name="Imagen 12"/>
+            <p:cNvPicPr>
+              <a:picLocks noChangeAspect="1"/>
+            </p:cNvPicPr>
+            <p:nvPr/>
+          </p:nvPicPr>
+          <p:blipFill>
+            <a:blip r:embed="rId9" cstate="print">
+              <a:extLst>
+                <a:ext uri="{28A0092B-C50C-407E-A947-70E740481C1C}">
+                  <a14:useLocalDpi xmlns:a14="http://schemas.microsoft.com/office/drawing/2010/main" val="0"/>
+                </a:ext>
+              </a:extLst>
+            </a:blip>
+            <a:stretch>
+              <a:fillRect/>
+            </a:stretch>
+          </p:blipFill>
+          <p:spPr>
+            <a:xfrm>
+              <a:off x="2508870" y="3157831"/>
+              <a:ext cx="561316" cy="159663"/>
             </a:xfrm>
             <a:prstGeom prst="rect">
               <a:avLst/>

</xml_diff>

<commit_message>
mas cambios de intencion sugest dish
</commit_message>
<xml_diff>
--- a/memoria/images/Presentación1.pptx
+++ b/memoria/images/Presentación1.pptx
@@ -28919,7 +28919,22 @@
                   </a:solidFill>
                   <a:latin typeface="Arial Rounded MT Bold" panose="020F0704030504030204" pitchFamily="34" charset="0"/>
                 </a:rPr>
-                <a:t>SEARCH</a:t>
+                <a:t>SUGGEST</a:t>
+              </a:r>
+            </a:p>
+            <a:p>
+              <a:pPr algn="ctr"/>
+              <a:r>
+                <a:rPr lang="es-ES" sz="1200" dirty="0" smtClean="0">
+                  <a:solidFill>
+                    <a:schemeClr val="tx1">
+                      <a:lumMod val="75000"/>
+                      <a:lumOff val="25000"/>
+                    </a:schemeClr>
+                  </a:solidFill>
+                  <a:latin typeface="Arial Rounded MT Bold" panose="020F0704030504030204" pitchFamily="34" charset="0"/>
+                </a:rPr>
+                <a:t>A</a:t>
               </a:r>
             </a:p>
             <a:p>
@@ -30524,8 +30539,8 @@
           </p:nvSpPr>
           <p:spPr>
             <a:xfrm>
-              <a:off x="4399968" y="8649143"/>
-              <a:ext cx="2057423" cy="369332"/>
+              <a:off x="4380189" y="8627325"/>
+              <a:ext cx="3112647" cy="369332"/>
             </a:xfrm>
             <a:prstGeom prst="rect">
               <a:avLst/>
@@ -30568,6 +30583,26 @@
                   <a:cs typeface="Aharoni" panose="02010803020104030203" pitchFamily="2" charset="-79"/>
                 </a:rPr>
                 <a:t>Uncertain</a:t>
+              </a:r>
+              <a:r>
+                <a:rPr lang="es-ES" b="1" dirty="0" smtClean="0">
+                  <a:solidFill>
+                    <a:srgbClr val="FF3300"/>
+                  </a:solidFill>
+                  <a:latin typeface="+mj-lt"/>
+                  <a:cs typeface="Aharoni" panose="02010803020104030203" pitchFamily="2" charset="-79"/>
+                </a:rPr>
+                <a:t> / </a:t>
+              </a:r>
+              <a:r>
+                <a:rPr lang="es-ES" b="1" dirty="0" err="1" smtClean="0">
+                  <a:solidFill>
+                    <a:srgbClr val="FF3300"/>
+                  </a:solidFill>
+                  <a:latin typeface="+mj-lt"/>
+                  <a:cs typeface="Aharoni" panose="02010803020104030203" pitchFamily="2" charset="-79"/>
+                </a:rPr>
+                <a:t>Unknown</a:t>
               </a:r>
               <a:endParaRPr lang="es-ES" b="1" dirty="0" smtClean="0">
                 <a:solidFill>

</xml_diff>

<commit_message>
pruebas con ultima version de slots
</commit_message>
<xml_diff>
--- a/memoria/images/Presentación1.pptx
+++ b/memoria/images/Presentación1.pptx
@@ -27,6 +27,7 @@
     <p:sldId id="276" r:id="rId21"/>
     <p:sldId id="277" r:id="rId22"/>
     <p:sldId id="275" r:id="rId23"/>
+    <p:sldId id="278" r:id="rId24"/>
   </p:sldIdLst>
   <p:sldSz cx="12192000" cy="6858000"/>
   <p:notesSz cx="6858000" cy="9144000"/>
@@ -276,7 +277,7 @@
           <a:p>
             <a:fld id="{9C28449B-7E7F-4B22-B31C-7455ACE0523B}" type="datetimeFigureOut">
               <a:rPr lang="es-ES" smtClean="0"/>
-              <a:t>27/12/2017</a:t>
+              <a:t>28/12/2017</a:t>
             </a:fld>
             <a:endParaRPr lang="es-ES"/>
           </a:p>
@@ -446,7 +447,7 @@
           <a:p>
             <a:fld id="{9C28449B-7E7F-4B22-B31C-7455ACE0523B}" type="datetimeFigureOut">
               <a:rPr lang="es-ES" smtClean="0"/>
-              <a:t>27/12/2017</a:t>
+              <a:t>28/12/2017</a:t>
             </a:fld>
             <a:endParaRPr lang="es-ES"/>
           </a:p>
@@ -626,7 +627,7 @@
           <a:p>
             <a:fld id="{9C28449B-7E7F-4B22-B31C-7455ACE0523B}" type="datetimeFigureOut">
               <a:rPr lang="es-ES" smtClean="0"/>
-              <a:t>27/12/2017</a:t>
+              <a:t>28/12/2017</a:t>
             </a:fld>
             <a:endParaRPr lang="es-ES"/>
           </a:p>
@@ -796,7 +797,7 @@
           <a:p>
             <a:fld id="{9C28449B-7E7F-4B22-B31C-7455ACE0523B}" type="datetimeFigureOut">
               <a:rPr lang="es-ES" smtClean="0"/>
-              <a:t>27/12/2017</a:t>
+              <a:t>28/12/2017</a:t>
             </a:fld>
             <a:endParaRPr lang="es-ES"/>
           </a:p>
@@ -1042,7 +1043,7 @@
           <a:p>
             <a:fld id="{9C28449B-7E7F-4B22-B31C-7455ACE0523B}" type="datetimeFigureOut">
               <a:rPr lang="es-ES" smtClean="0"/>
-              <a:t>27/12/2017</a:t>
+              <a:t>28/12/2017</a:t>
             </a:fld>
             <a:endParaRPr lang="es-ES"/>
           </a:p>
@@ -1274,7 +1275,7 @@
           <a:p>
             <a:fld id="{9C28449B-7E7F-4B22-B31C-7455ACE0523B}" type="datetimeFigureOut">
               <a:rPr lang="es-ES" smtClean="0"/>
-              <a:t>27/12/2017</a:t>
+              <a:t>28/12/2017</a:t>
             </a:fld>
             <a:endParaRPr lang="es-ES"/>
           </a:p>
@@ -1641,7 +1642,7 @@
           <a:p>
             <a:fld id="{9C28449B-7E7F-4B22-B31C-7455ACE0523B}" type="datetimeFigureOut">
               <a:rPr lang="es-ES" smtClean="0"/>
-              <a:t>27/12/2017</a:t>
+              <a:t>28/12/2017</a:t>
             </a:fld>
             <a:endParaRPr lang="es-ES"/>
           </a:p>
@@ -1759,7 +1760,7 @@
           <a:p>
             <a:fld id="{9C28449B-7E7F-4B22-B31C-7455ACE0523B}" type="datetimeFigureOut">
               <a:rPr lang="es-ES" smtClean="0"/>
-              <a:t>27/12/2017</a:t>
+              <a:t>28/12/2017</a:t>
             </a:fld>
             <a:endParaRPr lang="es-ES"/>
           </a:p>
@@ -1854,7 +1855,7 @@
           <a:p>
             <a:fld id="{9C28449B-7E7F-4B22-B31C-7455ACE0523B}" type="datetimeFigureOut">
               <a:rPr lang="es-ES" smtClean="0"/>
-              <a:t>27/12/2017</a:t>
+              <a:t>28/12/2017</a:t>
             </a:fld>
             <a:endParaRPr lang="es-ES"/>
           </a:p>
@@ -2131,7 +2132,7 @@
           <a:p>
             <a:fld id="{9C28449B-7E7F-4B22-B31C-7455ACE0523B}" type="datetimeFigureOut">
               <a:rPr lang="es-ES" smtClean="0"/>
-              <a:t>27/12/2017</a:t>
+              <a:t>28/12/2017</a:t>
             </a:fld>
             <a:endParaRPr lang="es-ES"/>
           </a:p>
@@ -2384,7 +2385,7 @@
           <a:p>
             <a:fld id="{9C28449B-7E7F-4B22-B31C-7455ACE0523B}" type="datetimeFigureOut">
               <a:rPr lang="es-ES" smtClean="0"/>
-              <a:t>27/12/2017</a:t>
+              <a:t>28/12/2017</a:t>
             </a:fld>
             <a:endParaRPr lang="es-ES"/>
           </a:p>
@@ -2597,7 +2598,7 @@
           <a:p>
             <a:fld id="{9C28449B-7E7F-4B22-B31C-7455ACE0523B}" type="datetimeFigureOut">
               <a:rPr lang="es-ES" smtClean="0"/>
-              <a:t>27/12/2017</a:t>
+              <a:t>28/12/2017</a:t>
             </a:fld>
             <a:endParaRPr lang="es-ES"/>
           </a:p>
@@ -16520,20 +16521,7 @@
                   <a:latin typeface="+mj-lt"/>
                   <a:cs typeface="Aharoni" panose="02010803020104030203" pitchFamily="2" charset="-79"/>
                 </a:rPr>
-                <a:t> </a:t>
-              </a:r>
-              <a:r>
-                <a:rPr lang="es-ES" sz="1400" b="1" dirty="0" smtClean="0">
-                  <a:solidFill>
-                    <a:schemeClr val="tx1">
-                      <a:lumMod val="50000"/>
-                      <a:lumOff val="50000"/>
-                    </a:schemeClr>
-                  </a:solidFill>
-                  <a:latin typeface="+mj-lt"/>
-                  <a:cs typeface="Aharoni" panose="02010803020104030203" pitchFamily="2" charset="-79"/>
-                </a:rPr>
-                <a:t>$</a:t>
+                <a:t> $</a:t>
               </a:r>
               <a:r>
                 <a:rPr lang="es-ES" sz="1600" dirty="0" err="1">
@@ -17923,20 +17911,7 @@
                   <a:latin typeface="+mj-lt"/>
                   <a:cs typeface="Aharoni" panose="02010803020104030203" pitchFamily="2" charset="-79"/>
                 </a:rPr>
-                <a:t>y</a:t>
-              </a:r>
-              <a:r>
-                <a:rPr lang="es-ES" sz="1600" dirty="0" err="1">
-                  <a:solidFill>
-                    <a:schemeClr val="tx1">
-                      <a:lumMod val="50000"/>
-                      <a:lumOff val="50000"/>
-                    </a:schemeClr>
-                  </a:solidFill>
-                  <a:latin typeface="+mj-lt"/>
-                  <a:cs typeface="Aharoni" panose="02010803020104030203" pitchFamily="2" charset="-79"/>
-                </a:rPr>
-                <a:t>um_sugest</a:t>
+                <a:t>yum_sugest</a:t>
               </a:r>
               <a:r>
                 <a:rPr lang="es-ES" sz="1600" dirty="0">
@@ -17951,16 +17926,6 @@
                 </a:rPr>
                 <a:t> =TRUE</a:t>
               </a:r>
-              <a:endParaRPr lang="es-ES" sz="1600" dirty="0">
-                <a:solidFill>
-                  <a:schemeClr val="tx1">
-                    <a:lumMod val="50000"/>
-                    <a:lumOff val="50000"/>
-                  </a:schemeClr>
-                </a:solidFill>
-                <a:latin typeface="+mj-lt"/>
-                <a:cs typeface="Aharoni" panose="02010803020104030203" pitchFamily="2" charset="-79"/>
-              </a:endParaRPr>
             </a:p>
           </p:txBody>
         </p:sp>
@@ -18213,16 +18178,6 @@
                 </a:rPr>
                 <a:t>= True</a:t>
               </a:r>
-              <a:endParaRPr lang="es-ES" sz="1600" dirty="0">
-                <a:solidFill>
-                  <a:schemeClr val="tx1">
-                    <a:lumMod val="50000"/>
-                    <a:lumOff val="50000"/>
-                  </a:schemeClr>
-                </a:solidFill>
-                <a:latin typeface="+mj-lt"/>
-                <a:cs typeface="Aharoni" panose="02010803020104030203" pitchFamily="2" charset="-79"/>
-              </a:endParaRPr>
             </a:p>
           </p:txBody>
         </p:sp>
@@ -24143,29 +24098,8 @@
                   </a:solidFill>
                   <a:latin typeface="Arial Rounded MT Bold" panose="020F0704030504030204" pitchFamily="34" charset="0"/>
                 </a:rPr>
-                <a:t>$</a:t>
+                <a:t>$IMAGE_RECIPE</a:t>
               </a:r>
-              <a:r>
-                <a:rPr lang="es-ES" sz="1200" dirty="0" smtClean="0">
-                  <a:solidFill>
-                    <a:schemeClr val="tx1">
-                      <a:lumMod val="75000"/>
-                      <a:lumOff val="25000"/>
-                    </a:schemeClr>
-                  </a:solidFill>
-                  <a:latin typeface="Arial Rounded MT Bold" panose="020F0704030504030204" pitchFamily="34" charset="0"/>
-                </a:rPr>
-                <a:t>IMAGE_RECIPE</a:t>
-              </a:r>
-              <a:endParaRPr lang="es-ES" sz="1200" dirty="0" smtClean="0">
-                <a:solidFill>
-                  <a:schemeClr val="tx1">
-                    <a:lumMod val="75000"/>
-                    <a:lumOff val="25000"/>
-                  </a:schemeClr>
-                </a:solidFill>
-                <a:latin typeface="Arial Rounded MT Bold" panose="020F0704030504030204" pitchFamily="34" charset="0"/>
-              </a:endParaRPr>
             </a:p>
           </p:txBody>
         </p:sp>
@@ -24618,17 +24552,7 @@
                   <a:latin typeface="+mj-lt"/>
                   <a:cs typeface="Aharoni" panose="02010803020104030203" pitchFamily="2" charset="-79"/>
                 </a:rPr>
-                <a:t> </a:t>
-              </a:r>
-              <a:r>
-                <a:rPr lang="es-ES" b="1" dirty="0" smtClean="0">
-                  <a:solidFill>
-                    <a:srgbClr val="FF3300"/>
-                  </a:solidFill>
-                  <a:latin typeface="+mj-lt"/>
-                  <a:cs typeface="Aharoni" panose="02010803020104030203" pitchFamily="2" charset="-79"/>
-                </a:rPr>
-                <a:t>/ </a:t>
+                <a:t> / </a:t>
               </a:r>
               <a:r>
                 <a:rPr lang="es-ES" b="1" dirty="0" err="1" smtClean="0">
@@ -26454,33 +26378,7 @@
                   <a:latin typeface="+mj-lt"/>
                   <a:cs typeface="Aharoni" panose="02010803020104030203" pitchFamily="2" charset="-79"/>
                 </a:rPr>
-                <a:t> = </a:t>
-              </a:r>
-              <a:r>
-                <a:rPr lang="es-ES" sz="1600" dirty="0">
-                  <a:solidFill>
-                    <a:schemeClr val="tx1">
-                      <a:lumMod val="50000"/>
-                      <a:lumOff val="50000"/>
-                    </a:schemeClr>
-                  </a:solidFill>
-                  <a:latin typeface="+mj-lt"/>
-                  <a:cs typeface="Aharoni" panose="02010803020104030203" pitchFamily="2" charset="-79"/>
-                </a:rPr>
-                <a:t>F</a:t>
-              </a:r>
-              <a:r>
-                <a:rPr lang="es-ES" sz="1600" dirty="0">
-                  <a:solidFill>
-                    <a:schemeClr val="tx1">
-                      <a:lumMod val="50000"/>
-                      <a:lumOff val="50000"/>
-                    </a:schemeClr>
-                  </a:solidFill>
-                  <a:latin typeface="+mj-lt"/>
-                  <a:cs typeface="Aharoni" panose="02010803020104030203" pitchFamily="2" charset="-79"/>
-                </a:rPr>
-                <a:t>alse</a:t>
+                <a:t> = False</a:t>
               </a:r>
             </a:p>
             <a:p>
@@ -26669,16 +26567,6 @@
                 </a:rPr>
                 <a:t>= 0</a:t>
               </a:r>
-              <a:endParaRPr lang="es-ES" sz="1600" dirty="0">
-                <a:solidFill>
-                  <a:schemeClr val="tx1">
-                    <a:lumMod val="50000"/>
-                    <a:lumOff val="50000"/>
-                  </a:schemeClr>
-                </a:solidFill>
-                <a:latin typeface="+mj-lt"/>
-                <a:cs typeface="Aharoni" panose="02010803020104030203" pitchFamily="2" charset="-79"/>
-              </a:endParaRPr>
             </a:p>
           </p:txBody>
         </p:sp>
@@ -28101,20 +27989,7 @@
                   <a:latin typeface="+mj-lt"/>
                   <a:cs typeface="Aharoni" panose="02010803020104030203" pitchFamily="2" charset="-79"/>
                 </a:rPr>
-                <a:t> </a:t>
-              </a:r>
-              <a:r>
-                <a:rPr lang="es-ES" sz="1400" b="1" dirty="0" smtClean="0">
-                  <a:solidFill>
-                    <a:schemeClr val="tx1">
-                      <a:lumMod val="50000"/>
-                      <a:lumOff val="50000"/>
-                    </a:schemeClr>
-                  </a:solidFill>
-                  <a:latin typeface="+mj-lt"/>
-                  <a:cs typeface="Aharoni" panose="02010803020104030203" pitchFamily="2" charset="-79"/>
-                </a:rPr>
-                <a:t>$</a:t>
+                <a:t> $</a:t>
               </a:r>
               <a:r>
                 <a:rPr lang="es-ES" sz="1600" dirty="0" err="1">
@@ -28227,15 +28102,6 @@
                 </a:rPr>
                 <a:t>TYPE</a:t>
               </a:r>
-              <a:endParaRPr lang="es-ES" sz="1200" dirty="0">
-                <a:solidFill>
-                  <a:schemeClr val="tx1">
-                    <a:lumMod val="75000"/>
-                    <a:lumOff val="25000"/>
-                  </a:schemeClr>
-                </a:solidFill>
-                <a:latin typeface="Arial Rounded MT Bold" panose="020F0704030504030204" pitchFamily="34" charset="0"/>
-              </a:endParaRPr>
             </a:p>
           </p:txBody>
         </p:sp>
@@ -29060,7 +28926,7 @@
                   <a:latin typeface="+mj-lt"/>
                   <a:cs typeface="Aharoni" panose="02010803020104030203" pitchFamily="2" charset="-79"/>
                 </a:rPr>
-                <a:t>sugest_dish</a:t>
+                <a:t>suggest_dish</a:t>
               </a:r>
               <a:r>
                 <a:rPr lang="es-ES" sz="1600" dirty="0" smtClean="0">
@@ -29073,7 +28939,20 @@
                   <a:latin typeface="+mj-lt"/>
                   <a:cs typeface="Aharoni" panose="02010803020104030203" pitchFamily="2" charset="-79"/>
                 </a:rPr>
-                <a:t> = False</a:t>
+                <a:t> </a:t>
+              </a:r>
+              <a:r>
+                <a:rPr lang="es-ES" sz="1600" dirty="0" smtClean="0">
+                  <a:solidFill>
+                    <a:schemeClr val="tx1">
+                      <a:lumMod val="50000"/>
+                      <a:lumOff val="50000"/>
+                    </a:schemeClr>
+                  </a:solidFill>
+                  <a:latin typeface="+mj-lt"/>
+                  <a:cs typeface="Aharoni" panose="02010803020104030203" pitchFamily="2" charset="-79"/>
+                </a:rPr>
+                <a:t>= False</a:t>
               </a:r>
               <a:endParaRPr lang="es-ES" sz="1600" dirty="0">
                 <a:solidFill>
@@ -29530,20 +29409,7 @@
                   <a:latin typeface="+mj-lt"/>
                   <a:cs typeface="Aharoni" panose="02010803020104030203" pitchFamily="2" charset="-79"/>
                 </a:rPr>
-                <a:t>y</a:t>
-              </a:r>
-              <a:r>
-                <a:rPr lang="es-ES" sz="1600" dirty="0" err="1">
-                  <a:solidFill>
-                    <a:schemeClr val="tx1">
-                      <a:lumMod val="50000"/>
-                      <a:lumOff val="50000"/>
-                    </a:schemeClr>
-                  </a:solidFill>
-                  <a:latin typeface="+mj-lt"/>
-                  <a:cs typeface="Aharoni" panose="02010803020104030203" pitchFamily="2" charset="-79"/>
-                </a:rPr>
-                <a:t>um_sugest</a:t>
+                <a:t>yum_sugest</a:t>
               </a:r>
               <a:r>
                 <a:rPr lang="es-ES" sz="1600" dirty="0">
@@ -29625,17 +29491,7 @@
                   <a:latin typeface="+mj-lt"/>
                   <a:cs typeface="Aharoni" panose="02010803020104030203" pitchFamily="2" charset="-79"/>
                 </a:rPr>
-                <a:t> </a:t>
-              </a:r>
-              <a:r>
-                <a:rPr lang="es-ES" b="1" dirty="0" smtClean="0">
-                  <a:solidFill>
-                    <a:srgbClr val="FF3300"/>
-                  </a:solidFill>
-                  <a:latin typeface="+mj-lt"/>
-                  <a:cs typeface="Aharoni" panose="02010803020104030203" pitchFamily="2" charset="-79"/>
-                </a:rPr>
-                <a:t>/ </a:t>
+                <a:t> / </a:t>
               </a:r>
               <a:r>
                 <a:rPr lang="es-ES" b="1" dirty="0" err="1" smtClean="0">
@@ -29760,7 +29616,7 @@
           <p:spPr>
             <a:xfrm>
               <a:off x="9858878" y="3231698"/>
-              <a:ext cx="1819344" cy="584775"/>
+              <a:ext cx="1917513" cy="584775"/>
             </a:xfrm>
             <a:prstGeom prst="rect">
               <a:avLst/>
@@ -29835,7 +29691,7 @@
                   <a:latin typeface="+mj-lt"/>
                   <a:cs typeface="Aharoni" panose="02010803020104030203" pitchFamily="2" charset="-79"/>
                 </a:rPr>
-                <a:t>sugest_dish</a:t>
+                <a:t>suggest_dish</a:t>
               </a:r>
               <a:r>
                 <a:rPr lang="es-ES" sz="1600" dirty="0" smtClean="0">
@@ -29863,16 +29719,6 @@
                 </a:rPr>
                 <a:t>= True</a:t>
               </a:r>
-              <a:endParaRPr lang="es-ES" sz="1600" dirty="0">
-                <a:solidFill>
-                  <a:schemeClr val="tx1">
-                    <a:lumMod val="50000"/>
-                    <a:lumOff val="50000"/>
-                  </a:schemeClr>
-                </a:solidFill>
-                <a:latin typeface="+mj-lt"/>
-                <a:cs typeface="Aharoni" panose="02010803020104030203" pitchFamily="2" charset="-79"/>
-              </a:endParaRPr>
             </a:p>
           </p:txBody>
         </p:sp>
@@ -30437,15 +30283,6 @@
                 </a:rPr>
                 <a:t>TIME</a:t>
               </a:r>
-              <a:endParaRPr lang="es-ES" sz="1200" dirty="0" smtClean="0">
-                <a:solidFill>
-                  <a:schemeClr val="tx1">
-                    <a:lumMod val="75000"/>
-                    <a:lumOff val="25000"/>
-                  </a:schemeClr>
-                </a:solidFill>
-                <a:latin typeface="Arial Rounded MT Bold" panose="020F0704030504030204" pitchFamily="34" charset="0"/>
-              </a:endParaRPr>
             </a:p>
           </p:txBody>
         </p:sp>
@@ -30521,13 +30358,6 @@
                 </a:rPr>
                 <a:t>Positive</a:t>
               </a:r>
-              <a:endParaRPr lang="es-ES" b="1" dirty="0" smtClean="0">
-                <a:solidFill>
-                  <a:srgbClr val="FF3300"/>
-                </a:solidFill>
-                <a:latin typeface="+mj-lt"/>
-                <a:cs typeface="Aharoni" panose="02010803020104030203" pitchFamily="2" charset="-79"/>
-              </a:endParaRPr>
             </a:p>
           </p:txBody>
         </p:sp>
@@ -30750,20 +30580,7 @@
                   <a:latin typeface="+mj-lt"/>
                   <a:cs typeface="Aharoni" panose="02010803020104030203" pitchFamily="2" charset="-79"/>
                 </a:rPr>
-                <a:t>y</a:t>
-              </a:r>
-              <a:r>
-                <a:rPr lang="es-ES" sz="1600" dirty="0" err="1">
-                  <a:solidFill>
-                    <a:schemeClr val="tx1">
-                      <a:lumMod val="50000"/>
-                      <a:lumOff val="50000"/>
-                    </a:schemeClr>
-                  </a:solidFill>
-                  <a:latin typeface="+mj-lt"/>
-                  <a:cs typeface="Aharoni" panose="02010803020104030203" pitchFamily="2" charset="-79"/>
-                </a:rPr>
-                <a:t>um_sugest</a:t>
+                <a:t>yum_sugest</a:t>
               </a:r>
               <a:r>
                 <a:rPr lang="es-ES" sz="1600" dirty="0">
@@ -30809,6 +30626,59 @@
     <p:extLst>
       <p:ext uri="{BB962C8B-B14F-4D97-AF65-F5344CB8AC3E}">
         <p14:creationId xmlns:p14="http://schemas.microsoft.com/office/powerpoint/2010/main" val="1009782372"/>
+      </p:ext>
+    </p:extLst>
+  </p:cSld>
+  <p:clrMapOvr>
+    <a:masterClrMapping/>
+  </p:clrMapOvr>
+</p:sld>
+</file>
+
+<file path=ppt/slides/slide23.xml><?xml version="1.0" encoding="utf-8"?>
+<p:sld xmlns:a="http://schemas.openxmlformats.org/drawingml/2006/main" xmlns:r="http://schemas.openxmlformats.org/officeDocument/2006/relationships" xmlns:p="http://schemas.openxmlformats.org/presentationml/2006/main">
+  <p:cSld>
+    <p:spTree>
+      <p:nvGrpSpPr>
+        <p:cNvPr id="1" name=""/>
+        <p:cNvGrpSpPr/>
+        <p:nvPr/>
+      </p:nvGrpSpPr>
+      <p:grpSpPr>
+        <a:xfrm>
+          <a:off x="0" y="0"/>
+          <a:ext cx="0" cy="0"/>
+          <a:chOff x="0" y="0"/>
+          <a:chExt cx="0" cy="0"/>
+        </a:xfrm>
+      </p:grpSpPr>
+      <p:pic>
+        <p:nvPicPr>
+          <p:cNvPr id="2" name="Imagen 1"/>
+          <p:cNvPicPr>
+            <a:picLocks noChangeAspect="1"/>
+          </p:cNvPicPr>
+          <p:nvPr/>
+        </p:nvPicPr>
+        <p:blipFill rotWithShape="1">
+          <a:blip r:embed="rId2"/>
+          <a:srcRect l="75156" t="15278" r="1250" b="10139"/>
+          <a:stretch/>
+        </p:blipFill>
+        <p:spPr>
+          <a:xfrm>
+            <a:off x="3200400" y="118274"/>
+            <a:ext cx="3581400" cy="6368251"/>
+          </a:xfrm>
+          <a:prstGeom prst="rect">
+            <a:avLst/>
+          </a:prstGeom>
+        </p:spPr>
+      </p:pic>
+    </p:spTree>
+    <p:extLst>
+      <p:ext uri="{BB962C8B-B14F-4D97-AF65-F5344CB8AC3E}">
+        <p14:creationId xmlns:p14="http://schemas.microsoft.com/office/powerpoint/2010/main" val="3224245191"/>
       </p:ext>
     </p:extLst>
   </p:cSld>

</xml_diff>

<commit_message>
avances en la memoria
</commit_message>
<xml_diff>
--- a/memoria/images/Presentación1.pptx
+++ b/memoria/images/Presentación1.pptx
@@ -28,6 +28,10 @@
     <p:sldId id="277" r:id="rId22"/>
     <p:sldId id="275" r:id="rId23"/>
     <p:sldId id="278" r:id="rId24"/>
+    <p:sldId id="279" r:id="rId25"/>
+    <p:sldId id="280" r:id="rId26"/>
+    <p:sldId id="281" r:id="rId27"/>
+    <p:sldId id="282" r:id="rId28"/>
   </p:sldIdLst>
   <p:sldSz cx="12192000" cy="6858000"/>
   <p:notesSz cx="6858000" cy="9144000"/>
@@ -277,7 +281,7 @@
           <a:p>
             <a:fld id="{9C28449B-7E7F-4B22-B31C-7455ACE0523B}" type="datetimeFigureOut">
               <a:rPr lang="es-ES" smtClean="0"/>
-              <a:t>28/12/2017</a:t>
+              <a:t>06/01/2018</a:t>
             </a:fld>
             <a:endParaRPr lang="es-ES"/>
           </a:p>
@@ -447,7 +451,7 @@
           <a:p>
             <a:fld id="{9C28449B-7E7F-4B22-B31C-7455ACE0523B}" type="datetimeFigureOut">
               <a:rPr lang="es-ES" smtClean="0"/>
-              <a:t>28/12/2017</a:t>
+              <a:t>06/01/2018</a:t>
             </a:fld>
             <a:endParaRPr lang="es-ES"/>
           </a:p>
@@ -627,7 +631,7 @@
           <a:p>
             <a:fld id="{9C28449B-7E7F-4B22-B31C-7455ACE0523B}" type="datetimeFigureOut">
               <a:rPr lang="es-ES" smtClean="0"/>
-              <a:t>28/12/2017</a:t>
+              <a:t>06/01/2018</a:t>
             </a:fld>
             <a:endParaRPr lang="es-ES"/>
           </a:p>
@@ -797,7 +801,7 @@
           <a:p>
             <a:fld id="{9C28449B-7E7F-4B22-B31C-7455ACE0523B}" type="datetimeFigureOut">
               <a:rPr lang="es-ES" smtClean="0"/>
-              <a:t>28/12/2017</a:t>
+              <a:t>06/01/2018</a:t>
             </a:fld>
             <a:endParaRPr lang="es-ES"/>
           </a:p>
@@ -1043,7 +1047,7 @@
           <a:p>
             <a:fld id="{9C28449B-7E7F-4B22-B31C-7455ACE0523B}" type="datetimeFigureOut">
               <a:rPr lang="es-ES" smtClean="0"/>
-              <a:t>28/12/2017</a:t>
+              <a:t>06/01/2018</a:t>
             </a:fld>
             <a:endParaRPr lang="es-ES"/>
           </a:p>
@@ -1275,7 +1279,7 @@
           <a:p>
             <a:fld id="{9C28449B-7E7F-4B22-B31C-7455ACE0523B}" type="datetimeFigureOut">
               <a:rPr lang="es-ES" smtClean="0"/>
-              <a:t>28/12/2017</a:t>
+              <a:t>06/01/2018</a:t>
             </a:fld>
             <a:endParaRPr lang="es-ES"/>
           </a:p>
@@ -1642,7 +1646,7 @@
           <a:p>
             <a:fld id="{9C28449B-7E7F-4B22-B31C-7455ACE0523B}" type="datetimeFigureOut">
               <a:rPr lang="es-ES" smtClean="0"/>
-              <a:t>28/12/2017</a:t>
+              <a:t>06/01/2018</a:t>
             </a:fld>
             <a:endParaRPr lang="es-ES"/>
           </a:p>
@@ -1760,7 +1764,7 @@
           <a:p>
             <a:fld id="{9C28449B-7E7F-4B22-B31C-7455ACE0523B}" type="datetimeFigureOut">
               <a:rPr lang="es-ES" smtClean="0"/>
-              <a:t>28/12/2017</a:t>
+              <a:t>06/01/2018</a:t>
             </a:fld>
             <a:endParaRPr lang="es-ES"/>
           </a:p>
@@ -1855,7 +1859,7 @@
           <a:p>
             <a:fld id="{9C28449B-7E7F-4B22-B31C-7455ACE0523B}" type="datetimeFigureOut">
               <a:rPr lang="es-ES" smtClean="0"/>
-              <a:t>28/12/2017</a:t>
+              <a:t>06/01/2018</a:t>
             </a:fld>
             <a:endParaRPr lang="es-ES"/>
           </a:p>
@@ -2132,7 +2136,7 @@
           <a:p>
             <a:fld id="{9C28449B-7E7F-4B22-B31C-7455ACE0523B}" type="datetimeFigureOut">
               <a:rPr lang="es-ES" smtClean="0"/>
-              <a:t>28/12/2017</a:t>
+              <a:t>06/01/2018</a:t>
             </a:fld>
             <a:endParaRPr lang="es-ES"/>
           </a:p>
@@ -2385,7 +2389,7 @@
           <a:p>
             <a:fld id="{9C28449B-7E7F-4B22-B31C-7455ACE0523B}" type="datetimeFigureOut">
               <a:rPr lang="es-ES" smtClean="0"/>
-              <a:t>28/12/2017</a:t>
+              <a:t>06/01/2018</a:t>
             </a:fld>
             <a:endParaRPr lang="es-ES"/>
           </a:p>
@@ -2598,7 +2602,7 @@
           <a:p>
             <a:fld id="{9C28449B-7E7F-4B22-B31C-7455ACE0523B}" type="datetimeFigureOut">
               <a:rPr lang="es-ES" smtClean="0"/>
-              <a:t>28/12/2017</a:t>
+              <a:t>06/01/2018</a:t>
             </a:fld>
             <a:endParaRPr lang="es-ES"/>
           </a:p>
@@ -28939,20 +28943,7 @@
                   <a:latin typeface="+mj-lt"/>
                   <a:cs typeface="Aharoni" panose="02010803020104030203" pitchFamily="2" charset="-79"/>
                 </a:rPr>
-                <a:t> </a:t>
-              </a:r>
-              <a:r>
-                <a:rPr lang="es-ES" sz="1600" dirty="0" smtClean="0">
-                  <a:solidFill>
-                    <a:schemeClr val="tx1">
-                      <a:lumMod val="50000"/>
-                      <a:lumOff val="50000"/>
-                    </a:schemeClr>
-                  </a:solidFill>
-                  <a:latin typeface="+mj-lt"/>
-                  <a:cs typeface="Aharoni" panose="02010803020104030203" pitchFamily="2" charset="-79"/>
-                </a:rPr>
-                <a:t>= False</a:t>
+                <a:t> = False</a:t>
               </a:r>
               <a:endParaRPr lang="es-ES" sz="1600" dirty="0">
                 <a:solidFill>
@@ -30667,8 +30658,153 @@
         </p:blipFill>
         <p:spPr>
           <a:xfrm>
-            <a:off x="3200400" y="118274"/>
+            <a:off x="8036011" y="233604"/>
             <a:ext cx="3581400" cy="6368251"/>
+          </a:xfrm>
+          <a:prstGeom prst="rect">
+            <a:avLst/>
+          </a:prstGeom>
+        </p:spPr>
+      </p:pic>
+      <p:grpSp>
+        <p:nvGrpSpPr>
+          <p:cNvPr id="5" name="Grupo 4"/>
+          <p:cNvGrpSpPr/>
+          <p:nvPr/>
+        </p:nvGrpSpPr>
+        <p:grpSpPr>
+          <a:xfrm>
+            <a:off x="873537" y="1304658"/>
+            <a:ext cx="3810000" cy="3810000"/>
+            <a:chOff x="121507" y="1219200"/>
+            <a:chExt cx="3810000" cy="3810000"/>
+          </a:xfrm>
+        </p:grpSpPr>
+        <p:pic>
+          <p:nvPicPr>
+            <p:cNvPr id="3" name="Imagen 2"/>
+            <p:cNvPicPr>
+              <a:picLocks noChangeAspect="1"/>
+            </p:cNvPicPr>
+            <p:nvPr/>
+          </p:nvPicPr>
+          <p:blipFill>
+            <a:blip r:embed="rId3">
+              <a:extLst>
+                <a:ext uri="{28A0092B-C50C-407E-A947-70E740481C1C}">
+                  <a14:useLocalDpi xmlns:a14="http://schemas.microsoft.com/office/drawing/2010/main" val="0"/>
+                </a:ext>
+              </a:extLst>
+            </a:blip>
+            <a:stretch>
+              <a:fillRect/>
+            </a:stretch>
+          </p:blipFill>
+          <p:spPr>
+            <a:xfrm>
+              <a:off x="121507" y="1219200"/>
+              <a:ext cx="3810000" cy="3810000"/>
+            </a:xfrm>
+            <a:prstGeom prst="ellipse">
+              <a:avLst/>
+            </a:prstGeom>
+          </p:spPr>
+        </p:pic>
+        <p:sp>
+          <p:nvSpPr>
+            <p:cNvPr id="4" name="Elipse 3"/>
+            <p:cNvSpPr/>
+            <p:nvPr/>
+          </p:nvSpPr>
+          <p:spPr>
+            <a:xfrm>
+              <a:off x="121508" y="1219200"/>
+              <a:ext cx="3809999" cy="3810000"/>
+            </a:xfrm>
+            <a:prstGeom prst="ellipse">
+              <a:avLst/>
+            </a:prstGeom>
+            <a:noFill/>
+            <a:ln w="76200">
+              <a:solidFill>
+                <a:srgbClr val="46DACC"/>
+              </a:solidFill>
+            </a:ln>
+          </p:spPr>
+          <p:style>
+            <a:lnRef idx="2">
+              <a:schemeClr val="accent1">
+                <a:shade val="50000"/>
+              </a:schemeClr>
+            </a:lnRef>
+            <a:fillRef idx="1">
+              <a:schemeClr val="accent1"/>
+            </a:fillRef>
+            <a:effectRef idx="0">
+              <a:schemeClr val="accent1"/>
+            </a:effectRef>
+            <a:fontRef idx="minor">
+              <a:schemeClr val="lt1"/>
+            </a:fontRef>
+          </p:style>
+          <p:txBody>
+            <a:bodyPr rtlCol="0" anchor="ctr"/>
+            <a:lstStyle/>
+            <a:p>
+              <a:pPr algn="ctr"/>
+              <a:endParaRPr lang="es-ES"/>
+            </a:p>
+          </p:txBody>
+        </p:sp>
+      </p:grpSp>
+    </p:spTree>
+    <p:extLst>
+      <p:ext uri="{BB962C8B-B14F-4D97-AF65-F5344CB8AC3E}">
+        <p14:creationId xmlns:p14="http://schemas.microsoft.com/office/powerpoint/2010/main" val="3224245191"/>
+      </p:ext>
+    </p:extLst>
+  </p:cSld>
+  <p:clrMapOvr>
+    <a:masterClrMapping/>
+  </p:clrMapOvr>
+</p:sld>
+</file>
+
+<file path=ppt/slides/slide24.xml><?xml version="1.0" encoding="utf-8"?>
+<p:sld xmlns:a="http://schemas.openxmlformats.org/drawingml/2006/main" xmlns:r="http://schemas.openxmlformats.org/officeDocument/2006/relationships" xmlns:p="http://schemas.openxmlformats.org/presentationml/2006/main">
+  <p:cSld>
+    <p:spTree>
+      <p:nvGrpSpPr>
+        <p:cNvPr id="1" name=""/>
+        <p:cNvGrpSpPr/>
+        <p:nvPr/>
+      </p:nvGrpSpPr>
+      <p:grpSpPr>
+        <a:xfrm>
+          <a:off x="0" y="0"/>
+          <a:ext cx="0" cy="0"/>
+          <a:chOff x="0" y="0"/>
+          <a:chExt cx="0" cy="0"/>
+        </a:xfrm>
+      </p:grpSpPr>
+      <p:pic>
+        <p:nvPicPr>
+          <p:cNvPr id="6" name="Imagen 5"/>
+          <p:cNvPicPr>
+            <a:picLocks noChangeAspect="1"/>
+          </p:cNvPicPr>
+          <p:nvPr/>
+        </p:nvPicPr>
+        <p:blipFill>
+          <a:blip r:embed="rId2"/>
+          <a:stretch>
+            <a:fillRect/>
+          </a:stretch>
+        </p:blipFill>
+        <p:spPr>
+          <a:xfrm>
+            <a:off x="1609033" y="583776"/>
+            <a:ext cx="10260169" cy="5768528"/>
           </a:xfrm>
           <a:prstGeom prst="rect">
             <a:avLst/>
@@ -30678,7 +30814,3582 @@
     </p:spTree>
     <p:extLst>
       <p:ext uri="{BB962C8B-B14F-4D97-AF65-F5344CB8AC3E}">
-        <p14:creationId xmlns:p14="http://schemas.microsoft.com/office/powerpoint/2010/main" val="3224245191"/>
+        <p14:creationId xmlns:p14="http://schemas.microsoft.com/office/powerpoint/2010/main" val="1641879665"/>
+      </p:ext>
+    </p:extLst>
+  </p:cSld>
+  <p:clrMapOvr>
+    <a:masterClrMapping/>
+  </p:clrMapOvr>
+</p:sld>
+</file>
+
+<file path=ppt/slides/slide25.xml><?xml version="1.0" encoding="utf-8"?>
+<p:sld xmlns:a="http://schemas.openxmlformats.org/drawingml/2006/main" xmlns:r="http://schemas.openxmlformats.org/officeDocument/2006/relationships" xmlns:p="http://schemas.openxmlformats.org/presentationml/2006/main">
+  <p:cSld>
+    <p:spTree>
+      <p:nvGrpSpPr>
+        <p:cNvPr id="1" name=""/>
+        <p:cNvGrpSpPr/>
+        <p:nvPr/>
+      </p:nvGrpSpPr>
+      <p:grpSpPr>
+        <a:xfrm>
+          <a:off x="0" y="0"/>
+          <a:ext cx="0" cy="0"/>
+          <a:chOff x="0" y="0"/>
+          <a:chExt cx="0" cy="0"/>
+        </a:xfrm>
+      </p:grpSpPr>
+      <p:sp>
+        <p:nvSpPr>
+          <p:cNvPr id="2" name="CuadroTexto 1"/>
+          <p:cNvSpPr txBox="1"/>
+          <p:nvPr/>
+        </p:nvSpPr>
+        <p:spPr>
+          <a:xfrm>
+            <a:off x="2406528" y="766070"/>
+            <a:ext cx="8076313" cy="5201424"/>
+          </a:xfrm>
+          <a:prstGeom prst="rect">
+            <a:avLst/>
+          </a:prstGeom>
+          <a:noFill/>
+        </p:spPr>
+        <p:txBody>
+          <a:bodyPr wrap="none" rtlCol="0">
+            <a:spAutoFit/>
+          </a:bodyPr>
+          <a:lstStyle/>
+          <a:p>
+            <a:r>
+              <a:rPr lang="es-ES" sz="16600" b="1" dirty="0" smtClean="0">
+                <a:solidFill>
+                  <a:srgbClr val="FF0000"/>
+                </a:solidFill>
+              </a:rPr>
+              <a:t>ULTIMA</a:t>
+            </a:r>
+          </a:p>
+          <a:p>
+            <a:r>
+              <a:rPr lang="es-ES" sz="16600" b="1" dirty="0" smtClean="0">
+                <a:solidFill>
+                  <a:srgbClr val="FF0000"/>
+                </a:solidFill>
+              </a:rPr>
+              <a:t>VERSIÓN</a:t>
+            </a:r>
+            <a:endParaRPr lang="es-ES" sz="16600" b="1" dirty="0">
+              <a:solidFill>
+                <a:srgbClr val="FF0000"/>
+              </a:solidFill>
+            </a:endParaRPr>
+          </a:p>
+        </p:txBody>
+      </p:sp>
+    </p:spTree>
+    <p:extLst>
+      <p:ext uri="{BB962C8B-B14F-4D97-AF65-F5344CB8AC3E}">
+        <p14:creationId xmlns:p14="http://schemas.microsoft.com/office/powerpoint/2010/main" val="305695645"/>
+      </p:ext>
+    </p:extLst>
+  </p:cSld>
+  <p:clrMapOvr>
+    <a:masterClrMapping/>
+  </p:clrMapOvr>
+</p:sld>
+</file>
+
+<file path=ppt/slides/slide26.xml><?xml version="1.0" encoding="utf-8"?>
+<p:sld xmlns:a="http://schemas.openxmlformats.org/drawingml/2006/main" xmlns:r="http://schemas.openxmlformats.org/officeDocument/2006/relationships" xmlns:p="http://schemas.openxmlformats.org/presentationml/2006/main">
+  <p:cSld>
+    <p:spTree>
+      <p:nvGrpSpPr>
+        <p:cNvPr id="1" name=""/>
+        <p:cNvGrpSpPr/>
+        <p:nvPr/>
+      </p:nvGrpSpPr>
+      <p:grpSpPr>
+        <a:xfrm>
+          <a:off x="0" y="0"/>
+          <a:ext cx="0" cy="0"/>
+          <a:chOff x="0" y="0"/>
+          <a:chExt cx="0" cy="0"/>
+        </a:xfrm>
+      </p:grpSpPr>
+      <p:grpSp>
+        <p:nvGrpSpPr>
+          <p:cNvPr id="97" name="Grupo 96"/>
+          <p:cNvGrpSpPr/>
+          <p:nvPr/>
+        </p:nvGrpSpPr>
+        <p:grpSpPr>
+          <a:xfrm>
+            <a:off x="-1925053" y="930442"/>
+            <a:ext cx="17357558" cy="7603958"/>
+            <a:chOff x="-1925053" y="930442"/>
+            <a:chExt cx="17357558" cy="7603958"/>
+          </a:xfrm>
+        </p:grpSpPr>
+        <p:grpSp>
+          <p:nvGrpSpPr>
+            <p:cNvPr id="89" name="Grupo 88"/>
+            <p:cNvGrpSpPr/>
+            <p:nvPr/>
+          </p:nvGrpSpPr>
+          <p:grpSpPr>
+            <a:xfrm>
+              <a:off x="-1925053" y="930442"/>
+              <a:ext cx="17357558" cy="7603958"/>
+              <a:chOff x="-1925053" y="930442"/>
+              <a:chExt cx="17357558" cy="7603958"/>
+            </a:xfrm>
+          </p:grpSpPr>
+          <p:sp>
+            <p:nvSpPr>
+              <p:cNvPr id="82" name="Rectángulo 81"/>
+              <p:cNvSpPr/>
+              <p:nvPr/>
+            </p:nvSpPr>
+            <p:spPr>
+              <a:xfrm>
+                <a:off x="-1925053" y="930442"/>
+                <a:ext cx="17357558" cy="7603958"/>
+              </a:xfrm>
+              <a:prstGeom prst="rect">
+                <a:avLst/>
+              </a:prstGeom>
+              <a:solidFill>
+                <a:schemeClr val="bg1"/>
+              </a:solidFill>
+              <a:ln>
+                <a:noFill/>
+              </a:ln>
+            </p:spPr>
+            <p:style>
+              <a:lnRef idx="2">
+                <a:schemeClr val="accent1">
+                  <a:shade val="50000"/>
+                </a:schemeClr>
+              </a:lnRef>
+              <a:fillRef idx="1">
+                <a:schemeClr val="accent1"/>
+              </a:fillRef>
+              <a:effectRef idx="0">
+                <a:schemeClr val="accent1"/>
+              </a:effectRef>
+              <a:fontRef idx="minor">
+                <a:schemeClr val="lt1"/>
+              </a:fontRef>
+            </p:style>
+            <p:txBody>
+              <a:bodyPr rtlCol="0" anchor="ctr"/>
+              <a:lstStyle/>
+              <a:p>
+                <a:pPr algn="ctr"/>
+                <a:endParaRPr lang="es-ES"/>
+              </a:p>
+            </p:txBody>
+          </p:sp>
+          <p:sp>
+            <p:nvSpPr>
+              <p:cNvPr id="5" name="Decisión 4"/>
+              <p:cNvSpPr/>
+              <p:nvPr/>
+            </p:nvSpPr>
+            <p:spPr>
+              <a:xfrm>
+                <a:off x="2293372" y="1724085"/>
+                <a:ext cx="2205200" cy="1581874"/>
+              </a:xfrm>
+              <a:prstGeom prst="flowChartDecision">
+                <a:avLst/>
+              </a:prstGeom>
+              <a:noFill/>
+              <a:ln w="38100">
+                <a:solidFill>
+                  <a:srgbClr val="46DACC"/>
+                </a:solidFill>
+                <a:prstDash val="sysDot"/>
+              </a:ln>
+            </p:spPr>
+            <p:style>
+              <a:lnRef idx="2">
+                <a:schemeClr val="accent1">
+                  <a:shade val="50000"/>
+                </a:schemeClr>
+              </a:lnRef>
+              <a:fillRef idx="1">
+                <a:schemeClr val="accent1"/>
+              </a:fillRef>
+              <a:effectRef idx="0">
+                <a:schemeClr val="accent1"/>
+              </a:effectRef>
+              <a:fontRef idx="minor">
+                <a:schemeClr val="lt1"/>
+              </a:fontRef>
+            </p:style>
+            <p:txBody>
+              <a:bodyPr lIns="0" tIns="0" rIns="0" bIns="0" rtlCol="0" anchor="ctr"/>
+              <a:lstStyle/>
+              <a:p>
+                <a:pPr algn="ctr"/>
+                <a:r>
+                  <a:rPr lang="es-ES" sz="1200" dirty="0" smtClean="0">
+                    <a:solidFill>
+                      <a:schemeClr val="tx1">
+                        <a:lumMod val="65000"/>
+                        <a:lumOff val="35000"/>
+                      </a:schemeClr>
+                    </a:solidFill>
+                    <a:latin typeface="Arial Rounded MT Bold" panose="020F0704030504030204" pitchFamily="34" charset="0"/>
+                  </a:rPr>
+                  <a:t>CHECK</a:t>
+                </a:r>
+              </a:p>
+              <a:p>
+                <a:pPr algn="ctr"/>
+                <a:r>
+                  <a:rPr lang="es-ES" sz="1200" dirty="0" smtClean="0">
+                    <a:solidFill>
+                      <a:schemeClr val="tx1">
+                        <a:lumMod val="65000"/>
+                        <a:lumOff val="35000"/>
+                      </a:schemeClr>
+                    </a:solidFill>
+                    <a:latin typeface="Arial Rounded MT Bold" panose="020F0704030504030204" pitchFamily="34" charset="0"/>
+                  </a:rPr>
+                  <a:t>#AVAILABLE_</a:t>
+                </a:r>
+              </a:p>
+              <a:p>
+                <a:pPr algn="ctr"/>
+                <a:r>
+                  <a:rPr lang="es-ES" sz="1200" dirty="0" smtClean="0">
+                    <a:solidFill>
+                      <a:schemeClr val="tx1">
+                        <a:lumMod val="65000"/>
+                        <a:lumOff val="35000"/>
+                      </a:schemeClr>
+                    </a:solidFill>
+                    <a:latin typeface="Arial Rounded MT Bold" panose="020F0704030504030204" pitchFamily="34" charset="0"/>
+                  </a:rPr>
+                  <a:t>INGREDIENTS</a:t>
+                </a:r>
+                <a:endParaRPr lang="es-ES" sz="1200" dirty="0">
+                  <a:solidFill>
+                    <a:schemeClr val="tx1">
+                      <a:lumMod val="65000"/>
+                      <a:lumOff val="35000"/>
+                    </a:schemeClr>
+                  </a:solidFill>
+                  <a:latin typeface="Arial Rounded MT Bold" panose="020F0704030504030204" pitchFamily="34" charset="0"/>
+                </a:endParaRPr>
+              </a:p>
+            </p:txBody>
+          </p:sp>
+          <p:sp>
+            <p:nvSpPr>
+              <p:cNvPr id="7" name="Rectángulo redondeado 6"/>
+              <p:cNvSpPr/>
+              <p:nvPr/>
+            </p:nvSpPr>
+            <p:spPr>
+              <a:xfrm>
+                <a:off x="10177109" y="1967181"/>
+                <a:ext cx="1440000" cy="1080000"/>
+              </a:xfrm>
+              <a:prstGeom prst="roundRect">
+                <a:avLst/>
+              </a:prstGeom>
+              <a:noFill/>
+              <a:ln w="38100">
+                <a:solidFill>
+                  <a:srgbClr val="FFC000"/>
+                </a:solidFill>
+              </a:ln>
+            </p:spPr>
+            <p:style>
+              <a:lnRef idx="2">
+                <a:schemeClr val="accent1">
+                  <a:shade val="50000"/>
+                </a:schemeClr>
+              </a:lnRef>
+              <a:fillRef idx="1">
+                <a:schemeClr val="accent1"/>
+              </a:fillRef>
+              <a:effectRef idx="0">
+                <a:schemeClr val="accent1"/>
+              </a:effectRef>
+              <a:fontRef idx="minor">
+                <a:schemeClr val="lt1"/>
+              </a:fontRef>
+            </p:style>
+            <p:txBody>
+              <a:bodyPr lIns="0" tIns="0" rIns="0" bIns="0" rtlCol="0" anchor="ctr"/>
+              <a:lstStyle/>
+              <a:p>
+                <a:pPr algn="ctr"/>
+                <a:r>
+                  <a:rPr lang="es-ES" sz="1200" dirty="0" smtClean="0">
+                    <a:solidFill>
+                      <a:schemeClr val="tx1">
+                        <a:lumMod val="75000"/>
+                        <a:lumOff val="25000"/>
+                      </a:schemeClr>
+                    </a:solidFill>
+                    <a:latin typeface="Arial Rounded MT Bold" panose="020F0704030504030204" pitchFamily="34" charset="0"/>
+                  </a:rPr>
+                  <a:t>GET</a:t>
+                </a:r>
+              </a:p>
+              <a:p>
+                <a:pPr algn="ctr"/>
+                <a:r>
+                  <a:rPr lang="es-ES" sz="1200" dirty="0" smtClean="0">
+                    <a:solidFill>
+                      <a:schemeClr val="tx1">
+                        <a:lumMod val="75000"/>
+                        <a:lumOff val="25000"/>
+                      </a:schemeClr>
+                    </a:solidFill>
+                    <a:latin typeface="Arial Rounded MT Bold" panose="020F0704030504030204" pitchFamily="34" charset="0"/>
+                  </a:rPr>
+                  <a:t>INGREDIENTS</a:t>
+                </a:r>
+              </a:p>
+              <a:p>
+                <a:pPr algn="ctr"/>
+                <a:r>
+                  <a:rPr lang="es-ES" sz="1200" dirty="0" smtClean="0">
+                    <a:solidFill>
+                      <a:schemeClr val="tx1">
+                        <a:lumMod val="75000"/>
+                        <a:lumOff val="25000"/>
+                      </a:schemeClr>
+                    </a:solidFill>
+                    <a:latin typeface="Arial Rounded MT Bold" panose="020F0704030504030204" pitchFamily="34" charset="0"/>
+                  </a:rPr>
+                  <a:t>INFORMATION</a:t>
+                </a:r>
+                <a:endParaRPr lang="es-ES" sz="1200" dirty="0">
+                  <a:solidFill>
+                    <a:schemeClr val="tx1">
+                      <a:lumMod val="75000"/>
+                      <a:lumOff val="25000"/>
+                    </a:schemeClr>
+                  </a:solidFill>
+                  <a:latin typeface="Arial Rounded MT Bold" panose="020F0704030504030204" pitchFamily="34" charset="0"/>
+                </a:endParaRPr>
+              </a:p>
+            </p:txBody>
+          </p:sp>
+          <p:sp>
+            <p:nvSpPr>
+              <p:cNvPr id="10" name="Rectángulo redondeado 9"/>
+              <p:cNvSpPr/>
+              <p:nvPr/>
+            </p:nvSpPr>
+            <p:spPr>
+              <a:xfrm>
+                <a:off x="10305734" y="6122395"/>
+                <a:ext cx="1440000" cy="1080000"/>
+              </a:xfrm>
+              <a:prstGeom prst="roundRect">
+                <a:avLst/>
+              </a:prstGeom>
+              <a:noFill/>
+              <a:ln w="38100">
+                <a:solidFill>
+                  <a:srgbClr val="FFC000"/>
+                </a:solidFill>
+              </a:ln>
+            </p:spPr>
+            <p:style>
+              <a:lnRef idx="2">
+                <a:schemeClr val="accent1">
+                  <a:shade val="50000"/>
+                </a:schemeClr>
+              </a:lnRef>
+              <a:fillRef idx="1">
+                <a:schemeClr val="accent1"/>
+              </a:fillRef>
+              <a:effectRef idx="0">
+                <a:schemeClr val="accent1"/>
+              </a:effectRef>
+              <a:fontRef idx="minor">
+                <a:schemeClr val="lt1"/>
+              </a:fontRef>
+            </p:style>
+            <p:txBody>
+              <a:bodyPr lIns="0" tIns="0" rIns="0" bIns="0" rtlCol="0" anchor="ctr"/>
+              <a:lstStyle/>
+              <a:p>
+                <a:pPr algn="ctr"/>
+                <a:r>
+                  <a:rPr lang="es-ES" sz="1200" dirty="0" smtClean="0">
+                    <a:solidFill>
+                      <a:schemeClr val="tx1">
+                        <a:lumMod val="75000"/>
+                        <a:lumOff val="25000"/>
+                      </a:schemeClr>
+                    </a:solidFill>
+                    <a:latin typeface="Arial Rounded MT Bold" panose="020F0704030504030204" pitchFamily="34" charset="0"/>
+                  </a:rPr>
+                  <a:t>GET </a:t>
+                </a:r>
+              </a:p>
+              <a:p>
+                <a:pPr algn="ctr"/>
+                <a:r>
+                  <a:rPr lang="es-ES" sz="1200" dirty="0" smtClean="0">
+                    <a:solidFill>
+                      <a:schemeClr val="tx1">
+                        <a:lumMod val="75000"/>
+                        <a:lumOff val="25000"/>
+                      </a:schemeClr>
+                    </a:solidFill>
+                    <a:latin typeface="Arial Rounded MT Bold" panose="020F0704030504030204" pitchFamily="34" charset="0"/>
+                  </a:rPr>
+                  <a:t>DATABASE </a:t>
+                </a:r>
+                <a:r>
+                  <a:rPr lang="es-ES" sz="1200" dirty="0">
+                    <a:solidFill>
+                      <a:schemeClr val="tx1">
+                        <a:lumMod val="75000"/>
+                        <a:lumOff val="25000"/>
+                      </a:schemeClr>
+                    </a:solidFill>
+                    <a:latin typeface="Arial Rounded MT Bold" panose="020F0704030504030204" pitchFamily="34" charset="0"/>
+                  </a:rPr>
+                  <a:t>S</a:t>
+                </a:r>
+                <a:r>
+                  <a:rPr lang="es-ES" sz="1200" dirty="0" smtClean="0">
+                    <a:solidFill>
+                      <a:schemeClr val="tx1">
+                        <a:lumMod val="75000"/>
+                        <a:lumOff val="25000"/>
+                      </a:schemeClr>
+                    </a:solidFill>
+                    <a:latin typeface="Arial Rounded MT Bold" panose="020F0704030504030204" pitchFamily="34" charset="0"/>
+                  </a:rPr>
+                  <a:t>UMMARY</a:t>
+                </a:r>
+                <a:endParaRPr lang="es-ES" sz="1200" dirty="0">
+                  <a:solidFill>
+                    <a:schemeClr val="tx1">
+                      <a:lumMod val="75000"/>
+                      <a:lumOff val="25000"/>
+                    </a:schemeClr>
+                  </a:solidFill>
+                  <a:latin typeface="Arial Rounded MT Bold" panose="020F0704030504030204" pitchFamily="34" charset="0"/>
+                </a:endParaRPr>
+              </a:p>
+            </p:txBody>
+          </p:sp>
+          <p:cxnSp>
+            <p:nvCxnSpPr>
+              <p:cNvPr id="13" name="Conector recto de flecha 12"/>
+              <p:cNvCxnSpPr>
+                <a:stCxn id="26" idx="6"/>
+                <a:endCxn id="5" idx="1"/>
+              </p:cNvCxnSpPr>
+              <p:nvPr/>
+            </p:nvCxnSpPr>
+            <p:spPr>
+              <a:xfrm flipV="1">
+                <a:off x="-358559" y="2515022"/>
+                <a:ext cx="2651931" cy="27054"/>
+              </a:xfrm>
+              <a:prstGeom prst="straightConnector1">
+                <a:avLst/>
+              </a:prstGeom>
+              <a:ln w="28575">
+                <a:solidFill>
+                  <a:srgbClr val="7240F0"/>
+                </a:solidFill>
+                <a:tailEnd type="triangle" w="lg" len="lg"/>
+              </a:ln>
+            </p:spPr>
+            <p:style>
+              <a:lnRef idx="1">
+                <a:schemeClr val="accent1"/>
+              </a:lnRef>
+              <a:fillRef idx="0">
+                <a:schemeClr val="accent1"/>
+              </a:fillRef>
+              <a:effectRef idx="0">
+                <a:schemeClr val="accent1"/>
+              </a:effectRef>
+              <a:fontRef idx="minor">
+                <a:schemeClr val="tx1"/>
+              </a:fontRef>
+            </p:style>
+          </p:cxnSp>
+          <p:cxnSp>
+            <p:nvCxnSpPr>
+              <p:cNvPr id="15" name="Conector recto de flecha 14"/>
+              <p:cNvCxnSpPr>
+                <a:stCxn id="5" idx="3"/>
+                <a:endCxn id="24" idx="1"/>
+              </p:cNvCxnSpPr>
+              <p:nvPr/>
+            </p:nvCxnSpPr>
+            <p:spPr>
+              <a:xfrm flipV="1">
+                <a:off x="4498572" y="2506076"/>
+                <a:ext cx="1243686" cy="8946"/>
+              </a:xfrm>
+              <a:prstGeom prst="straightConnector1">
+                <a:avLst/>
+              </a:prstGeom>
+              <a:ln w="28575" cmpd="sng">
+                <a:solidFill>
+                  <a:srgbClr val="7240F0"/>
+                </a:solidFill>
+                <a:prstDash val="solid"/>
+                <a:tailEnd type="triangle" w="lg" len="lg"/>
+              </a:ln>
+            </p:spPr>
+            <p:style>
+              <a:lnRef idx="1">
+                <a:schemeClr val="accent1"/>
+              </a:lnRef>
+              <a:fillRef idx="0">
+                <a:schemeClr val="accent1"/>
+              </a:fillRef>
+              <a:effectRef idx="0">
+                <a:schemeClr val="accent1"/>
+              </a:effectRef>
+              <a:fontRef idx="minor">
+                <a:schemeClr val="tx1"/>
+              </a:fontRef>
+            </p:style>
+          </p:cxnSp>
+          <p:cxnSp>
+            <p:nvCxnSpPr>
+              <p:cNvPr id="35" name="Conector recto de flecha 34"/>
+              <p:cNvCxnSpPr>
+                <a:stCxn id="7" idx="3"/>
+                <a:endCxn id="28" idx="2"/>
+              </p:cNvCxnSpPr>
+              <p:nvPr/>
+            </p:nvCxnSpPr>
+            <p:spPr>
+              <a:xfrm flipV="1">
+                <a:off x="11617109" y="2506488"/>
+                <a:ext cx="2196028" cy="693"/>
+              </a:xfrm>
+              <a:prstGeom prst="straightConnector1">
+                <a:avLst/>
+              </a:prstGeom>
+              <a:ln w="28575">
+                <a:solidFill>
+                  <a:srgbClr val="7240F0"/>
+                </a:solidFill>
+                <a:tailEnd type="triangle" w="lg" len="lg"/>
+              </a:ln>
+            </p:spPr>
+            <p:style>
+              <a:lnRef idx="1">
+                <a:schemeClr val="accent1"/>
+              </a:lnRef>
+              <a:fillRef idx="0">
+                <a:schemeClr val="accent1"/>
+              </a:fillRef>
+              <a:effectRef idx="0">
+                <a:schemeClr val="accent1"/>
+              </a:effectRef>
+              <a:fontRef idx="minor">
+                <a:schemeClr val="tx1"/>
+              </a:fontRef>
+            </p:style>
+          </p:cxnSp>
+          <p:sp>
+            <p:nvSpPr>
+              <p:cNvPr id="122" name="CuadroTexto 121"/>
+              <p:cNvSpPr txBox="1"/>
+              <p:nvPr/>
+            </p:nvSpPr>
+            <p:spPr>
+              <a:xfrm>
+                <a:off x="4498572" y="2172744"/>
+                <a:ext cx="475643" cy="369332"/>
+              </a:xfrm>
+              <a:prstGeom prst="rect">
+                <a:avLst/>
+              </a:prstGeom>
+              <a:noFill/>
+            </p:spPr>
+            <p:txBody>
+              <a:bodyPr wrap="none" rtlCol="0">
+                <a:spAutoFit/>
+              </a:bodyPr>
+              <a:lstStyle/>
+              <a:p>
+                <a:r>
+                  <a:rPr lang="es-ES" b="1" dirty="0" smtClean="0">
+                    <a:solidFill>
+                      <a:srgbClr val="FF3300"/>
+                    </a:solidFill>
+                    <a:latin typeface="+mj-lt"/>
+                    <a:cs typeface="Aharoni" panose="02010803020104030203" pitchFamily="2" charset="-79"/>
+                  </a:rPr>
+                  <a:t>Yes</a:t>
+                </a:r>
+                <a:endParaRPr lang="es-ES" b="1" dirty="0">
+                  <a:solidFill>
+                    <a:srgbClr val="FF3300"/>
+                  </a:solidFill>
+                  <a:latin typeface="+mj-lt"/>
+                  <a:cs typeface="Aharoni" panose="02010803020104030203" pitchFamily="2" charset="-79"/>
+                </a:endParaRPr>
+              </a:p>
+            </p:txBody>
+          </p:sp>
+          <p:sp>
+            <p:nvSpPr>
+              <p:cNvPr id="68" name="Rectángulo redondeado 67"/>
+              <p:cNvSpPr/>
+              <p:nvPr/>
+            </p:nvSpPr>
+            <p:spPr bwMode="auto">
+              <a:xfrm>
+                <a:off x="10366337" y="3929235"/>
+                <a:ext cx="1379397" cy="1304464"/>
+              </a:xfrm>
+              <a:prstGeom prst="roundRect">
+                <a:avLst/>
+              </a:prstGeom>
+              <a:solidFill>
+                <a:schemeClr val="bg1"/>
+              </a:solidFill>
+              <a:ln w="9525" cap="rnd" cmpd="sng" algn="ctr">
+                <a:solidFill>
+                  <a:srgbClr val="00B050"/>
+                </a:solidFill>
+                <a:prstDash val="sysDot"/>
+                <a:round/>
+                <a:headEnd type="none" w="med" len="med"/>
+                <a:tailEnd type="none" w="med" len="med"/>
+              </a:ln>
+              <a:effectLst/>
+              <a:extLst/>
+            </p:spPr>
+            <p:txBody>
+              <a:bodyPr vert="horz" wrap="none" lIns="45720" tIns="45720" rIns="45720" bIns="45720" numCol="1" rtlCol="0" anchor="ctr" anchorCtr="0" compatLnSpc="1">
+                <a:prstTxWarp prst="textNoShape">
+                  <a:avLst/>
+                </a:prstTxWarp>
+              </a:bodyPr>
+              <a:lstStyle/>
+              <a:p>
+                <a:pPr marL="0" marR="0" indent="0" algn="ctr" defTabSz="914400" rtl="0" eaLnBrk="1" fontAlgn="base" latinLnBrk="0" hangingPunct="1">
+                  <a:lnSpc>
+                    <a:spcPct val="100000"/>
+                  </a:lnSpc>
+                  <a:spcBef>
+                    <a:spcPct val="50000"/>
+                  </a:spcBef>
+                  <a:spcAft>
+                    <a:spcPct val="0"/>
+                  </a:spcAft>
+                  <a:buClrTx/>
+                  <a:buSzTx/>
+                  <a:buFontTx/>
+                  <a:buNone/>
+                  <a:tabLst/>
+                </a:pPr>
+                <a:endParaRPr kumimoji="0" lang="es-ES" sz="2000" b="0" i="0" u="none" strike="noStrike" cap="none" normalizeH="0" baseline="0" dirty="0" smtClean="0">
+                  <a:ln>
+                    <a:noFill/>
+                  </a:ln>
+                  <a:solidFill>
+                    <a:srgbClr val="00B050"/>
+                  </a:solidFill>
+                  <a:effectLst/>
+                  <a:latin typeface="Verdana" pitchFamily="34" charset="0"/>
+                </a:endParaRPr>
+              </a:p>
+            </p:txBody>
+          </p:sp>
+          <p:sp>
+            <p:nvSpPr>
+              <p:cNvPr id="69" name="CuadroTexto 68"/>
+              <p:cNvSpPr txBox="1"/>
+              <p:nvPr/>
+            </p:nvSpPr>
+            <p:spPr>
+              <a:xfrm>
+                <a:off x="10665186" y="4043911"/>
+                <a:ext cx="838443" cy="276999"/>
+              </a:xfrm>
+              <a:prstGeom prst="rect">
+                <a:avLst/>
+              </a:prstGeom>
+              <a:noFill/>
+            </p:spPr>
+            <p:txBody>
+              <a:bodyPr wrap="square" rtlCol="0">
+                <a:spAutoFit/>
+              </a:bodyPr>
+              <a:lstStyle/>
+              <a:p>
+                <a:r>
+                  <a:rPr lang="es-ES" sz="1200" b="1" dirty="0" smtClean="0">
+                    <a:solidFill>
+                      <a:srgbClr val="00B050"/>
+                    </a:solidFill>
+                  </a:rPr>
+                  <a:t>DATABASE</a:t>
+                </a:r>
+                <a:endParaRPr lang="es-ES" sz="1200" b="1" dirty="0">
+                  <a:solidFill>
+                    <a:srgbClr val="00B050"/>
+                  </a:solidFill>
+                </a:endParaRPr>
+              </a:p>
+            </p:txBody>
+          </p:sp>
+          <p:sp>
+            <p:nvSpPr>
+              <p:cNvPr id="71" name="Flecha izquierda y derecha 70"/>
+              <p:cNvSpPr/>
+              <p:nvPr/>
+            </p:nvSpPr>
+            <p:spPr>
+              <a:xfrm rot="16200000">
+                <a:off x="10623451" y="3367878"/>
+                <a:ext cx="720000" cy="212903"/>
+              </a:xfrm>
+              <a:prstGeom prst="leftRightArrow">
+                <a:avLst/>
+              </a:prstGeom>
+              <a:solidFill>
+                <a:schemeClr val="accent3">
+                  <a:lumMod val="60000"/>
+                  <a:lumOff val="40000"/>
+                </a:schemeClr>
+              </a:solidFill>
+              <a:ln>
+                <a:noFill/>
+              </a:ln>
+            </p:spPr>
+            <p:style>
+              <a:lnRef idx="2">
+                <a:schemeClr val="accent1">
+                  <a:shade val="50000"/>
+                </a:schemeClr>
+              </a:lnRef>
+              <a:fillRef idx="1">
+                <a:schemeClr val="accent1"/>
+              </a:fillRef>
+              <a:effectRef idx="0">
+                <a:schemeClr val="accent1"/>
+              </a:effectRef>
+              <a:fontRef idx="minor">
+                <a:schemeClr val="lt1"/>
+              </a:fontRef>
+            </p:style>
+            <p:txBody>
+              <a:bodyPr rtlCol="0" anchor="ctr"/>
+              <a:lstStyle/>
+              <a:p>
+                <a:pPr algn="ctr"/>
+                <a:endParaRPr lang="es-ES"/>
+              </a:p>
+            </p:txBody>
+          </p:sp>
+          <p:pic>
+            <p:nvPicPr>
+              <p:cNvPr id="72" name="Imagen 71"/>
+              <p:cNvPicPr>
+                <a:picLocks noChangeAspect="1"/>
+              </p:cNvPicPr>
+              <p:nvPr/>
+            </p:nvPicPr>
+            <p:blipFill>
+              <a:blip r:embed="rId2" cstate="print">
+                <a:duotone>
+                  <a:schemeClr val="accent5">
+                    <a:shade val="45000"/>
+                    <a:satMod val="135000"/>
+                  </a:schemeClr>
+                  <a:prstClr val="white"/>
+                </a:duotone>
+                <a:extLst>
+                  <a:ext uri="{28A0092B-C50C-407E-A947-70E740481C1C}">
+                    <a14:useLocalDpi xmlns:a14="http://schemas.microsoft.com/office/drawing/2010/main" val="0"/>
+                  </a:ext>
+                </a:extLst>
+              </a:blip>
+              <a:stretch>
+                <a:fillRect/>
+              </a:stretch>
+            </p:blipFill>
+            <p:spPr>
+              <a:xfrm>
+                <a:off x="11131842" y="4511065"/>
+                <a:ext cx="444124" cy="445566"/>
+              </a:xfrm>
+              <a:prstGeom prst="rect">
+                <a:avLst/>
+              </a:prstGeom>
+            </p:spPr>
+          </p:pic>
+          <p:pic>
+            <p:nvPicPr>
+              <p:cNvPr id="74" name="Imagen 73"/>
+              <p:cNvPicPr>
+                <a:picLocks noChangeAspect="1"/>
+              </p:cNvPicPr>
+              <p:nvPr/>
+            </p:nvPicPr>
+            <p:blipFill>
+              <a:blip r:embed="rId3" cstate="print">
+                <a:extLst>
+                  <a:ext uri="{28A0092B-C50C-407E-A947-70E740481C1C}">
+                    <a14:useLocalDpi xmlns:a14="http://schemas.microsoft.com/office/drawing/2010/main" val="0"/>
+                  </a:ext>
+                </a:extLst>
+              </a:blip>
+              <a:stretch>
+                <a:fillRect/>
+              </a:stretch>
+            </p:blipFill>
+            <p:spPr>
+              <a:xfrm>
+                <a:off x="10503394" y="4485272"/>
+                <a:ext cx="586509" cy="539588"/>
+              </a:xfrm>
+              <a:prstGeom prst="rect">
+                <a:avLst/>
+              </a:prstGeom>
+            </p:spPr>
+          </p:pic>
+          <p:sp>
+            <p:nvSpPr>
+              <p:cNvPr id="18" name="CuadroTexto 17"/>
+              <p:cNvSpPr txBox="1"/>
+              <p:nvPr/>
+            </p:nvSpPr>
+            <p:spPr>
+              <a:xfrm>
+                <a:off x="-309848" y="2585463"/>
+                <a:ext cx="1761829" cy="338554"/>
+              </a:xfrm>
+              <a:prstGeom prst="rect">
+                <a:avLst/>
+              </a:prstGeom>
+              <a:noFill/>
+            </p:spPr>
+            <p:txBody>
+              <a:bodyPr wrap="none" rtlCol="0">
+                <a:spAutoFit/>
+              </a:bodyPr>
+              <a:lstStyle/>
+              <a:p>
+                <a:r>
+                  <a:rPr lang="es-ES" sz="1600" dirty="0" smtClean="0">
+                    <a:solidFill>
+                      <a:schemeClr val="tx1">
+                        <a:lumMod val="50000"/>
+                        <a:lumOff val="50000"/>
+                      </a:schemeClr>
+                    </a:solidFill>
+                    <a:latin typeface="+mj-lt"/>
+                    <a:cs typeface="Aharoni" panose="02010803020104030203" pitchFamily="2" charset="-79"/>
+                  </a:rPr>
+                  <a:t>$</a:t>
+                </a:r>
+                <a:r>
+                  <a:rPr lang="es-ES" sz="1600" dirty="0" err="1" smtClean="0">
+                    <a:solidFill>
+                      <a:schemeClr val="tx1">
+                        <a:lumMod val="50000"/>
+                        <a:lumOff val="50000"/>
+                      </a:schemeClr>
+                    </a:solidFill>
+                    <a:latin typeface="+mj-lt"/>
+                    <a:cs typeface="Aharoni" panose="02010803020104030203" pitchFamily="2" charset="-79"/>
+                  </a:rPr>
+                  <a:t>ingredients</a:t>
+                </a:r>
+                <a:r>
+                  <a:rPr lang="es-ES" sz="1600" dirty="0" smtClean="0">
+                    <a:solidFill>
+                      <a:schemeClr val="tx1">
+                        <a:lumMod val="50000"/>
+                        <a:lumOff val="50000"/>
+                      </a:schemeClr>
+                    </a:solidFill>
+                    <a:latin typeface="+mj-lt"/>
+                    <a:cs typeface="Aharoni" panose="02010803020104030203" pitchFamily="2" charset="-79"/>
+                  </a:rPr>
+                  <a:t>=</a:t>
+                </a:r>
+                <a:r>
+                  <a:rPr lang="es-ES" sz="1600" dirty="0" err="1" smtClean="0">
+                    <a:solidFill>
+                      <a:schemeClr val="tx1">
+                        <a:lumMod val="50000"/>
+                        <a:lumOff val="50000"/>
+                      </a:schemeClr>
+                    </a:solidFill>
+                    <a:latin typeface="+mj-lt"/>
+                    <a:cs typeface="Aharoni" panose="02010803020104030203" pitchFamily="2" charset="-79"/>
+                  </a:rPr>
+                  <a:t>None</a:t>
+                </a:r>
+                <a:endParaRPr lang="es-ES" sz="1600" dirty="0">
+                  <a:solidFill>
+                    <a:schemeClr val="tx1">
+                      <a:lumMod val="50000"/>
+                      <a:lumOff val="50000"/>
+                    </a:schemeClr>
+                  </a:solidFill>
+                  <a:latin typeface="+mj-lt"/>
+                  <a:cs typeface="Aharoni" panose="02010803020104030203" pitchFamily="2" charset="-79"/>
+                </a:endParaRPr>
+              </a:p>
+            </p:txBody>
+          </p:sp>
+          <p:sp>
+            <p:nvSpPr>
+              <p:cNvPr id="24" name="Decisión 23"/>
+              <p:cNvSpPr/>
+              <p:nvPr/>
+            </p:nvSpPr>
+            <p:spPr>
+              <a:xfrm>
+                <a:off x="5742258" y="1683051"/>
+                <a:ext cx="2444407" cy="1646050"/>
+              </a:xfrm>
+              <a:prstGeom prst="flowChartDecision">
+                <a:avLst/>
+              </a:prstGeom>
+              <a:noFill/>
+              <a:ln w="38100">
+                <a:solidFill>
+                  <a:srgbClr val="46DACC"/>
+                </a:solidFill>
+                <a:prstDash val="sysDot"/>
+              </a:ln>
+            </p:spPr>
+            <p:style>
+              <a:lnRef idx="2">
+                <a:schemeClr val="accent1">
+                  <a:shade val="50000"/>
+                </a:schemeClr>
+              </a:lnRef>
+              <a:fillRef idx="1">
+                <a:schemeClr val="accent1"/>
+              </a:fillRef>
+              <a:effectRef idx="0">
+                <a:schemeClr val="accent1"/>
+              </a:effectRef>
+              <a:fontRef idx="minor">
+                <a:schemeClr val="lt1"/>
+              </a:fontRef>
+            </p:style>
+            <p:txBody>
+              <a:bodyPr lIns="0" tIns="0" rIns="0" bIns="0" rtlCol="0" anchor="ctr"/>
+              <a:lstStyle/>
+              <a:p>
+                <a:pPr algn="ctr"/>
+                <a:r>
+                  <a:rPr lang="es-ES" sz="1200" dirty="0" smtClean="0">
+                    <a:solidFill>
+                      <a:schemeClr val="tx1">
+                        <a:lumMod val="65000"/>
+                        <a:lumOff val="35000"/>
+                      </a:schemeClr>
+                    </a:solidFill>
+                    <a:latin typeface="Arial Rounded MT Bold" panose="020F0704030504030204" pitchFamily="34" charset="0"/>
+                  </a:rPr>
+                  <a:t>CHECK</a:t>
+                </a:r>
+              </a:p>
+              <a:p>
+                <a:pPr algn="ctr"/>
+                <a:r>
+                  <a:rPr lang="es-ES" sz="1200" dirty="0" smtClean="0">
+                    <a:solidFill>
+                      <a:schemeClr val="tx1">
+                        <a:lumMod val="65000"/>
+                        <a:lumOff val="35000"/>
+                      </a:schemeClr>
+                    </a:solidFill>
+                    <a:latin typeface="Arial Rounded MT Bold" panose="020F0704030504030204" pitchFamily="34" charset="0"/>
+                  </a:rPr>
+                  <a:t>@INGREDIENTS</a:t>
+                </a:r>
+                <a:endParaRPr lang="es-ES" sz="1200" dirty="0">
+                  <a:solidFill>
+                    <a:schemeClr val="tx1">
+                      <a:lumMod val="65000"/>
+                      <a:lumOff val="35000"/>
+                    </a:schemeClr>
+                  </a:solidFill>
+                  <a:latin typeface="Arial Rounded MT Bold" panose="020F0704030504030204" pitchFamily="34" charset="0"/>
+                </a:endParaRPr>
+              </a:p>
+            </p:txBody>
+          </p:sp>
+          <p:sp>
+            <p:nvSpPr>
+              <p:cNvPr id="26" name="Elipse 25"/>
+              <p:cNvSpPr/>
+              <p:nvPr/>
+            </p:nvSpPr>
+            <p:spPr>
+              <a:xfrm>
+                <a:off x="-1618559" y="2038076"/>
+                <a:ext cx="1260000" cy="1008000"/>
+              </a:xfrm>
+              <a:prstGeom prst="ellipse">
+                <a:avLst/>
+              </a:prstGeom>
+              <a:noFill/>
+              <a:ln w="76200">
+                <a:solidFill>
+                  <a:srgbClr val="46DACC"/>
+                </a:solidFill>
+              </a:ln>
+            </p:spPr>
+            <p:style>
+              <a:lnRef idx="2">
+                <a:schemeClr val="accent1">
+                  <a:shade val="50000"/>
+                </a:schemeClr>
+              </a:lnRef>
+              <a:fillRef idx="1">
+                <a:schemeClr val="accent1"/>
+              </a:fillRef>
+              <a:effectRef idx="0">
+                <a:schemeClr val="accent1"/>
+              </a:effectRef>
+              <a:fontRef idx="minor">
+                <a:schemeClr val="lt1"/>
+              </a:fontRef>
+            </p:style>
+            <p:txBody>
+              <a:bodyPr lIns="0" tIns="0" rIns="0" bIns="0" rtlCol="0" anchor="ctr"/>
+              <a:lstStyle/>
+              <a:p>
+                <a:pPr algn="ctr"/>
+                <a:r>
+                  <a:rPr lang="es-ES" sz="1200" dirty="0" smtClean="0">
+                    <a:solidFill>
+                      <a:schemeClr val="tx1">
+                        <a:lumMod val="75000"/>
+                        <a:lumOff val="25000"/>
+                      </a:schemeClr>
+                    </a:solidFill>
+                    <a:latin typeface="Arial Rounded MT Bold" panose="020F0704030504030204" pitchFamily="34" charset="0"/>
+                  </a:rPr>
+                  <a:t>START</a:t>
+                </a:r>
+                <a:endParaRPr lang="es-ES" sz="1200" dirty="0">
+                  <a:solidFill>
+                    <a:schemeClr val="tx1">
+                      <a:lumMod val="75000"/>
+                      <a:lumOff val="25000"/>
+                    </a:schemeClr>
+                  </a:solidFill>
+                  <a:latin typeface="Arial Rounded MT Bold" panose="020F0704030504030204" pitchFamily="34" charset="0"/>
+                </a:endParaRPr>
+              </a:p>
+            </p:txBody>
+          </p:sp>
+          <p:sp>
+            <p:nvSpPr>
+              <p:cNvPr id="28" name="Elipse 27"/>
+              <p:cNvSpPr/>
+              <p:nvPr/>
+            </p:nvSpPr>
+            <p:spPr>
+              <a:xfrm>
+                <a:off x="13813137" y="2002076"/>
+                <a:ext cx="1260000" cy="1008823"/>
+              </a:xfrm>
+              <a:prstGeom prst="ellipse">
+                <a:avLst/>
+              </a:prstGeom>
+              <a:noFill/>
+              <a:ln w="76200">
+                <a:solidFill>
+                  <a:srgbClr val="46DACC"/>
+                </a:solidFill>
+              </a:ln>
+            </p:spPr>
+            <p:style>
+              <a:lnRef idx="2">
+                <a:schemeClr val="accent1">
+                  <a:shade val="50000"/>
+                </a:schemeClr>
+              </a:lnRef>
+              <a:fillRef idx="1">
+                <a:schemeClr val="accent1"/>
+              </a:fillRef>
+              <a:effectRef idx="0">
+                <a:schemeClr val="accent1"/>
+              </a:effectRef>
+              <a:fontRef idx="minor">
+                <a:schemeClr val="lt1"/>
+              </a:fontRef>
+            </p:style>
+            <p:txBody>
+              <a:bodyPr lIns="0" tIns="0" rIns="0" bIns="0" rtlCol="0" anchor="ctr"/>
+              <a:lstStyle/>
+              <a:p>
+                <a:pPr algn="ctr"/>
+                <a:r>
+                  <a:rPr lang="es-ES" sz="1200" dirty="0" smtClean="0">
+                    <a:solidFill>
+                      <a:schemeClr val="tx1">
+                        <a:lumMod val="75000"/>
+                        <a:lumOff val="25000"/>
+                      </a:schemeClr>
+                    </a:solidFill>
+                    <a:latin typeface="Arial Rounded MT Bold" panose="020F0704030504030204" pitchFamily="34" charset="0"/>
+                  </a:rPr>
+                  <a:t>RESPONSE</a:t>
+                </a:r>
+                <a:endParaRPr lang="es-ES" sz="1200" dirty="0">
+                  <a:solidFill>
+                    <a:schemeClr val="tx1">
+                      <a:lumMod val="75000"/>
+                      <a:lumOff val="25000"/>
+                    </a:schemeClr>
+                  </a:solidFill>
+                  <a:latin typeface="Arial Rounded MT Bold" panose="020F0704030504030204" pitchFamily="34" charset="0"/>
+                </a:endParaRPr>
+              </a:p>
+            </p:txBody>
+          </p:sp>
+          <p:cxnSp>
+            <p:nvCxnSpPr>
+              <p:cNvPr id="36" name="Conector recto de flecha 35"/>
+              <p:cNvCxnSpPr>
+                <a:stCxn id="24" idx="3"/>
+                <a:endCxn id="7" idx="1"/>
+              </p:cNvCxnSpPr>
+              <p:nvPr/>
+            </p:nvCxnSpPr>
+            <p:spPr>
+              <a:xfrm>
+                <a:off x="8186665" y="2506076"/>
+                <a:ext cx="1990444" cy="1105"/>
+              </a:xfrm>
+              <a:prstGeom prst="straightConnector1">
+                <a:avLst/>
+              </a:prstGeom>
+              <a:ln w="28575">
+                <a:solidFill>
+                  <a:srgbClr val="7240F0"/>
+                </a:solidFill>
+                <a:tailEnd type="triangle" w="lg" len="lg"/>
+              </a:ln>
+            </p:spPr>
+            <p:style>
+              <a:lnRef idx="1">
+                <a:schemeClr val="accent1"/>
+              </a:lnRef>
+              <a:fillRef idx="0">
+                <a:schemeClr val="accent1"/>
+              </a:fillRef>
+              <a:effectRef idx="0">
+                <a:schemeClr val="accent1"/>
+              </a:effectRef>
+              <a:fontRef idx="minor">
+                <a:schemeClr val="tx1"/>
+              </a:fontRef>
+            </p:style>
+          </p:cxnSp>
+          <p:sp>
+            <p:nvSpPr>
+              <p:cNvPr id="37" name="CuadroTexto 36"/>
+              <p:cNvSpPr txBox="1"/>
+              <p:nvPr/>
+            </p:nvSpPr>
+            <p:spPr>
+              <a:xfrm>
+                <a:off x="8186665" y="2116100"/>
+                <a:ext cx="801823" cy="369332"/>
+              </a:xfrm>
+              <a:prstGeom prst="rect">
+                <a:avLst/>
+              </a:prstGeom>
+              <a:noFill/>
+            </p:spPr>
+            <p:txBody>
+              <a:bodyPr wrap="none" rtlCol="0">
+                <a:spAutoFit/>
+              </a:bodyPr>
+              <a:lstStyle/>
+              <a:p>
+                <a:r>
+                  <a:rPr lang="es-ES" b="1" dirty="0" smtClean="0">
+                    <a:solidFill>
+                      <a:srgbClr val="FF3300"/>
+                    </a:solidFill>
+                    <a:latin typeface="+mj-lt"/>
+                    <a:cs typeface="Aharoni" panose="02010803020104030203" pitchFamily="2" charset="-79"/>
+                  </a:rPr>
+                  <a:t>! </a:t>
+                </a:r>
+                <a:r>
+                  <a:rPr lang="es-ES" b="1" dirty="0" err="1" smtClean="0">
+                    <a:solidFill>
+                      <a:srgbClr val="FF3300"/>
+                    </a:solidFill>
+                    <a:latin typeface="+mj-lt"/>
+                    <a:cs typeface="Aharoni" panose="02010803020104030203" pitchFamily="2" charset="-79"/>
+                  </a:rPr>
+                  <a:t>None</a:t>
+                </a:r>
+                <a:endParaRPr lang="es-ES" b="1" dirty="0">
+                  <a:solidFill>
+                    <a:srgbClr val="FF3300"/>
+                  </a:solidFill>
+                  <a:latin typeface="+mj-lt"/>
+                  <a:cs typeface="Aharoni" panose="02010803020104030203" pitchFamily="2" charset="-79"/>
+                </a:endParaRPr>
+              </a:p>
+            </p:txBody>
+          </p:sp>
+          <p:sp>
+            <p:nvSpPr>
+              <p:cNvPr id="38" name="CuadroTexto 37"/>
+              <p:cNvSpPr txBox="1"/>
+              <p:nvPr/>
+            </p:nvSpPr>
+            <p:spPr>
+              <a:xfrm>
+                <a:off x="6986002" y="3760432"/>
+                <a:ext cx="676788" cy="369332"/>
+              </a:xfrm>
+              <a:prstGeom prst="rect">
+                <a:avLst/>
+              </a:prstGeom>
+              <a:noFill/>
+            </p:spPr>
+            <p:txBody>
+              <a:bodyPr wrap="none" rtlCol="0">
+                <a:spAutoFit/>
+              </a:bodyPr>
+              <a:lstStyle/>
+              <a:p>
+                <a:r>
+                  <a:rPr lang="es-ES" b="1" dirty="0" err="1" smtClean="0">
+                    <a:solidFill>
+                      <a:srgbClr val="FF3300"/>
+                    </a:solidFill>
+                    <a:latin typeface="+mj-lt"/>
+                    <a:cs typeface="Aharoni" panose="02010803020104030203" pitchFamily="2" charset="-79"/>
+                  </a:rPr>
+                  <a:t>None</a:t>
+                </a:r>
+                <a:endParaRPr lang="es-ES" b="1" dirty="0">
+                  <a:solidFill>
+                    <a:srgbClr val="FF3300"/>
+                  </a:solidFill>
+                  <a:latin typeface="+mj-lt"/>
+                  <a:cs typeface="Aharoni" panose="02010803020104030203" pitchFamily="2" charset="-79"/>
+                </a:endParaRPr>
+              </a:p>
+            </p:txBody>
+          </p:sp>
+          <p:cxnSp>
+            <p:nvCxnSpPr>
+              <p:cNvPr id="39" name="Conector recto de flecha 38"/>
+              <p:cNvCxnSpPr>
+                <a:stCxn id="24" idx="2"/>
+              </p:cNvCxnSpPr>
+              <p:nvPr/>
+            </p:nvCxnSpPr>
+            <p:spPr>
+              <a:xfrm>
+                <a:off x="6964462" y="3329101"/>
+                <a:ext cx="21540" cy="3344738"/>
+              </a:xfrm>
+              <a:prstGeom prst="straightConnector1">
+                <a:avLst/>
+              </a:prstGeom>
+              <a:ln w="28575">
+                <a:solidFill>
+                  <a:srgbClr val="7240F0"/>
+                </a:solidFill>
+                <a:tailEnd type="triangle" w="lg" len="lg"/>
+              </a:ln>
+            </p:spPr>
+            <p:style>
+              <a:lnRef idx="1">
+                <a:schemeClr val="accent1"/>
+              </a:lnRef>
+              <a:fillRef idx="0">
+                <a:schemeClr val="accent1"/>
+              </a:fillRef>
+              <a:effectRef idx="0">
+                <a:schemeClr val="accent1"/>
+              </a:effectRef>
+              <a:fontRef idx="minor">
+                <a:schemeClr val="tx1"/>
+              </a:fontRef>
+            </p:style>
+          </p:cxnSp>
+          <p:sp>
+            <p:nvSpPr>
+              <p:cNvPr id="51" name="CuadroTexto 50"/>
+              <p:cNvSpPr txBox="1"/>
+              <p:nvPr/>
+            </p:nvSpPr>
+            <p:spPr>
+              <a:xfrm>
+                <a:off x="8169642" y="2548179"/>
+                <a:ext cx="1211998" cy="338554"/>
+              </a:xfrm>
+              <a:prstGeom prst="rect">
+                <a:avLst/>
+              </a:prstGeom>
+              <a:noFill/>
+            </p:spPr>
+            <p:txBody>
+              <a:bodyPr wrap="none" rtlCol="0">
+                <a:spAutoFit/>
+              </a:bodyPr>
+              <a:lstStyle/>
+              <a:p>
+                <a:r>
+                  <a:rPr lang="es-ES" sz="1600" dirty="0" smtClean="0">
+                    <a:solidFill>
+                      <a:schemeClr val="tx1">
+                        <a:lumMod val="50000"/>
+                        <a:lumOff val="50000"/>
+                      </a:schemeClr>
+                    </a:solidFill>
+                    <a:latin typeface="+mj-lt"/>
+                    <a:cs typeface="Aharoni" panose="02010803020104030203" pitchFamily="2" charset="-79"/>
+                  </a:rPr>
+                  <a:t>$</a:t>
+                </a:r>
+                <a:r>
+                  <a:rPr lang="es-ES" sz="1600" dirty="0" err="1" smtClean="0">
+                    <a:solidFill>
+                      <a:schemeClr val="tx1">
+                        <a:lumMod val="50000"/>
+                        <a:lumOff val="50000"/>
+                      </a:schemeClr>
+                    </a:solidFill>
+                    <a:latin typeface="+mj-lt"/>
+                    <a:cs typeface="Aharoni" panose="02010803020104030203" pitchFamily="2" charset="-79"/>
+                  </a:rPr>
+                  <a:t>ingredients</a:t>
+                </a:r>
+                <a:endParaRPr lang="es-ES" sz="1600" dirty="0">
+                  <a:solidFill>
+                    <a:schemeClr val="tx1">
+                      <a:lumMod val="50000"/>
+                      <a:lumOff val="50000"/>
+                    </a:schemeClr>
+                  </a:solidFill>
+                  <a:latin typeface="+mj-lt"/>
+                  <a:cs typeface="Aharoni" panose="02010803020104030203" pitchFamily="2" charset="-79"/>
+                </a:endParaRPr>
+              </a:p>
+            </p:txBody>
+          </p:sp>
+          <p:cxnSp>
+            <p:nvCxnSpPr>
+              <p:cNvPr id="53" name="Conector recto de flecha 52"/>
+              <p:cNvCxnSpPr>
+                <a:stCxn id="10" idx="3"/>
+              </p:cNvCxnSpPr>
+              <p:nvPr/>
+            </p:nvCxnSpPr>
+            <p:spPr>
+              <a:xfrm>
+                <a:off x="11745734" y="6662395"/>
+                <a:ext cx="1154921" cy="0"/>
+              </a:xfrm>
+              <a:prstGeom prst="straightConnector1">
+                <a:avLst/>
+              </a:prstGeom>
+              <a:ln w="28575">
+                <a:solidFill>
+                  <a:srgbClr val="7240F0"/>
+                </a:solidFill>
+                <a:tailEnd type="triangle" w="lg" len="lg"/>
+              </a:ln>
+            </p:spPr>
+            <p:style>
+              <a:lnRef idx="1">
+                <a:schemeClr val="accent1"/>
+              </a:lnRef>
+              <a:fillRef idx="0">
+                <a:schemeClr val="accent1"/>
+              </a:fillRef>
+              <a:effectRef idx="0">
+                <a:schemeClr val="accent1"/>
+              </a:effectRef>
+              <a:fontRef idx="minor">
+                <a:schemeClr val="tx1"/>
+              </a:fontRef>
+            </p:style>
+          </p:cxnSp>
+          <p:cxnSp>
+            <p:nvCxnSpPr>
+              <p:cNvPr id="57" name="Conector recto de flecha 56"/>
+              <p:cNvCxnSpPr>
+                <a:endCxn id="10" idx="1"/>
+              </p:cNvCxnSpPr>
+              <p:nvPr/>
+            </p:nvCxnSpPr>
+            <p:spPr>
+              <a:xfrm>
+                <a:off x="6986002" y="6662395"/>
+                <a:ext cx="3319732" cy="0"/>
+              </a:xfrm>
+              <a:prstGeom prst="straightConnector1">
+                <a:avLst/>
+              </a:prstGeom>
+              <a:ln w="28575">
+                <a:solidFill>
+                  <a:srgbClr val="7240F0"/>
+                </a:solidFill>
+                <a:tailEnd type="triangle" w="lg" len="lg"/>
+              </a:ln>
+            </p:spPr>
+            <p:style>
+              <a:lnRef idx="1">
+                <a:schemeClr val="accent1"/>
+              </a:lnRef>
+              <a:fillRef idx="0">
+                <a:schemeClr val="accent1"/>
+              </a:fillRef>
+              <a:effectRef idx="0">
+                <a:schemeClr val="accent1"/>
+              </a:effectRef>
+              <a:fontRef idx="minor">
+                <a:schemeClr val="tx1"/>
+              </a:fontRef>
+            </p:style>
+          </p:cxnSp>
+          <p:cxnSp>
+            <p:nvCxnSpPr>
+              <p:cNvPr id="60" name="Conector recto de flecha 59"/>
+              <p:cNvCxnSpPr/>
+              <p:nvPr/>
+            </p:nvCxnSpPr>
+            <p:spPr>
+              <a:xfrm flipV="1">
+                <a:off x="12900655" y="2515022"/>
+                <a:ext cx="0" cy="4147373"/>
+              </a:xfrm>
+              <a:prstGeom prst="straightConnector1">
+                <a:avLst/>
+              </a:prstGeom>
+              <a:ln w="28575">
+                <a:solidFill>
+                  <a:srgbClr val="7240F0"/>
+                </a:solidFill>
+                <a:tailEnd type="triangle" w="lg" len="lg"/>
+              </a:ln>
+            </p:spPr>
+            <p:style>
+              <a:lnRef idx="1">
+                <a:schemeClr val="accent1"/>
+              </a:lnRef>
+              <a:fillRef idx="0">
+                <a:schemeClr val="accent1"/>
+              </a:fillRef>
+              <a:effectRef idx="0">
+                <a:schemeClr val="accent1"/>
+              </a:effectRef>
+              <a:fontRef idx="minor">
+                <a:schemeClr val="tx1"/>
+              </a:fontRef>
+            </p:style>
+          </p:cxnSp>
+          <p:sp>
+            <p:nvSpPr>
+              <p:cNvPr id="90" name="Flecha izquierda y derecha 89"/>
+              <p:cNvSpPr/>
+              <p:nvPr/>
+            </p:nvSpPr>
+            <p:spPr>
+              <a:xfrm rot="16200000">
+                <a:off x="10691976" y="5582153"/>
+                <a:ext cx="720000" cy="212903"/>
+              </a:xfrm>
+              <a:prstGeom prst="leftRightArrow">
+                <a:avLst/>
+              </a:prstGeom>
+              <a:solidFill>
+                <a:schemeClr val="accent3">
+                  <a:lumMod val="60000"/>
+                  <a:lumOff val="40000"/>
+                </a:schemeClr>
+              </a:solidFill>
+              <a:ln>
+                <a:noFill/>
+              </a:ln>
+            </p:spPr>
+            <p:style>
+              <a:lnRef idx="2">
+                <a:schemeClr val="accent1">
+                  <a:shade val="50000"/>
+                </a:schemeClr>
+              </a:lnRef>
+              <a:fillRef idx="1">
+                <a:schemeClr val="accent1"/>
+              </a:fillRef>
+              <a:effectRef idx="0">
+                <a:schemeClr val="accent1"/>
+              </a:effectRef>
+              <a:fontRef idx="minor">
+                <a:schemeClr val="lt1"/>
+              </a:fontRef>
+            </p:style>
+            <p:txBody>
+              <a:bodyPr rtlCol="0" anchor="ctr"/>
+              <a:lstStyle/>
+              <a:p>
+                <a:pPr algn="ctr"/>
+                <a:endParaRPr lang="es-ES"/>
+              </a:p>
+            </p:txBody>
+          </p:sp>
+        </p:grpSp>
+        <p:sp>
+          <p:nvSpPr>
+            <p:cNvPr id="92" name="Rectángulo redondeado 91"/>
+            <p:cNvSpPr/>
+            <p:nvPr/>
+          </p:nvSpPr>
+          <p:spPr>
+            <a:xfrm>
+              <a:off x="1856288" y="1395663"/>
+              <a:ext cx="7525352" cy="6673516"/>
+            </a:xfrm>
+            <a:prstGeom prst="roundRect">
+              <a:avLst>
+                <a:gd name="adj" fmla="val 3452"/>
+              </a:avLst>
+            </a:prstGeom>
+            <a:noFill/>
+            <a:ln>
+              <a:solidFill>
+                <a:schemeClr val="bg1">
+                  <a:lumMod val="75000"/>
+                </a:schemeClr>
+              </a:solidFill>
+              <a:prstDash val="sysDash"/>
+            </a:ln>
+          </p:spPr>
+          <p:style>
+            <a:lnRef idx="2">
+              <a:schemeClr val="accent1">
+                <a:shade val="50000"/>
+              </a:schemeClr>
+            </a:lnRef>
+            <a:fillRef idx="1">
+              <a:schemeClr val="accent1"/>
+            </a:fillRef>
+            <a:effectRef idx="0">
+              <a:schemeClr val="accent1"/>
+            </a:effectRef>
+            <a:fontRef idx="minor">
+              <a:schemeClr val="lt1"/>
+            </a:fontRef>
+          </p:style>
+          <p:txBody>
+            <a:bodyPr rtlCol="0" anchor="ctr"/>
+            <a:lstStyle/>
+            <a:p>
+              <a:pPr algn="ctr"/>
+              <a:endParaRPr lang="es-ES"/>
+            </a:p>
+          </p:txBody>
+        </p:sp>
+        <p:sp>
+          <p:nvSpPr>
+            <p:cNvPr id="93" name="CuadroTexto 92"/>
+            <p:cNvSpPr txBox="1"/>
+            <p:nvPr/>
+          </p:nvSpPr>
+          <p:spPr>
+            <a:xfrm>
+              <a:off x="1856288" y="7734152"/>
+              <a:ext cx="7525351" cy="338554"/>
+            </a:xfrm>
+            <a:prstGeom prst="rect">
+              <a:avLst/>
+            </a:prstGeom>
+            <a:noFill/>
+          </p:spPr>
+          <p:txBody>
+            <a:bodyPr wrap="square" rtlCol="0">
+              <a:spAutoFit/>
+            </a:bodyPr>
+            <a:lstStyle/>
+            <a:p>
+              <a:pPr algn="ctr"/>
+              <a:r>
+                <a:rPr lang="es-ES" sz="1600" b="1" dirty="0" smtClean="0">
+                  <a:solidFill>
+                    <a:schemeClr val="tx1">
+                      <a:lumMod val="50000"/>
+                      <a:lumOff val="50000"/>
+                    </a:schemeClr>
+                  </a:solidFill>
+                  <a:latin typeface="Arial Rounded MT Bold" panose="020F0704030504030204" pitchFamily="34" charset="0"/>
+                  <a:cs typeface="Aharoni" panose="02010803020104030203" pitchFamily="2" charset="-79"/>
+                </a:rPr>
+                <a:t>WATSON CONVERSATION</a:t>
+              </a:r>
+              <a:endParaRPr lang="es-ES" sz="1600" b="1" dirty="0">
+                <a:solidFill>
+                  <a:schemeClr val="tx1">
+                    <a:lumMod val="50000"/>
+                    <a:lumOff val="50000"/>
+                  </a:schemeClr>
+                </a:solidFill>
+                <a:latin typeface="Arial Rounded MT Bold" panose="020F0704030504030204" pitchFamily="34" charset="0"/>
+                <a:cs typeface="Aharoni" panose="02010803020104030203" pitchFamily="2" charset="-79"/>
+              </a:endParaRPr>
+            </a:p>
+          </p:txBody>
+        </p:sp>
+        <p:sp>
+          <p:nvSpPr>
+            <p:cNvPr id="98" name="Rectángulo redondeado 97"/>
+            <p:cNvSpPr/>
+            <p:nvPr/>
+          </p:nvSpPr>
+          <p:spPr>
+            <a:xfrm>
+              <a:off x="9683507" y="1395662"/>
+              <a:ext cx="3584103" cy="6673517"/>
+            </a:xfrm>
+            <a:prstGeom prst="roundRect">
+              <a:avLst>
+                <a:gd name="adj" fmla="val 3452"/>
+              </a:avLst>
+            </a:prstGeom>
+            <a:noFill/>
+            <a:ln>
+              <a:solidFill>
+                <a:schemeClr val="bg1">
+                  <a:lumMod val="75000"/>
+                </a:schemeClr>
+              </a:solidFill>
+              <a:prstDash val="sysDash"/>
+            </a:ln>
+          </p:spPr>
+          <p:style>
+            <a:lnRef idx="2">
+              <a:schemeClr val="accent1">
+                <a:shade val="50000"/>
+              </a:schemeClr>
+            </a:lnRef>
+            <a:fillRef idx="1">
+              <a:schemeClr val="accent1"/>
+            </a:fillRef>
+            <a:effectRef idx="0">
+              <a:schemeClr val="accent1"/>
+            </a:effectRef>
+            <a:fontRef idx="minor">
+              <a:schemeClr val="lt1"/>
+            </a:fontRef>
+          </p:style>
+          <p:txBody>
+            <a:bodyPr rtlCol="0" anchor="ctr"/>
+            <a:lstStyle/>
+            <a:p>
+              <a:pPr algn="ctr"/>
+              <a:endParaRPr lang="es-ES"/>
+            </a:p>
+          </p:txBody>
+        </p:sp>
+        <p:sp>
+          <p:nvSpPr>
+            <p:cNvPr id="99" name="CuadroTexto 98"/>
+            <p:cNvSpPr txBox="1"/>
+            <p:nvPr/>
+          </p:nvSpPr>
+          <p:spPr>
+            <a:xfrm>
+              <a:off x="9683506" y="7742394"/>
+              <a:ext cx="3584103" cy="338554"/>
+            </a:xfrm>
+            <a:prstGeom prst="rect">
+              <a:avLst/>
+            </a:prstGeom>
+            <a:noFill/>
+          </p:spPr>
+          <p:txBody>
+            <a:bodyPr wrap="square" rtlCol="0">
+              <a:spAutoFit/>
+            </a:bodyPr>
+            <a:lstStyle/>
+            <a:p>
+              <a:pPr algn="ctr"/>
+              <a:r>
+                <a:rPr lang="es-ES" sz="1600" b="1" dirty="0" smtClean="0">
+                  <a:solidFill>
+                    <a:schemeClr val="tx1">
+                      <a:lumMod val="50000"/>
+                      <a:lumOff val="50000"/>
+                    </a:schemeClr>
+                  </a:solidFill>
+                  <a:latin typeface="Arial Rounded MT Bold" panose="020F0704030504030204" pitchFamily="34" charset="0"/>
+                  <a:cs typeface="Aharoni" panose="02010803020104030203" pitchFamily="2" charset="-79"/>
+                </a:rPr>
+                <a:t>ORCHESTRATION ENGINE</a:t>
+              </a:r>
+              <a:endParaRPr lang="es-ES" sz="1600" b="1" dirty="0">
+                <a:solidFill>
+                  <a:schemeClr val="tx1">
+                    <a:lumMod val="50000"/>
+                    <a:lumOff val="50000"/>
+                  </a:schemeClr>
+                </a:solidFill>
+                <a:latin typeface="Arial Rounded MT Bold" panose="020F0704030504030204" pitchFamily="34" charset="0"/>
+                <a:cs typeface="Aharoni" panose="02010803020104030203" pitchFamily="2" charset="-79"/>
+              </a:endParaRPr>
+            </a:p>
+          </p:txBody>
+        </p:sp>
+      </p:grpSp>
+    </p:spTree>
+    <p:extLst>
+      <p:ext uri="{BB962C8B-B14F-4D97-AF65-F5344CB8AC3E}">
+        <p14:creationId xmlns:p14="http://schemas.microsoft.com/office/powerpoint/2010/main" val="1132521147"/>
+      </p:ext>
+    </p:extLst>
+  </p:cSld>
+  <p:clrMapOvr>
+    <a:masterClrMapping/>
+  </p:clrMapOvr>
+</p:sld>
+</file>
+
+<file path=ppt/slides/slide27.xml><?xml version="1.0" encoding="utf-8"?>
+<p:sld xmlns:a="http://schemas.openxmlformats.org/drawingml/2006/main" xmlns:r="http://schemas.openxmlformats.org/officeDocument/2006/relationships" xmlns:p="http://schemas.openxmlformats.org/presentationml/2006/main">
+  <p:cSld>
+    <p:spTree>
+      <p:nvGrpSpPr>
+        <p:cNvPr id="1" name=""/>
+        <p:cNvGrpSpPr/>
+        <p:nvPr/>
+      </p:nvGrpSpPr>
+      <p:grpSpPr>
+        <a:xfrm>
+          <a:off x="0" y="0"/>
+          <a:ext cx="0" cy="0"/>
+          <a:chOff x="0" y="0"/>
+          <a:chExt cx="0" cy="0"/>
+        </a:xfrm>
+      </p:grpSpPr>
+      <p:grpSp>
+        <p:nvGrpSpPr>
+          <p:cNvPr id="96" name="Grupo 95"/>
+          <p:cNvGrpSpPr/>
+          <p:nvPr/>
+        </p:nvGrpSpPr>
+        <p:grpSpPr>
+          <a:xfrm>
+            <a:off x="-1058778" y="128337"/>
+            <a:ext cx="15865642" cy="7780421"/>
+            <a:chOff x="-1058778" y="128337"/>
+            <a:chExt cx="15865642" cy="7780421"/>
+          </a:xfrm>
+        </p:grpSpPr>
+        <p:grpSp>
+          <p:nvGrpSpPr>
+            <p:cNvPr id="97" name="Grupo 96"/>
+            <p:cNvGrpSpPr/>
+            <p:nvPr/>
+          </p:nvGrpSpPr>
+          <p:grpSpPr>
+            <a:xfrm>
+              <a:off x="-1058778" y="128337"/>
+              <a:ext cx="15865642" cy="7780421"/>
+              <a:chOff x="-1058778" y="128337"/>
+              <a:chExt cx="15865642" cy="7780421"/>
+            </a:xfrm>
+          </p:grpSpPr>
+          <p:grpSp>
+            <p:nvGrpSpPr>
+              <p:cNvPr id="89" name="Grupo 88"/>
+              <p:cNvGrpSpPr/>
+              <p:nvPr/>
+            </p:nvGrpSpPr>
+            <p:grpSpPr>
+              <a:xfrm>
+                <a:off x="-1058778" y="128337"/>
+                <a:ext cx="15865642" cy="7780421"/>
+                <a:chOff x="-1058778" y="128337"/>
+                <a:chExt cx="15865642" cy="7780421"/>
+              </a:xfrm>
+            </p:grpSpPr>
+            <p:sp>
+              <p:nvSpPr>
+                <p:cNvPr id="82" name="Rectángulo 81"/>
+                <p:cNvSpPr/>
+                <p:nvPr/>
+              </p:nvSpPr>
+              <p:spPr>
+                <a:xfrm>
+                  <a:off x="-1058778" y="128337"/>
+                  <a:ext cx="15865642" cy="7780421"/>
+                </a:xfrm>
+                <a:prstGeom prst="rect">
+                  <a:avLst/>
+                </a:prstGeom>
+                <a:solidFill>
+                  <a:schemeClr val="bg1"/>
+                </a:solidFill>
+                <a:ln>
+                  <a:noFill/>
+                </a:ln>
+              </p:spPr>
+              <p:style>
+                <a:lnRef idx="2">
+                  <a:schemeClr val="accent1">
+                    <a:shade val="50000"/>
+                  </a:schemeClr>
+                </a:lnRef>
+                <a:fillRef idx="1">
+                  <a:schemeClr val="accent1"/>
+                </a:fillRef>
+                <a:effectRef idx="0">
+                  <a:schemeClr val="accent1"/>
+                </a:effectRef>
+                <a:fontRef idx="minor">
+                  <a:schemeClr val="lt1"/>
+                </a:fontRef>
+              </p:style>
+              <p:txBody>
+                <a:bodyPr rtlCol="0" anchor="ctr"/>
+                <a:lstStyle/>
+                <a:p>
+                  <a:pPr algn="ctr"/>
+                  <a:endParaRPr lang="es-ES"/>
+                </a:p>
+              </p:txBody>
+            </p:sp>
+            <p:sp>
+              <p:nvSpPr>
+                <p:cNvPr id="5" name="Decisión 4"/>
+                <p:cNvSpPr/>
+                <p:nvPr/>
+              </p:nvSpPr>
+              <p:spPr>
+                <a:xfrm>
+                  <a:off x="2293372" y="1724085"/>
+                  <a:ext cx="2205200" cy="1581874"/>
+                </a:xfrm>
+                <a:prstGeom prst="flowChartDecision">
+                  <a:avLst/>
+                </a:prstGeom>
+                <a:noFill/>
+                <a:ln w="38100">
+                  <a:solidFill>
+                    <a:srgbClr val="46DACC"/>
+                  </a:solidFill>
+                  <a:prstDash val="sysDot"/>
+                </a:ln>
+              </p:spPr>
+              <p:style>
+                <a:lnRef idx="2">
+                  <a:schemeClr val="accent1">
+                    <a:shade val="50000"/>
+                  </a:schemeClr>
+                </a:lnRef>
+                <a:fillRef idx="1">
+                  <a:schemeClr val="accent1"/>
+                </a:fillRef>
+                <a:effectRef idx="0">
+                  <a:schemeClr val="accent1"/>
+                </a:effectRef>
+                <a:fontRef idx="minor">
+                  <a:schemeClr val="lt1"/>
+                </a:fontRef>
+              </p:style>
+              <p:txBody>
+                <a:bodyPr lIns="0" tIns="0" rIns="0" bIns="0" rtlCol="0" anchor="ctr"/>
+                <a:lstStyle/>
+                <a:p>
+                  <a:pPr algn="ctr"/>
+                  <a:r>
+                    <a:rPr lang="es-ES" sz="1200" dirty="0" smtClean="0">
+                      <a:solidFill>
+                        <a:schemeClr val="tx1">
+                          <a:lumMod val="65000"/>
+                          <a:lumOff val="35000"/>
+                        </a:schemeClr>
+                      </a:solidFill>
+                      <a:latin typeface="Arial Rounded MT Bold" panose="020F0704030504030204" pitchFamily="34" charset="0"/>
+                    </a:rPr>
+                    <a:t>CHECK</a:t>
+                  </a:r>
+                </a:p>
+                <a:p>
+                  <a:pPr algn="ctr"/>
+                  <a:r>
+                    <a:rPr lang="es-ES" sz="1200" dirty="0" smtClean="0">
+                      <a:solidFill>
+                        <a:schemeClr val="tx1">
+                          <a:lumMod val="65000"/>
+                          <a:lumOff val="35000"/>
+                        </a:schemeClr>
+                      </a:solidFill>
+                      <a:latin typeface="Arial Rounded MT Bold" panose="020F0704030504030204" pitchFamily="34" charset="0"/>
+                    </a:rPr>
+                    <a:t>#NEEDED_</a:t>
+                  </a:r>
+                </a:p>
+                <a:p>
+                  <a:pPr algn="ctr"/>
+                  <a:r>
+                    <a:rPr lang="es-ES" sz="1200" dirty="0" smtClean="0">
+                      <a:solidFill>
+                        <a:schemeClr val="tx1">
+                          <a:lumMod val="65000"/>
+                          <a:lumOff val="35000"/>
+                        </a:schemeClr>
+                      </a:solidFill>
+                      <a:latin typeface="Arial Rounded MT Bold" panose="020F0704030504030204" pitchFamily="34" charset="0"/>
+                    </a:rPr>
+                    <a:t>INGREDIENTS</a:t>
+                  </a:r>
+                  <a:endParaRPr lang="es-ES" sz="1200" dirty="0">
+                    <a:solidFill>
+                      <a:schemeClr val="tx1">
+                        <a:lumMod val="65000"/>
+                        <a:lumOff val="35000"/>
+                      </a:schemeClr>
+                    </a:solidFill>
+                    <a:latin typeface="Arial Rounded MT Bold" panose="020F0704030504030204" pitchFamily="34" charset="0"/>
+                  </a:endParaRPr>
+                </a:p>
+              </p:txBody>
+            </p:sp>
+            <p:sp>
+              <p:nvSpPr>
+                <p:cNvPr id="7" name="Rectángulo redondeado 6"/>
+                <p:cNvSpPr/>
+                <p:nvPr/>
+              </p:nvSpPr>
+              <p:spPr>
+                <a:xfrm>
+                  <a:off x="6110682" y="4320910"/>
+                  <a:ext cx="1440000" cy="1080000"/>
+                </a:xfrm>
+                <a:prstGeom prst="roundRect">
+                  <a:avLst/>
+                </a:prstGeom>
+                <a:noFill/>
+                <a:ln w="38100">
+                  <a:solidFill>
+                    <a:srgbClr val="FFC000"/>
+                  </a:solidFill>
+                </a:ln>
+              </p:spPr>
+              <p:style>
+                <a:lnRef idx="2">
+                  <a:schemeClr val="accent1">
+                    <a:shade val="50000"/>
+                  </a:schemeClr>
+                </a:lnRef>
+                <a:fillRef idx="1">
+                  <a:schemeClr val="accent1"/>
+                </a:fillRef>
+                <a:effectRef idx="0">
+                  <a:schemeClr val="accent1"/>
+                </a:effectRef>
+                <a:fontRef idx="minor">
+                  <a:schemeClr val="lt1"/>
+                </a:fontRef>
+              </p:style>
+              <p:txBody>
+                <a:bodyPr lIns="0" tIns="0" rIns="0" bIns="0" rtlCol="0" anchor="ctr"/>
+                <a:lstStyle/>
+                <a:p>
+                  <a:pPr algn="ctr"/>
+                  <a:r>
+                    <a:rPr lang="es-ES" sz="1200" dirty="0">
+                      <a:solidFill>
+                        <a:schemeClr val="tx1">
+                          <a:lumMod val="75000"/>
+                          <a:lumOff val="25000"/>
+                        </a:schemeClr>
+                      </a:solidFill>
+                      <a:latin typeface="Arial Rounded MT Bold" panose="020F0704030504030204" pitchFamily="34" charset="0"/>
+                    </a:rPr>
+                    <a:t>GET </a:t>
+                  </a:r>
+                </a:p>
+                <a:p>
+                  <a:pPr algn="ctr"/>
+                  <a:r>
+                    <a:rPr lang="es-ES" sz="1200" dirty="0">
+                      <a:solidFill>
+                        <a:schemeClr val="tx1">
+                          <a:lumMod val="75000"/>
+                          <a:lumOff val="25000"/>
+                        </a:schemeClr>
+                      </a:solidFill>
+                      <a:latin typeface="Arial Rounded MT Bold" panose="020F0704030504030204" pitchFamily="34" charset="0"/>
+                    </a:rPr>
+                    <a:t>DATABASE SUMMARY</a:t>
+                  </a:r>
+                </a:p>
+              </p:txBody>
+            </p:sp>
+            <p:cxnSp>
+              <p:nvCxnSpPr>
+                <p:cNvPr id="13" name="Conector recto de flecha 12"/>
+                <p:cNvCxnSpPr>
+                  <a:stCxn id="26" idx="6"/>
+                  <a:endCxn id="5" idx="1"/>
+                </p:cNvCxnSpPr>
+                <p:nvPr/>
+              </p:nvCxnSpPr>
+              <p:spPr>
+                <a:xfrm>
+                  <a:off x="411807" y="2515022"/>
+                  <a:ext cx="1881565" cy="0"/>
+                </a:xfrm>
+                <a:prstGeom prst="straightConnector1">
+                  <a:avLst/>
+                </a:prstGeom>
+                <a:ln w="28575">
+                  <a:solidFill>
+                    <a:srgbClr val="7240F0"/>
+                  </a:solidFill>
+                  <a:tailEnd type="triangle" w="lg" len="lg"/>
+                </a:ln>
+              </p:spPr>
+              <p:style>
+                <a:lnRef idx="1">
+                  <a:schemeClr val="accent1"/>
+                </a:lnRef>
+                <a:fillRef idx="0">
+                  <a:schemeClr val="accent1"/>
+                </a:fillRef>
+                <a:effectRef idx="0">
+                  <a:schemeClr val="accent1"/>
+                </a:effectRef>
+                <a:fontRef idx="minor">
+                  <a:schemeClr val="tx1"/>
+                </a:fontRef>
+              </p:style>
+            </p:cxnSp>
+            <p:cxnSp>
+              <p:nvCxnSpPr>
+                <p:cNvPr id="15" name="Conector recto de flecha 14"/>
+                <p:cNvCxnSpPr>
+                  <a:stCxn id="5" idx="3"/>
+                  <a:endCxn id="24" idx="1"/>
+                </p:cNvCxnSpPr>
+                <p:nvPr/>
+              </p:nvCxnSpPr>
+              <p:spPr>
+                <a:xfrm flipV="1">
+                  <a:off x="4498572" y="2491701"/>
+                  <a:ext cx="1213969" cy="23321"/>
+                </a:xfrm>
+                <a:prstGeom prst="straightConnector1">
+                  <a:avLst/>
+                </a:prstGeom>
+                <a:ln w="28575" cmpd="sng">
+                  <a:solidFill>
+                    <a:srgbClr val="7240F0"/>
+                  </a:solidFill>
+                  <a:prstDash val="solid"/>
+                  <a:tailEnd type="triangle" w="lg" len="lg"/>
+                </a:ln>
+              </p:spPr>
+              <p:style>
+                <a:lnRef idx="1">
+                  <a:schemeClr val="accent1"/>
+                </a:lnRef>
+                <a:fillRef idx="0">
+                  <a:schemeClr val="accent1"/>
+                </a:fillRef>
+                <a:effectRef idx="0">
+                  <a:schemeClr val="accent1"/>
+                </a:effectRef>
+                <a:fontRef idx="minor">
+                  <a:schemeClr val="tx1"/>
+                </a:fontRef>
+              </p:style>
+            </p:cxnSp>
+            <p:cxnSp>
+              <p:nvCxnSpPr>
+                <p:cNvPr id="35" name="Conector recto de flecha 34"/>
+                <p:cNvCxnSpPr>
+                  <a:stCxn id="44" idx="3"/>
+                  <a:endCxn id="28" idx="2"/>
+                </p:cNvCxnSpPr>
+                <p:nvPr/>
+              </p:nvCxnSpPr>
+              <p:spPr>
+                <a:xfrm>
+                  <a:off x="11269381" y="2462089"/>
+                  <a:ext cx="1990863" cy="8901"/>
+                </a:xfrm>
+                <a:prstGeom prst="straightConnector1">
+                  <a:avLst/>
+                </a:prstGeom>
+                <a:ln w="28575">
+                  <a:solidFill>
+                    <a:srgbClr val="7240F0"/>
+                  </a:solidFill>
+                  <a:tailEnd type="triangle" w="lg" len="lg"/>
+                </a:ln>
+              </p:spPr>
+              <p:style>
+                <a:lnRef idx="1">
+                  <a:schemeClr val="accent1"/>
+                </a:lnRef>
+                <a:fillRef idx="0">
+                  <a:schemeClr val="accent1"/>
+                </a:fillRef>
+                <a:effectRef idx="0">
+                  <a:schemeClr val="accent1"/>
+                </a:effectRef>
+                <a:fontRef idx="minor">
+                  <a:schemeClr val="tx1"/>
+                </a:fontRef>
+              </p:style>
+            </p:cxnSp>
+            <p:sp>
+              <p:nvSpPr>
+                <p:cNvPr id="122" name="CuadroTexto 121"/>
+                <p:cNvSpPr txBox="1"/>
+                <p:nvPr/>
+              </p:nvSpPr>
+              <p:spPr>
+                <a:xfrm>
+                  <a:off x="4498572" y="2172744"/>
+                  <a:ext cx="475643" cy="369332"/>
+                </a:xfrm>
+                <a:prstGeom prst="rect">
+                  <a:avLst/>
+                </a:prstGeom>
+                <a:noFill/>
+              </p:spPr>
+              <p:txBody>
+                <a:bodyPr wrap="none" rtlCol="0">
+                  <a:spAutoFit/>
+                </a:bodyPr>
+                <a:lstStyle/>
+                <a:p>
+                  <a:r>
+                    <a:rPr lang="es-ES" b="1" dirty="0" smtClean="0">
+                      <a:solidFill>
+                        <a:srgbClr val="FF3300"/>
+                      </a:solidFill>
+                      <a:latin typeface="+mj-lt"/>
+                      <a:cs typeface="Aharoni" panose="02010803020104030203" pitchFamily="2" charset="-79"/>
+                    </a:rPr>
+                    <a:t>Yes</a:t>
+                  </a:r>
+                  <a:endParaRPr lang="es-ES" b="1" dirty="0">
+                    <a:solidFill>
+                      <a:srgbClr val="FF3300"/>
+                    </a:solidFill>
+                    <a:latin typeface="+mj-lt"/>
+                    <a:cs typeface="Aharoni" panose="02010803020104030203" pitchFamily="2" charset="-79"/>
+                  </a:endParaRPr>
+                </a:p>
+              </p:txBody>
+            </p:sp>
+            <p:sp>
+              <p:nvSpPr>
+                <p:cNvPr id="68" name="Rectángulo redondeado 67"/>
+                <p:cNvSpPr/>
+                <p:nvPr/>
+              </p:nvSpPr>
+              <p:spPr bwMode="auto">
+                <a:xfrm>
+                  <a:off x="6248593" y="6321982"/>
+                  <a:ext cx="1379397" cy="1304464"/>
+                </a:xfrm>
+                <a:prstGeom prst="roundRect">
+                  <a:avLst/>
+                </a:prstGeom>
+                <a:solidFill>
+                  <a:schemeClr val="bg1"/>
+                </a:solidFill>
+                <a:ln w="9525" cap="rnd" cmpd="sng" algn="ctr">
+                  <a:solidFill>
+                    <a:srgbClr val="00B050"/>
+                  </a:solidFill>
+                  <a:prstDash val="sysDot"/>
+                  <a:round/>
+                  <a:headEnd type="none" w="med" len="med"/>
+                  <a:tailEnd type="none" w="med" len="med"/>
+                </a:ln>
+                <a:effectLst/>
+                <a:extLst/>
+              </p:spPr>
+              <p:txBody>
+                <a:bodyPr vert="horz" wrap="none" lIns="45720" tIns="45720" rIns="45720" bIns="45720" numCol="1" rtlCol="0" anchor="ctr" anchorCtr="0" compatLnSpc="1">
+                  <a:prstTxWarp prst="textNoShape">
+                    <a:avLst/>
+                  </a:prstTxWarp>
+                </a:bodyPr>
+                <a:lstStyle/>
+                <a:p>
+                  <a:pPr marL="0" marR="0" indent="0" algn="ctr" defTabSz="914400" rtl="0" eaLnBrk="1" fontAlgn="base" latinLnBrk="0" hangingPunct="1">
+                    <a:lnSpc>
+                      <a:spcPct val="100000"/>
+                    </a:lnSpc>
+                    <a:spcBef>
+                      <a:spcPct val="50000"/>
+                    </a:spcBef>
+                    <a:spcAft>
+                      <a:spcPct val="0"/>
+                    </a:spcAft>
+                    <a:buClrTx/>
+                    <a:buSzTx/>
+                    <a:buFontTx/>
+                    <a:buNone/>
+                    <a:tabLst/>
+                  </a:pPr>
+                  <a:endParaRPr kumimoji="0" lang="es-ES" sz="2000" b="0" i="0" u="none" strike="noStrike" cap="none" normalizeH="0" baseline="0" dirty="0" smtClean="0">
+                    <a:ln>
+                      <a:noFill/>
+                    </a:ln>
+                    <a:solidFill>
+                      <a:srgbClr val="00B050"/>
+                    </a:solidFill>
+                    <a:effectLst/>
+                    <a:latin typeface="Verdana" pitchFamily="34" charset="0"/>
+                  </a:endParaRPr>
+                </a:p>
+              </p:txBody>
+            </p:sp>
+            <p:sp>
+              <p:nvSpPr>
+                <p:cNvPr id="69" name="CuadroTexto 68"/>
+                <p:cNvSpPr txBox="1"/>
+                <p:nvPr/>
+              </p:nvSpPr>
+              <p:spPr>
+                <a:xfrm>
+                  <a:off x="6547442" y="6436658"/>
+                  <a:ext cx="838443" cy="276999"/>
+                </a:xfrm>
+                <a:prstGeom prst="rect">
+                  <a:avLst/>
+                </a:prstGeom>
+                <a:noFill/>
+              </p:spPr>
+              <p:txBody>
+                <a:bodyPr wrap="square" rtlCol="0">
+                  <a:spAutoFit/>
+                </a:bodyPr>
+                <a:lstStyle/>
+                <a:p>
+                  <a:r>
+                    <a:rPr lang="es-ES" sz="1200" b="1" dirty="0" smtClean="0">
+                      <a:solidFill>
+                        <a:srgbClr val="00B050"/>
+                      </a:solidFill>
+                    </a:rPr>
+                    <a:t>DATABASE</a:t>
+                  </a:r>
+                  <a:endParaRPr lang="es-ES" sz="1200" b="1" dirty="0">
+                    <a:solidFill>
+                      <a:srgbClr val="00B050"/>
+                    </a:solidFill>
+                  </a:endParaRPr>
+                </a:p>
+              </p:txBody>
+            </p:sp>
+            <p:sp>
+              <p:nvSpPr>
+                <p:cNvPr id="71" name="Flecha izquierda y derecha 70"/>
+                <p:cNvSpPr/>
+                <p:nvPr/>
+              </p:nvSpPr>
+              <p:spPr>
+                <a:xfrm rot="16200000">
+                  <a:off x="6505707" y="5760625"/>
+                  <a:ext cx="720000" cy="212903"/>
+                </a:xfrm>
+                <a:prstGeom prst="leftRightArrow">
+                  <a:avLst/>
+                </a:prstGeom>
+                <a:solidFill>
+                  <a:schemeClr val="accent3">
+                    <a:lumMod val="60000"/>
+                    <a:lumOff val="40000"/>
+                  </a:schemeClr>
+                </a:solidFill>
+                <a:ln>
+                  <a:noFill/>
+                </a:ln>
+              </p:spPr>
+              <p:style>
+                <a:lnRef idx="2">
+                  <a:schemeClr val="accent1">
+                    <a:shade val="50000"/>
+                  </a:schemeClr>
+                </a:lnRef>
+                <a:fillRef idx="1">
+                  <a:schemeClr val="accent1"/>
+                </a:fillRef>
+                <a:effectRef idx="0">
+                  <a:schemeClr val="accent1"/>
+                </a:effectRef>
+                <a:fontRef idx="minor">
+                  <a:schemeClr val="lt1"/>
+                </a:fontRef>
+              </p:style>
+              <p:txBody>
+                <a:bodyPr rtlCol="0" anchor="ctr"/>
+                <a:lstStyle/>
+                <a:p>
+                  <a:pPr algn="ctr"/>
+                  <a:endParaRPr lang="es-ES"/>
+                </a:p>
+              </p:txBody>
+            </p:sp>
+            <p:pic>
+              <p:nvPicPr>
+                <p:cNvPr id="72" name="Imagen 71"/>
+                <p:cNvPicPr>
+                  <a:picLocks noChangeAspect="1"/>
+                </p:cNvPicPr>
+                <p:nvPr/>
+              </p:nvPicPr>
+              <p:blipFill>
+                <a:blip r:embed="rId2" cstate="print">
+                  <a:duotone>
+                    <a:schemeClr val="accent5">
+                      <a:shade val="45000"/>
+                      <a:satMod val="135000"/>
+                    </a:schemeClr>
+                    <a:prstClr val="white"/>
+                  </a:duotone>
+                  <a:extLst>
+                    <a:ext uri="{28A0092B-C50C-407E-A947-70E740481C1C}">
+                      <a14:useLocalDpi xmlns:a14="http://schemas.microsoft.com/office/drawing/2010/main" val="0"/>
+                    </a:ext>
+                  </a:extLst>
+                </a:blip>
+                <a:stretch>
+                  <a:fillRect/>
+                </a:stretch>
+              </p:blipFill>
+              <p:spPr>
+                <a:xfrm>
+                  <a:off x="7014098" y="6903812"/>
+                  <a:ext cx="444124" cy="445566"/>
+                </a:xfrm>
+                <a:prstGeom prst="rect">
+                  <a:avLst/>
+                </a:prstGeom>
+              </p:spPr>
+            </p:pic>
+            <p:pic>
+              <p:nvPicPr>
+                <p:cNvPr id="74" name="Imagen 73"/>
+                <p:cNvPicPr>
+                  <a:picLocks noChangeAspect="1"/>
+                </p:cNvPicPr>
+                <p:nvPr/>
+              </p:nvPicPr>
+              <p:blipFill>
+                <a:blip r:embed="rId3" cstate="print">
+                  <a:extLst>
+                    <a:ext uri="{28A0092B-C50C-407E-A947-70E740481C1C}">
+                      <a14:useLocalDpi xmlns:a14="http://schemas.microsoft.com/office/drawing/2010/main" val="0"/>
+                    </a:ext>
+                  </a:extLst>
+                </a:blip>
+                <a:stretch>
+                  <a:fillRect/>
+                </a:stretch>
+              </p:blipFill>
+              <p:spPr>
+                <a:xfrm>
+                  <a:off x="6385650" y="6878019"/>
+                  <a:ext cx="586509" cy="539588"/>
+                </a:xfrm>
+                <a:prstGeom prst="rect">
+                  <a:avLst/>
+                </a:prstGeom>
+              </p:spPr>
+            </p:pic>
+            <p:sp>
+              <p:nvSpPr>
+                <p:cNvPr id="18" name="CuadroTexto 17"/>
+                <p:cNvSpPr txBox="1"/>
+                <p:nvPr/>
+              </p:nvSpPr>
+              <p:spPr>
+                <a:xfrm>
+                  <a:off x="450142" y="2517445"/>
+                  <a:ext cx="1137299" cy="338554"/>
+                </a:xfrm>
+                <a:prstGeom prst="rect">
+                  <a:avLst/>
+                </a:prstGeom>
+                <a:noFill/>
+              </p:spPr>
+              <p:txBody>
+                <a:bodyPr wrap="none" rtlCol="0">
+                  <a:spAutoFit/>
+                </a:bodyPr>
+                <a:lstStyle/>
+                <a:p>
+                  <a:r>
+                    <a:rPr lang="es-ES" sz="1600" dirty="0" smtClean="0">
+                      <a:solidFill>
+                        <a:schemeClr val="tx1">
+                          <a:lumMod val="50000"/>
+                          <a:lumOff val="50000"/>
+                        </a:schemeClr>
+                      </a:solidFill>
+                      <a:latin typeface="+mj-lt"/>
+                      <a:cs typeface="Aharoni" panose="02010803020104030203" pitchFamily="2" charset="-79"/>
+                    </a:rPr>
+                    <a:t>$</a:t>
+                  </a:r>
+                  <a:r>
+                    <a:rPr lang="es-ES" sz="1600" dirty="0" err="1" smtClean="0">
+                      <a:solidFill>
+                        <a:schemeClr val="tx1">
+                          <a:lumMod val="50000"/>
+                          <a:lumOff val="50000"/>
+                        </a:schemeClr>
+                      </a:solidFill>
+                      <a:latin typeface="+mj-lt"/>
+                      <a:cs typeface="Aharoni" panose="02010803020104030203" pitchFamily="2" charset="-79"/>
+                    </a:rPr>
+                    <a:t>counter</a:t>
+                  </a:r>
+                  <a:r>
+                    <a:rPr lang="es-ES" sz="1600" dirty="0" smtClean="0">
+                      <a:solidFill>
+                        <a:schemeClr val="tx1">
+                          <a:lumMod val="50000"/>
+                          <a:lumOff val="50000"/>
+                        </a:schemeClr>
+                      </a:solidFill>
+                      <a:latin typeface="+mj-lt"/>
+                      <a:cs typeface="Aharoni" panose="02010803020104030203" pitchFamily="2" charset="-79"/>
+                    </a:rPr>
+                    <a:t>=0</a:t>
+                  </a:r>
+                  <a:endParaRPr lang="es-ES" sz="1600" dirty="0">
+                    <a:solidFill>
+                      <a:schemeClr val="tx1">
+                        <a:lumMod val="50000"/>
+                        <a:lumOff val="50000"/>
+                      </a:schemeClr>
+                    </a:solidFill>
+                    <a:latin typeface="+mj-lt"/>
+                    <a:cs typeface="Aharoni" panose="02010803020104030203" pitchFamily="2" charset="-79"/>
+                  </a:endParaRPr>
+                </a:p>
+              </p:txBody>
+            </p:sp>
+            <p:sp>
+              <p:nvSpPr>
+                <p:cNvPr id="24" name="Decisión 23"/>
+                <p:cNvSpPr/>
+                <p:nvPr/>
+              </p:nvSpPr>
+              <p:spPr>
+                <a:xfrm>
+                  <a:off x="5712541" y="1771364"/>
+                  <a:ext cx="2222223" cy="1440673"/>
+                </a:xfrm>
+                <a:prstGeom prst="flowChartDecision">
+                  <a:avLst/>
+                </a:prstGeom>
+                <a:noFill/>
+                <a:ln w="38100">
+                  <a:solidFill>
+                    <a:srgbClr val="46DACC"/>
+                  </a:solidFill>
+                  <a:prstDash val="sysDot"/>
+                </a:ln>
+              </p:spPr>
+              <p:style>
+                <a:lnRef idx="2">
+                  <a:schemeClr val="accent1">
+                    <a:shade val="50000"/>
+                  </a:schemeClr>
+                </a:lnRef>
+                <a:fillRef idx="1">
+                  <a:schemeClr val="accent1"/>
+                </a:fillRef>
+                <a:effectRef idx="0">
+                  <a:schemeClr val="accent1"/>
+                </a:effectRef>
+                <a:fontRef idx="minor">
+                  <a:schemeClr val="lt1"/>
+                </a:fontRef>
+              </p:style>
+              <p:txBody>
+                <a:bodyPr lIns="0" tIns="0" rIns="0" bIns="0" rtlCol="0" anchor="ctr"/>
+                <a:lstStyle/>
+                <a:p>
+                  <a:pPr algn="ctr"/>
+                  <a:r>
+                    <a:rPr lang="es-ES" sz="1200" dirty="0" smtClean="0">
+                      <a:solidFill>
+                        <a:schemeClr val="tx1">
+                          <a:lumMod val="65000"/>
+                          <a:lumOff val="35000"/>
+                        </a:schemeClr>
+                      </a:solidFill>
+                      <a:latin typeface="Arial Rounded MT Bold" panose="020F0704030504030204" pitchFamily="34" charset="0"/>
+                    </a:rPr>
+                    <a:t>CHECK SUMMARY</a:t>
+                  </a:r>
+                </a:p>
+                <a:p>
+                  <a:pPr algn="ctr"/>
+                  <a:r>
+                    <a:rPr lang="es-ES" sz="1200" dirty="0" smtClean="0">
+                      <a:solidFill>
+                        <a:schemeClr val="tx1">
+                          <a:lumMod val="65000"/>
+                          <a:lumOff val="35000"/>
+                        </a:schemeClr>
+                      </a:solidFill>
+                      <a:latin typeface="Arial Rounded MT Bold" panose="020F0704030504030204" pitchFamily="34" charset="0"/>
+                    </a:rPr>
+                    <a:t>@RESPONSE_</a:t>
+                  </a:r>
+                </a:p>
+                <a:p>
+                  <a:pPr algn="ctr"/>
+                  <a:r>
+                    <a:rPr lang="es-ES" sz="1200" dirty="0" smtClean="0">
+                      <a:solidFill>
+                        <a:schemeClr val="tx1">
+                          <a:lumMod val="65000"/>
+                          <a:lumOff val="35000"/>
+                        </a:schemeClr>
+                      </a:solidFill>
+                      <a:latin typeface="Arial Rounded MT Bold" panose="020F0704030504030204" pitchFamily="34" charset="0"/>
+                    </a:rPr>
+                    <a:t>TYPES</a:t>
+                  </a:r>
+                  <a:endParaRPr lang="es-ES" sz="1200" dirty="0">
+                    <a:solidFill>
+                      <a:schemeClr val="tx1">
+                        <a:lumMod val="65000"/>
+                        <a:lumOff val="35000"/>
+                      </a:schemeClr>
+                    </a:solidFill>
+                    <a:latin typeface="Arial Rounded MT Bold" panose="020F0704030504030204" pitchFamily="34" charset="0"/>
+                  </a:endParaRPr>
+                </a:p>
+              </p:txBody>
+            </p:sp>
+            <p:sp>
+              <p:nvSpPr>
+                <p:cNvPr id="26" name="Elipse 25"/>
+                <p:cNvSpPr/>
+                <p:nvPr/>
+              </p:nvSpPr>
+              <p:spPr>
+                <a:xfrm>
+                  <a:off x="-848193" y="2011022"/>
+                  <a:ext cx="1260000" cy="1008000"/>
+                </a:xfrm>
+                <a:prstGeom prst="ellipse">
+                  <a:avLst/>
+                </a:prstGeom>
+                <a:noFill/>
+                <a:ln w="76200">
+                  <a:solidFill>
+                    <a:srgbClr val="46DACC"/>
+                  </a:solidFill>
+                </a:ln>
+              </p:spPr>
+              <p:style>
+                <a:lnRef idx="2">
+                  <a:schemeClr val="accent1">
+                    <a:shade val="50000"/>
+                  </a:schemeClr>
+                </a:lnRef>
+                <a:fillRef idx="1">
+                  <a:schemeClr val="accent1"/>
+                </a:fillRef>
+                <a:effectRef idx="0">
+                  <a:schemeClr val="accent1"/>
+                </a:effectRef>
+                <a:fontRef idx="minor">
+                  <a:schemeClr val="lt1"/>
+                </a:fontRef>
+              </p:style>
+              <p:txBody>
+                <a:bodyPr lIns="0" tIns="0" rIns="0" bIns="0" rtlCol="0" anchor="ctr"/>
+                <a:lstStyle/>
+                <a:p>
+                  <a:pPr algn="ctr"/>
+                  <a:r>
+                    <a:rPr lang="es-ES" sz="1200" dirty="0" smtClean="0">
+                      <a:solidFill>
+                        <a:schemeClr val="tx1">
+                          <a:lumMod val="75000"/>
+                          <a:lumOff val="25000"/>
+                        </a:schemeClr>
+                      </a:solidFill>
+                      <a:latin typeface="Arial Rounded MT Bold" panose="020F0704030504030204" pitchFamily="34" charset="0"/>
+                    </a:rPr>
+                    <a:t>START</a:t>
+                  </a:r>
+                  <a:endParaRPr lang="es-ES" sz="1200" dirty="0">
+                    <a:solidFill>
+                      <a:schemeClr val="tx1">
+                        <a:lumMod val="75000"/>
+                        <a:lumOff val="25000"/>
+                      </a:schemeClr>
+                    </a:solidFill>
+                    <a:latin typeface="Arial Rounded MT Bold" panose="020F0704030504030204" pitchFamily="34" charset="0"/>
+                  </a:endParaRPr>
+                </a:p>
+              </p:txBody>
+            </p:sp>
+            <p:sp>
+              <p:nvSpPr>
+                <p:cNvPr id="28" name="Elipse 27"/>
+                <p:cNvSpPr/>
+                <p:nvPr/>
+              </p:nvSpPr>
+              <p:spPr>
+                <a:xfrm>
+                  <a:off x="13260244" y="1966578"/>
+                  <a:ext cx="1260000" cy="1008823"/>
+                </a:xfrm>
+                <a:prstGeom prst="ellipse">
+                  <a:avLst/>
+                </a:prstGeom>
+                <a:noFill/>
+                <a:ln w="76200">
+                  <a:solidFill>
+                    <a:srgbClr val="46DACC"/>
+                  </a:solidFill>
+                </a:ln>
+              </p:spPr>
+              <p:style>
+                <a:lnRef idx="2">
+                  <a:schemeClr val="accent1">
+                    <a:shade val="50000"/>
+                  </a:schemeClr>
+                </a:lnRef>
+                <a:fillRef idx="1">
+                  <a:schemeClr val="accent1"/>
+                </a:fillRef>
+                <a:effectRef idx="0">
+                  <a:schemeClr val="accent1"/>
+                </a:effectRef>
+                <a:fontRef idx="minor">
+                  <a:schemeClr val="lt1"/>
+                </a:fontRef>
+              </p:style>
+              <p:txBody>
+                <a:bodyPr lIns="0" tIns="0" rIns="0" bIns="0" rtlCol="0" anchor="ctr"/>
+                <a:lstStyle/>
+                <a:p>
+                  <a:pPr algn="ctr"/>
+                  <a:r>
+                    <a:rPr lang="es-ES" sz="1200" dirty="0" smtClean="0">
+                      <a:solidFill>
+                        <a:schemeClr val="tx1">
+                          <a:lumMod val="75000"/>
+                          <a:lumOff val="25000"/>
+                        </a:schemeClr>
+                      </a:solidFill>
+                      <a:latin typeface="Arial Rounded MT Bold" panose="020F0704030504030204" pitchFamily="34" charset="0"/>
+                    </a:rPr>
+                    <a:t>RESPONSE</a:t>
+                  </a:r>
+                  <a:endParaRPr lang="es-ES" sz="1200" dirty="0">
+                    <a:solidFill>
+                      <a:schemeClr val="tx1">
+                        <a:lumMod val="75000"/>
+                        <a:lumOff val="25000"/>
+                      </a:schemeClr>
+                    </a:solidFill>
+                    <a:latin typeface="Arial Rounded MT Bold" panose="020F0704030504030204" pitchFamily="34" charset="0"/>
+                  </a:endParaRPr>
+                </a:p>
+              </p:txBody>
+            </p:sp>
+            <p:cxnSp>
+              <p:nvCxnSpPr>
+                <p:cNvPr id="36" name="Conector recto de flecha 35"/>
+                <p:cNvCxnSpPr>
+                  <a:stCxn id="24" idx="3"/>
+                  <a:endCxn id="44" idx="1"/>
+                </p:cNvCxnSpPr>
+                <p:nvPr/>
+              </p:nvCxnSpPr>
+              <p:spPr>
+                <a:xfrm flipV="1">
+                  <a:off x="7934764" y="2462089"/>
+                  <a:ext cx="1438132" cy="29612"/>
+                </a:xfrm>
+                <a:prstGeom prst="straightConnector1">
+                  <a:avLst/>
+                </a:prstGeom>
+                <a:ln w="28575">
+                  <a:solidFill>
+                    <a:srgbClr val="7240F0"/>
+                  </a:solidFill>
+                  <a:tailEnd type="triangle" w="lg" len="lg"/>
+                </a:ln>
+              </p:spPr>
+              <p:style>
+                <a:lnRef idx="1">
+                  <a:schemeClr val="accent1"/>
+                </a:lnRef>
+                <a:fillRef idx="0">
+                  <a:schemeClr val="accent1"/>
+                </a:fillRef>
+                <a:effectRef idx="0">
+                  <a:schemeClr val="accent1"/>
+                </a:effectRef>
+                <a:fontRef idx="minor">
+                  <a:schemeClr val="tx1"/>
+                </a:fontRef>
+              </p:style>
+            </p:cxnSp>
+            <p:sp>
+              <p:nvSpPr>
+                <p:cNvPr id="37" name="CuadroTexto 36"/>
+                <p:cNvSpPr txBox="1"/>
+                <p:nvPr/>
+              </p:nvSpPr>
+              <p:spPr>
+                <a:xfrm>
+                  <a:off x="7880792" y="2101658"/>
+                  <a:ext cx="1055545" cy="369332"/>
+                </a:xfrm>
+                <a:prstGeom prst="rect">
+                  <a:avLst/>
+                </a:prstGeom>
+                <a:noFill/>
+              </p:spPr>
+              <p:txBody>
+                <a:bodyPr wrap="none" rtlCol="0">
+                  <a:spAutoFit/>
+                </a:bodyPr>
+                <a:lstStyle/>
+                <a:p>
+                  <a:r>
+                    <a:rPr lang="es-ES" b="1" dirty="0" err="1" smtClean="0">
+                      <a:solidFill>
+                        <a:srgbClr val="FF3300"/>
+                      </a:solidFill>
+                      <a:latin typeface="+mj-lt"/>
+                      <a:cs typeface="Aharoni" panose="02010803020104030203" pitchFamily="2" charset="-79"/>
+                    </a:rPr>
+                    <a:t>Unknown</a:t>
+                  </a:r>
+                  <a:endParaRPr lang="es-ES" b="1" dirty="0">
+                    <a:solidFill>
+                      <a:srgbClr val="FF3300"/>
+                    </a:solidFill>
+                    <a:latin typeface="+mj-lt"/>
+                    <a:cs typeface="Aharoni" panose="02010803020104030203" pitchFamily="2" charset="-79"/>
+                  </a:endParaRPr>
+                </a:p>
+              </p:txBody>
+            </p:sp>
+            <p:sp>
+              <p:nvSpPr>
+                <p:cNvPr id="38" name="CuadroTexto 37"/>
+                <p:cNvSpPr txBox="1"/>
+                <p:nvPr/>
+              </p:nvSpPr>
+              <p:spPr>
+                <a:xfrm>
+                  <a:off x="6830682" y="3154482"/>
+                  <a:ext cx="475643" cy="369332"/>
+                </a:xfrm>
+                <a:prstGeom prst="rect">
+                  <a:avLst/>
+                </a:prstGeom>
+                <a:noFill/>
+              </p:spPr>
+              <p:txBody>
+                <a:bodyPr wrap="none" rtlCol="0">
+                  <a:spAutoFit/>
+                </a:bodyPr>
+                <a:lstStyle/>
+                <a:p>
+                  <a:r>
+                    <a:rPr lang="es-ES" b="1" dirty="0" smtClean="0">
+                      <a:solidFill>
+                        <a:srgbClr val="FF3300"/>
+                      </a:solidFill>
+                      <a:latin typeface="+mj-lt"/>
+                      <a:cs typeface="Aharoni" panose="02010803020104030203" pitchFamily="2" charset="-79"/>
+                    </a:rPr>
+                    <a:t>Yes</a:t>
+                  </a:r>
+                  <a:endParaRPr lang="es-ES" b="1" dirty="0">
+                    <a:solidFill>
+                      <a:srgbClr val="FF3300"/>
+                    </a:solidFill>
+                    <a:latin typeface="+mj-lt"/>
+                    <a:cs typeface="Aharoni" panose="02010803020104030203" pitchFamily="2" charset="-79"/>
+                  </a:endParaRPr>
+                </a:p>
+              </p:txBody>
+            </p:sp>
+            <p:cxnSp>
+              <p:nvCxnSpPr>
+                <p:cNvPr id="39" name="Conector recto de flecha 38"/>
+                <p:cNvCxnSpPr>
+                  <a:stCxn id="24" idx="2"/>
+                  <a:endCxn id="7" idx="0"/>
+                </p:cNvCxnSpPr>
+                <p:nvPr/>
+              </p:nvCxnSpPr>
+              <p:spPr>
+                <a:xfrm>
+                  <a:off x="6823653" y="3212037"/>
+                  <a:ext cx="7029" cy="1108873"/>
+                </a:xfrm>
+                <a:prstGeom prst="straightConnector1">
+                  <a:avLst/>
+                </a:prstGeom>
+                <a:ln w="28575">
+                  <a:solidFill>
+                    <a:srgbClr val="7240F0"/>
+                  </a:solidFill>
+                  <a:tailEnd type="triangle" w="lg" len="lg"/>
+                </a:ln>
+              </p:spPr>
+              <p:style>
+                <a:lnRef idx="1">
+                  <a:schemeClr val="accent1"/>
+                </a:lnRef>
+                <a:fillRef idx="0">
+                  <a:schemeClr val="accent1"/>
+                </a:fillRef>
+                <a:effectRef idx="0">
+                  <a:schemeClr val="accent1"/>
+                </a:effectRef>
+                <a:fontRef idx="minor">
+                  <a:schemeClr val="tx1"/>
+                </a:fontRef>
+              </p:style>
+            </p:cxnSp>
+            <p:cxnSp>
+              <p:nvCxnSpPr>
+                <p:cNvPr id="57" name="Conector recto de flecha 56"/>
+                <p:cNvCxnSpPr>
+                  <a:stCxn id="7" idx="3"/>
+                </p:cNvCxnSpPr>
+                <p:nvPr/>
+              </p:nvCxnSpPr>
+              <p:spPr>
+                <a:xfrm flipV="1">
+                  <a:off x="7550682" y="4847259"/>
+                  <a:ext cx="4989806" cy="13651"/>
+                </a:xfrm>
+                <a:prstGeom prst="straightConnector1">
+                  <a:avLst/>
+                </a:prstGeom>
+                <a:ln w="28575">
+                  <a:solidFill>
+                    <a:srgbClr val="7240F0"/>
+                  </a:solidFill>
+                  <a:tailEnd type="triangle" w="lg" len="lg"/>
+                </a:ln>
+              </p:spPr>
+              <p:style>
+                <a:lnRef idx="1">
+                  <a:schemeClr val="accent1"/>
+                </a:lnRef>
+                <a:fillRef idx="0">
+                  <a:schemeClr val="accent1"/>
+                </a:fillRef>
+                <a:effectRef idx="0">
+                  <a:schemeClr val="accent1"/>
+                </a:effectRef>
+                <a:fontRef idx="minor">
+                  <a:schemeClr val="tx1"/>
+                </a:fontRef>
+              </p:style>
+            </p:cxnSp>
+          </p:grpSp>
+          <p:sp>
+            <p:nvSpPr>
+              <p:cNvPr id="92" name="Rectángulo redondeado 91"/>
+              <p:cNvSpPr/>
+              <p:nvPr/>
+            </p:nvSpPr>
+            <p:spPr>
+              <a:xfrm>
+                <a:off x="1759058" y="3976092"/>
+                <a:ext cx="10176268" cy="1805889"/>
+              </a:xfrm>
+              <a:prstGeom prst="roundRect">
+                <a:avLst>
+                  <a:gd name="adj" fmla="val 3452"/>
+                </a:avLst>
+              </a:prstGeom>
+              <a:noFill/>
+              <a:ln>
+                <a:solidFill>
+                  <a:schemeClr val="bg1">
+                    <a:lumMod val="75000"/>
+                  </a:schemeClr>
+                </a:solidFill>
+                <a:prstDash val="sysDash"/>
+              </a:ln>
+            </p:spPr>
+            <p:style>
+              <a:lnRef idx="2">
+                <a:schemeClr val="accent1">
+                  <a:shade val="50000"/>
+                </a:schemeClr>
+              </a:lnRef>
+              <a:fillRef idx="1">
+                <a:schemeClr val="accent1"/>
+              </a:fillRef>
+              <a:effectRef idx="0">
+                <a:schemeClr val="accent1"/>
+              </a:effectRef>
+              <a:fontRef idx="minor">
+                <a:schemeClr val="lt1"/>
+              </a:fontRef>
+            </p:style>
+            <p:txBody>
+              <a:bodyPr rtlCol="0" anchor="ctr"/>
+              <a:lstStyle/>
+              <a:p>
+                <a:pPr algn="ctr"/>
+                <a:endParaRPr lang="es-ES"/>
+              </a:p>
+            </p:txBody>
+          </p:sp>
+          <p:sp>
+            <p:nvSpPr>
+              <p:cNvPr id="93" name="CuadroTexto 92"/>
+              <p:cNvSpPr txBox="1"/>
+              <p:nvPr/>
+            </p:nvSpPr>
+            <p:spPr>
+              <a:xfrm>
+                <a:off x="1856288" y="374198"/>
+                <a:ext cx="3039200" cy="338554"/>
+              </a:xfrm>
+              <a:prstGeom prst="rect">
+                <a:avLst/>
+              </a:prstGeom>
+              <a:noFill/>
+            </p:spPr>
+            <p:txBody>
+              <a:bodyPr wrap="square" rtlCol="0">
+                <a:spAutoFit/>
+              </a:bodyPr>
+              <a:lstStyle/>
+              <a:p>
+                <a:r>
+                  <a:rPr lang="es-ES" sz="1600" b="1" dirty="0" smtClean="0">
+                    <a:solidFill>
+                      <a:schemeClr val="tx1">
+                        <a:lumMod val="50000"/>
+                        <a:lumOff val="50000"/>
+                      </a:schemeClr>
+                    </a:solidFill>
+                    <a:latin typeface="Arial Rounded MT Bold" panose="020F0704030504030204" pitchFamily="34" charset="0"/>
+                    <a:cs typeface="Aharoni" panose="02010803020104030203" pitchFamily="2" charset="-79"/>
+                  </a:rPr>
+                  <a:t>WATSON CONVERSATION</a:t>
+                </a:r>
+                <a:endParaRPr lang="es-ES" sz="1600" b="1" dirty="0">
+                  <a:solidFill>
+                    <a:schemeClr val="tx1">
+                      <a:lumMod val="50000"/>
+                      <a:lumOff val="50000"/>
+                    </a:schemeClr>
+                  </a:solidFill>
+                  <a:latin typeface="Arial Rounded MT Bold" panose="020F0704030504030204" pitchFamily="34" charset="0"/>
+                  <a:cs typeface="Aharoni" panose="02010803020104030203" pitchFamily="2" charset="-79"/>
+                </a:endParaRPr>
+              </a:p>
+            </p:txBody>
+          </p:sp>
+          <p:sp>
+            <p:nvSpPr>
+              <p:cNvPr id="98" name="Rectángulo redondeado 97"/>
+              <p:cNvSpPr/>
+              <p:nvPr/>
+            </p:nvSpPr>
+            <p:spPr>
+              <a:xfrm>
+                <a:off x="1759059" y="330554"/>
+                <a:ext cx="10176267" cy="3342037"/>
+              </a:xfrm>
+              <a:prstGeom prst="roundRect">
+                <a:avLst>
+                  <a:gd name="adj" fmla="val 3452"/>
+                </a:avLst>
+              </a:prstGeom>
+              <a:noFill/>
+              <a:ln>
+                <a:solidFill>
+                  <a:schemeClr val="bg1">
+                    <a:lumMod val="75000"/>
+                  </a:schemeClr>
+                </a:solidFill>
+                <a:prstDash val="sysDash"/>
+              </a:ln>
+            </p:spPr>
+            <p:style>
+              <a:lnRef idx="2">
+                <a:schemeClr val="accent1">
+                  <a:shade val="50000"/>
+                </a:schemeClr>
+              </a:lnRef>
+              <a:fillRef idx="1">
+                <a:schemeClr val="accent1"/>
+              </a:fillRef>
+              <a:effectRef idx="0">
+                <a:schemeClr val="accent1"/>
+              </a:effectRef>
+              <a:fontRef idx="minor">
+                <a:schemeClr val="lt1"/>
+              </a:fontRef>
+            </p:style>
+            <p:txBody>
+              <a:bodyPr rtlCol="0" anchor="ctr"/>
+              <a:lstStyle/>
+              <a:p>
+                <a:pPr algn="ctr"/>
+                <a:endParaRPr lang="es-ES"/>
+              </a:p>
+            </p:txBody>
+          </p:sp>
+          <p:sp>
+            <p:nvSpPr>
+              <p:cNvPr id="99" name="CuadroTexto 98"/>
+              <p:cNvSpPr txBox="1"/>
+              <p:nvPr/>
+            </p:nvSpPr>
+            <p:spPr>
+              <a:xfrm>
+                <a:off x="1912315" y="5337799"/>
+                <a:ext cx="2983174" cy="338554"/>
+              </a:xfrm>
+              <a:prstGeom prst="rect">
+                <a:avLst/>
+              </a:prstGeom>
+              <a:noFill/>
+            </p:spPr>
+            <p:txBody>
+              <a:bodyPr wrap="square" rtlCol="0">
+                <a:spAutoFit/>
+              </a:bodyPr>
+              <a:lstStyle/>
+              <a:p>
+                <a:r>
+                  <a:rPr lang="es-ES" sz="1600" b="1" dirty="0" smtClean="0">
+                    <a:solidFill>
+                      <a:schemeClr val="tx1">
+                        <a:lumMod val="50000"/>
+                        <a:lumOff val="50000"/>
+                      </a:schemeClr>
+                    </a:solidFill>
+                    <a:latin typeface="Arial Rounded MT Bold" panose="020F0704030504030204" pitchFamily="34" charset="0"/>
+                    <a:cs typeface="Aharoni" panose="02010803020104030203" pitchFamily="2" charset="-79"/>
+                  </a:rPr>
+                  <a:t>ORCHESTRATION ENGINE</a:t>
+                </a:r>
+                <a:endParaRPr lang="es-ES" sz="1600" b="1" dirty="0">
+                  <a:solidFill>
+                    <a:schemeClr val="tx1">
+                      <a:lumMod val="50000"/>
+                      <a:lumOff val="50000"/>
+                    </a:schemeClr>
+                  </a:solidFill>
+                  <a:latin typeface="Arial Rounded MT Bold" panose="020F0704030504030204" pitchFamily="34" charset="0"/>
+                  <a:cs typeface="Aharoni" panose="02010803020104030203" pitchFamily="2" charset="-79"/>
+                </a:endParaRPr>
+              </a:p>
+            </p:txBody>
+          </p:sp>
+        </p:grpSp>
+        <p:cxnSp>
+          <p:nvCxnSpPr>
+            <p:cNvPr id="34" name="Conector recto de flecha 33"/>
+            <p:cNvCxnSpPr/>
+            <p:nvPr/>
+          </p:nvCxnSpPr>
+          <p:spPr>
+            <a:xfrm flipH="1" flipV="1">
+              <a:off x="10331234" y="601677"/>
+              <a:ext cx="2" cy="1156745"/>
+            </a:xfrm>
+            <a:prstGeom prst="straightConnector1">
+              <a:avLst/>
+            </a:prstGeom>
+            <a:ln w="28575">
+              <a:solidFill>
+                <a:srgbClr val="7240F0"/>
+              </a:solidFill>
+              <a:tailEnd type="triangle" w="lg" len="lg"/>
+            </a:ln>
+          </p:spPr>
+          <p:style>
+            <a:lnRef idx="1">
+              <a:schemeClr val="accent1"/>
+            </a:lnRef>
+            <a:fillRef idx="0">
+              <a:schemeClr val="accent1"/>
+            </a:fillRef>
+            <a:effectRef idx="0">
+              <a:schemeClr val="accent1"/>
+            </a:effectRef>
+            <a:fontRef idx="minor">
+              <a:schemeClr val="tx1"/>
+            </a:fontRef>
+          </p:style>
+        </p:cxnSp>
+        <p:cxnSp>
+          <p:nvCxnSpPr>
+            <p:cNvPr id="40" name="Conector recto de flecha 39"/>
+            <p:cNvCxnSpPr/>
+            <p:nvPr/>
+          </p:nvCxnSpPr>
+          <p:spPr>
+            <a:xfrm flipH="1">
+              <a:off x="6814637" y="641859"/>
+              <a:ext cx="3532643" cy="12187"/>
+            </a:xfrm>
+            <a:prstGeom prst="straightConnector1">
+              <a:avLst/>
+            </a:prstGeom>
+            <a:ln w="28575">
+              <a:solidFill>
+                <a:srgbClr val="7240F0"/>
+              </a:solidFill>
+              <a:tailEnd type="triangle" w="lg" len="lg"/>
+            </a:ln>
+          </p:spPr>
+          <p:style>
+            <a:lnRef idx="1">
+              <a:schemeClr val="accent1"/>
+            </a:lnRef>
+            <a:fillRef idx="0">
+              <a:schemeClr val="accent1"/>
+            </a:fillRef>
+            <a:effectRef idx="0">
+              <a:schemeClr val="accent1"/>
+            </a:effectRef>
+            <a:fontRef idx="minor">
+              <a:schemeClr val="tx1"/>
+            </a:fontRef>
+          </p:style>
+        </p:cxnSp>
+        <p:cxnSp>
+          <p:nvCxnSpPr>
+            <p:cNvPr id="41" name="Conector recto de flecha 40"/>
+            <p:cNvCxnSpPr>
+              <a:endCxn id="24" idx="0"/>
+            </p:cNvCxnSpPr>
+            <p:nvPr/>
+          </p:nvCxnSpPr>
+          <p:spPr>
+            <a:xfrm flipH="1">
+              <a:off x="6823653" y="641858"/>
+              <a:ext cx="7029" cy="1129506"/>
+            </a:xfrm>
+            <a:prstGeom prst="straightConnector1">
+              <a:avLst/>
+            </a:prstGeom>
+            <a:ln w="28575">
+              <a:solidFill>
+                <a:srgbClr val="7240F0"/>
+              </a:solidFill>
+              <a:tailEnd type="triangle" w="lg" len="lg"/>
+            </a:ln>
+          </p:spPr>
+          <p:style>
+            <a:lnRef idx="1">
+              <a:schemeClr val="accent1"/>
+            </a:lnRef>
+            <a:fillRef idx="0">
+              <a:schemeClr val="accent1"/>
+            </a:fillRef>
+            <a:effectRef idx="0">
+              <a:schemeClr val="accent1"/>
+            </a:effectRef>
+            <a:fontRef idx="minor">
+              <a:schemeClr val="tx1"/>
+            </a:fontRef>
+          </p:style>
+        </p:cxnSp>
+        <p:sp>
+          <p:nvSpPr>
+            <p:cNvPr id="44" name="Decisión 43"/>
+            <p:cNvSpPr/>
+            <p:nvPr/>
+          </p:nvSpPr>
+          <p:spPr>
+            <a:xfrm>
+              <a:off x="9372896" y="1718716"/>
+              <a:ext cx="1896485" cy="1486745"/>
+            </a:xfrm>
+            <a:prstGeom prst="flowChartDecision">
+              <a:avLst/>
+            </a:prstGeom>
+            <a:noFill/>
+            <a:ln w="38100">
+              <a:solidFill>
+                <a:srgbClr val="46DACC"/>
+              </a:solidFill>
+              <a:prstDash val="sysDot"/>
+            </a:ln>
+          </p:spPr>
+          <p:style>
+            <a:lnRef idx="2">
+              <a:schemeClr val="accent1">
+                <a:shade val="50000"/>
+              </a:schemeClr>
+            </a:lnRef>
+            <a:fillRef idx="1">
+              <a:schemeClr val="accent1"/>
+            </a:fillRef>
+            <a:effectRef idx="0">
+              <a:schemeClr val="accent1"/>
+            </a:effectRef>
+            <a:fontRef idx="minor">
+              <a:schemeClr val="lt1"/>
+            </a:fontRef>
+          </p:style>
+          <p:txBody>
+            <a:bodyPr lIns="0" tIns="0" rIns="0" bIns="0" rtlCol="0" anchor="ctr"/>
+            <a:lstStyle/>
+            <a:p>
+              <a:pPr algn="ctr"/>
+              <a:r>
+                <a:rPr lang="es-ES" sz="1200" dirty="0" smtClean="0">
+                  <a:solidFill>
+                    <a:schemeClr val="tx1">
+                      <a:lumMod val="65000"/>
+                      <a:lumOff val="35000"/>
+                    </a:schemeClr>
+                  </a:solidFill>
+                  <a:latin typeface="Arial Rounded MT Bold" panose="020F0704030504030204" pitchFamily="34" charset="0"/>
+                </a:rPr>
+                <a:t>FIRST </a:t>
+              </a:r>
+            </a:p>
+            <a:p>
+              <a:pPr algn="ctr"/>
+              <a:r>
+                <a:rPr lang="es-ES" sz="1200" dirty="0" smtClean="0">
+                  <a:solidFill>
+                    <a:schemeClr val="tx1">
+                      <a:lumMod val="65000"/>
+                      <a:lumOff val="35000"/>
+                    </a:schemeClr>
+                  </a:solidFill>
+                  <a:latin typeface="Arial Rounded MT Bold" panose="020F0704030504030204" pitchFamily="34" charset="0"/>
+                </a:rPr>
+                <a:t>TIME</a:t>
+              </a:r>
+              <a:endParaRPr lang="es-ES" sz="1200" dirty="0">
+                <a:solidFill>
+                  <a:schemeClr val="tx1">
+                    <a:lumMod val="65000"/>
+                    <a:lumOff val="35000"/>
+                  </a:schemeClr>
+                </a:solidFill>
+                <a:latin typeface="Arial Rounded MT Bold" panose="020F0704030504030204" pitchFamily="34" charset="0"/>
+              </a:endParaRPr>
+            </a:p>
+          </p:txBody>
+        </p:sp>
+        <p:sp>
+          <p:nvSpPr>
+            <p:cNvPr id="56" name="CuadroTexto 55"/>
+            <p:cNvSpPr txBox="1"/>
+            <p:nvPr/>
+          </p:nvSpPr>
+          <p:spPr>
+            <a:xfrm>
+              <a:off x="6830682" y="1019162"/>
+              <a:ext cx="1524585" cy="369332"/>
+            </a:xfrm>
+            <a:prstGeom prst="rect">
+              <a:avLst/>
+            </a:prstGeom>
+            <a:noFill/>
+          </p:spPr>
+          <p:txBody>
+            <a:bodyPr wrap="none" rtlCol="0">
+              <a:spAutoFit/>
+            </a:bodyPr>
+            <a:lstStyle/>
+            <a:p>
+              <a:r>
+                <a:rPr lang="es-ES" b="1" dirty="0" smtClean="0">
+                  <a:solidFill>
+                    <a:srgbClr val="FF3300"/>
+                  </a:solidFill>
+                  <a:latin typeface="+mj-lt"/>
+                  <a:cs typeface="Aharoni" panose="02010803020104030203" pitchFamily="2" charset="-79"/>
+                </a:rPr>
+                <a:t>No </a:t>
+              </a:r>
+              <a:r>
+                <a:rPr lang="es-ES" b="1" dirty="0" smtClean="0">
+                  <a:solidFill>
+                    <a:srgbClr val="FF3300"/>
+                  </a:solidFill>
+                  <a:latin typeface="+mj-lt"/>
+                  <a:cs typeface="Aharoni" panose="02010803020104030203" pitchFamily="2" charset="-79"/>
+                </a:rPr>
+                <a:t>/ </a:t>
+              </a:r>
+              <a:r>
+                <a:rPr lang="es-ES" b="1" dirty="0" err="1" smtClean="0">
+                  <a:solidFill>
+                    <a:srgbClr val="FF3300"/>
+                  </a:solidFill>
+                  <a:latin typeface="+mj-lt"/>
+                  <a:cs typeface="Aharoni" panose="02010803020104030203" pitchFamily="2" charset="-79"/>
+                </a:rPr>
+                <a:t>Uncertain</a:t>
+              </a:r>
+              <a:endParaRPr lang="es-ES" b="1" dirty="0">
+                <a:solidFill>
+                  <a:srgbClr val="FF3300"/>
+                </a:solidFill>
+                <a:latin typeface="+mj-lt"/>
+                <a:cs typeface="Aharoni" panose="02010803020104030203" pitchFamily="2" charset="-79"/>
+              </a:endParaRPr>
+            </a:p>
+          </p:txBody>
+        </p:sp>
+        <p:sp>
+          <p:nvSpPr>
+            <p:cNvPr id="86" name="CuadroTexto 85"/>
+            <p:cNvSpPr txBox="1"/>
+            <p:nvPr/>
+          </p:nvSpPr>
+          <p:spPr>
+            <a:xfrm>
+              <a:off x="10347279" y="1013465"/>
+              <a:ext cx="475643" cy="369332"/>
+            </a:xfrm>
+            <a:prstGeom prst="rect">
+              <a:avLst/>
+            </a:prstGeom>
+            <a:noFill/>
+          </p:spPr>
+          <p:txBody>
+            <a:bodyPr wrap="none" rtlCol="0">
+              <a:spAutoFit/>
+            </a:bodyPr>
+            <a:lstStyle/>
+            <a:p>
+              <a:r>
+                <a:rPr lang="es-ES" b="1" dirty="0" smtClean="0">
+                  <a:solidFill>
+                    <a:srgbClr val="FF3300"/>
+                  </a:solidFill>
+                  <a:latin typeface="+mj-lt"/>
+                  <a:cs typeface="Aharoni" panose="02010803020104030203" pitchFamily="2" charset="-79"/>
+                </a:rPr>
+                <a:t>Yes</a:t>
+              </a:r>
+              <a:endParaRPr lang="es-ES" b="1" dirty="0">
+                <a:solidFill>
+                  <a:srgbClr val="FF3300"/>
+                </a:solidFill>
+                <a:latin typeface="+mj-lt"/>
+                <a:cs typeface="Aharoni" panose="02010803020104030203" pitchFamily="2" charset="-79"/>
+              </a:endParaRPr>
+            </a:p>
+          </p:txBody>
+        </p:sp>
+        <p:sp>
+          <p:nvSpPr>
+            <p:cNvPr id="87" name="CuadroTexto 86"/>
+            <p:cNvSpPr txBox="1"/>
+            <p:nvPr/>
+          </p:nvSpPr>
+          <p:spPr>
+            <a:xfrm>
+              <a:off x="11252755" y="2117759"/>
+              <a:ext cx="501419" cy="369332"/>
+            </a:xfrm>
+            <a:prstGeom prst="rect">
+              <a:avLst/>
+            </a:prstGeom>
+            <a:noFill/>
+          </p:spPr>
+          <p:txBody>
+            <a:bodyPr wrap="square" rtlCol="0">
+              <a:spAutoFit/>
+            </a:bodyPr>
+            <a:lstStyle/>
+            <a:p>
+              <a:r>
+                <a:rPr lang="es-ES" b="1" dirty="0" smtClean="0">
+                  <a:solidFill>
+                    <a:srgbClr val="FF3300"/>
+                  </a:solidFill>
+                  <a:latin typeface="+mj-lt"/>
+                  <a:cs typeface="Aharoni" panose="02010803020104030203" pitchFamily="2" charset="-79"/>
+                </a:rPr>
+                <a:t>No</a:t>
+              </a:r>
+              <a:endParaRPr lang="es-ES" b="1" dirty="0">
+                <a:solidFill>
+                  <a:srgbClr val="FF3300"/>
+                </a:solidFill>
+                <a:latin typeface="+mj-lt"/>
+                <a:cs typeface="Aharoni" panose="02010803020104030203" pitchFamily="2" charset="-79"/>
+              </a:endParaRPr>
+            </a:p>
+          </p:txBody>
+        </p:sp>
+        <p:cxnSp>
+          <p:nvCxnSpPr>
+            <p:cNvPr id="91" name="Conector recto de flecha 90"/>
+            <p:cNvCxnSpPr/>
+            <p:nvPr/>
+          </p:nvCxnSpPr>
+          <p:spPr>
+            <a:xfrm flipV="1">
+              <a:off x="12540488" y="2474522"/>
+              <a:ext cx="0" cy="2372737"/>
+            </a:xfrm>
+            <a:prstGeom prst="straightConnector1">
+              <a:avLst/>
+            </a:prstGeom>
+            <a:ln w="28575">
+              <a:solidFill>
+                <a:srgbClr val="7240F0"/>
+              </a:solidFill>
+              <a:tailEnd type="triangle" w="lg" len="lg"/>
+            </a:ln>
+          </p:spPr>
+          <p:style>
+            <a:lnRef idx="1">
+              <a:schemeClr val="accent1"/>
+            </a:lnRef>
+            <a:fillRef idx="0">
+              <a:schemeClr val="accent1"/>
+            </a:fillRef>
+            <a:effectRef idx="0">
+              <a:schemeClr val="accent1"/>
+            </a:effectRef>
+            <a:fontRef idx="minor">
+              <a:schemeClr val="tx1"/>
+            </a:fontRef>
+          </p:style>
+        </p:cxnSp>
+        <p:sp>
+          <p:nvSpPr>
+            <p:cNvPr id="100" name="CuadroTexto 99"/>
+            <p:cNvSpPr txBox="1"/>
+            <p:nvPr/>
+          </p:nvSpPr>
+          <p:spPr>
+            <a:xfrm>
+              <a:off x="10303700" y="1402954"/>
+              <a:ext cx="1137299" cy="338554"/>
+            </a:xfrm>
+            <a:prstGeom prst="rect">
+              <a:avLst/>
+            </a:prstGeom>
+            <a:noFill/>
+          </p:spPr>
+          <p:txBody>
+            <a:bodyPr wrap="none" rtlCol="0">
+              <a:spAutoFit/>
+            </a:bodyPr>
+            <a:lstStyle/>
+            <a:p>
+              <a:r>
+                <a:rPr lang="es-ES" sz="1600" dirty="0" smtClean="0">
+                  <a:solidFill>
+                    <a:schemeClr val="tx1">
+                      <a:lumMod val="50000"/>
+                      <a:lumOff val="50000"/>
+                    </a:schemeClr>
+                  </a:solidFill>
+                  <a:latin typeface="+mj-lt"/>
+                  <a:cs typeface="Aharoni" panose="02010803020104030203" pitchFamily="2" charset="-79"/>
+                </a:rPr>
+                <a:t>$</a:t>
+              </a:r>
+              <a:r>
+                <a:rPr lang="es-ES" sz="1600" dirty="0" err="1" smtClean="0">
+                  <a:solidFill>
+                    <a:schemeClr val="tx1">
+                      <a:lumMod val="50000"/>
+                      <a:lumOff val="50000"/>
+                    </a:schemeClr>
+                  </a:solidFill>
+                  <a:latin typeface="+mj-lt"/>
+                  <a:cs typeface="Aharoni" panose="02010803020104030203" pitchFamily="2" charset="-79"/>
+                </a:rPr>
+                <a:t>counter</a:t>
+              </a:r>
+              <a:r>
+                <a:rPr lang="es-ES" sz="1600" dirty="0" smtClean="0">
+                  <a:solidFill>
+                    <a:schemeClr val="tx1">
+                      <a:lumMod val="50000"/>
+                      <a:lumOff val="50000"/>
+                    </a:schemeClr>
+                  </a:solidFill>
+                  <a:latin typeface="+mj-lt"/>
+                  <a:cs typeface="Aharoni" panose="02010803020104030203" pitchFamily="2" charset="-79"/>
+                </a:rPr>
+                <a:t>=1</a:t>
+              </a:r>
+              <a:endParaRPr lang="es-ES" sz="1600" dirty="0">
+                <a:solidFill>
+                  <a:schemeClr val="tx1">
+                    <a:lumMod val="50000"/>
+                    <a:lumOff val="50000"/>
+                  </a:schemeClr>
+                </a:solidFill>
+                <a:latin typeface="+mj-lt"/>
+                <a:cs typeface="Aharoni" panose="02010803020104030203" pitchFamily="2" charset="-79"/>
+              </a:endParaRPr>
+            </a:p>
+          </p:txBody>
+        </p:sp>
+      </p:grpSp>
+    </p:spTree>
+    <p:extLst>
+      <p:ext uri="{BB962C8B-B14F-4D97-AF65-F5344CB8AC3E}">
+        <p14:creationId xmlns:p14="http://schemas.microsoft.com/office/powerpoint/2010/main" val="1409027070"/>
       </p:ext>
     </p:extLst>
   </p:cSld>

</xml_diff>

<commit_message>
avances memoria con intencion needed_ingredients
</commit_message>
<xml_diff>
--- a/memoria/images/Presentación1.pptx
+++ b/memoria/images/Presentación1.pptx
@@ -31,7 +31,9 @@
     <p:sldId id="279" r:id="rId25"/>
     <p:sldId id="280" r:id="rId26"/>
     <p:sldId id="281" r:id="rId27"/>
-    <p:sldId id="282" r:id="rId28"/>
+    <p:sldId id="286" r:id="rId28"/>
+    <p:sldId id="284" r:id="rId29"/>
+    <p:sldId id="287" r:id="rId30"/>
   </p:sldIdLst>
   <p:sldSz cx="12192000" cy="6858000"/>
   <p:notesSz cx="6858000" cy="9144000"/>
@@ -281,7 +283,7 @@
           <a:p>
             <a:fld id="{9C28449B-7E7F-4B22-B31C-7455ACE0523B}" type="datetimeFigureOut">
               <a:rPr lang="es-ES" smtClean="0"/>
-              <a:t>06/01/2018</a:t>
+              <a:t>07/01/2018</a:t>
             </a:fld>
             <a:endParaRPr lang="es-ES"/>
           </a:p>
@@ -451,7 +453,7 @@
           <a:p>
             <a:fld id="{9C28449B-7E7F-4B22-B31C-7455ACE0523B}" type="datetimeFigureOut">
               <a:rPr lang="es-ES" smtClean="0"/>
-              <a:t>06/01/2018</a:t>
+              <a:t>07/01/2018</a:t>
             </a:fld>
             <a:endParaRPr lang="es-ES"/>
           </a:p>
@@ -631,7 +633,7 @@
           <a:p>
             <a:fld id="{9C28449B-7E7F-4B22-B31C-7455ACE0523B}" type="datetimeFigureOut">
               <a:rPr lang="es-ES" smtClean="0"/>
-              <a:t>06/01/2018</a:t>
+              <a:t>07/01/2018</a:t>
             </a:fld>
             <a:endParaRPr lang="es-ES"/>
           </a:p>
@@ -801,7 +803,7 @@
           <a:p>
             <a:fld id="{9C28449B-7E7F-4B22-B31C-7455ACE0523B}" type="datetimeFigureOut">
               <a:rPr lang="es-ES" smtClean="0"/>
-              <a:t>06/01/2018</a:t>
+              <a:t>07/01/2018</a:t>
             </a:fld>
             <a:endParaRPr lang="es-ES"/>
           </a:p>
@@ -1047,7 +1049,7 @@
           <a:p>
             <a:fld id="{9C28449B-7E7F-4B22-B31C-7455ACE0523B}" type="datetimeFigureOut">
               <a:rPr lang="es-ES" smtClean="0"/>
-              <a:t>06/01/2018</a:t>
+              <a:t>07/01/2018</a:t>
             </a:fld>
             <a:endParaRPr lang="es-ES"/>
           </a:p>
@@ -1279,7 +1281,7 @@
           <a:p>
             <a:fld id="{9C28449B-7E7F-4B22-B31C-7455ACE0523B}" type="datetimeFigureOut">
               <a:rPr lang="es-ES" smtClean="0"/>
-              <a:t>06/01/2018</a:t>
+              <a:t>07/01/2018</a:t>
             </a:fld>
             <a:endParaRPr lang="es-ES"/>
           </a:p>
@@ -1646,7 +1648,7 @@
           <a:p>
             <a:fld id="{9C28449B-7E7F-4B22-B31C-7455ACE0523B}" type="datetimeFigureOut">
               <a:rPr lang="es-ES" smtClean="0"/>
-              <a:t>06/01/2018</a:t>
+              <a:t>07/01/2018</a:t>
             </a:fld>
             <a:endParaRPr lang="es-ES"/>
           </a:p>
@@ -1764,7 +1766,7 @@
           <a:p>
             <a:fld id="{9C28449B-7E7F-4B22-B31C-7455ACE0523B}" type="datetimeFigureOut">
               <a:rPr lang="es-ES" smtClean="0"/>
-              <a:t>06/01/2018</a:t>
+              <a:t>07/01/2018</a:t>
             </a:fld>
             <a:endParaRPr lang="es-ES"/>
           </a:p>
@@ -1859,7 +1861,7 @@
           <a:p>
             <a:fld id="{9C28449B-7E7F-4B22-B31C-7455ACE0523B}" type="datetimeFigureOut">
               <a:rPr lang="es-ES" smtClean="0"/>
-              <a:t>06/01/2018</a:t>
+              <a:t>07/01/2018</a:t>
             </a:fld>
             <a:endParaRPr lang="es-ES"/>
           </a:p>
@@ -2136,7 +2138,7 @@
           <a:p>
             <a:fld id="{9C28449B-7E7F-4B22-B31C-7455ACE0523B}" type="datetimeFigureOut">
               <a:rPr lang="es-ES" smtClean="0"/>
-              <a:t>06/01/2018</a:t>
+              <a:t>07/01/2018</a:t>
             </a:fld>
             <a:endParaRPr lang="es-ES"/>
           </a:p>
@@ -2389,7 +2391,7 @@
           <a:p>
             <a:fld id="{9C28449B-7E7F-4B22-B31C-7455ACE0523B}" type="datetimeFigureOut">
               <a:rPr lang="es-ES" smtClean="0"/>
-              <a:t>06/01/2018</a:t>
+              <a:t>07/01/2018</a:t>
             </a:fld>
             <a:endParaRPr lang="es-ES"/>
           </a:p>
@@ -2602,7 +2604,7 @@
           <a:p>
             <a:fld id="{9C28449B-7E7F-4B22-B31C-7455ACE0523B}" type="datetimeFigureOut">
               <a:rPr lang="es-ES" smtClean="0"/>
-              <a:t>06/01/2018</a:t>
+              <a:t>07/01/2018</a:t>
             </a:fld>
             <a:endParaRPr lang="es-ES"/>
           </a:p>
@@ -32599,56 +32601,56 @@
       </p:grpSpPr>
       <p:grpSp>
         <p:nvGrpSpPr>
-          <p:cNvPr id="96" name="Grupo 95"/>
+          <p:cNvPr id="130" name="Grupo 129"/>
           <p:cNvGrpSpPr/>
           <p:nvPr/>
         </p:nvGrpSpPr>
         <p:grpSpPr>
           <a:xfrm>
-            <a:off x="-1058778" y="128337"/>
-            <a:ext cx="15865642" cy="7780421"/>
-            <a:chOff x="-1058778" y="128337"/>
-            <a:chExt cx="15865642" cy="7780421"/>
+            <a:off x="-3513220" y="-2791326"/>
+            <a:ext cx="18408316" cy="10144626"/>
+            <a:chOff x="-3513220" y="-2791326"/>
+            <a:chExt cx="18408316" cy="10144626"/>
           </a:xfrm>
         </p:grpSpPr>
         <p:grpSp>
           <p:nvGrpSpPr>
-            <p:cNvPr id="97" name="Grupo 96"/>
+            <p:cNvPr id="125" name="Grupo 124"/>
             <p:cNvGrpSpPr/>
             <p:nvPr/>
           </p:nvGrpSpPr>
           <p:grpSpPr>
             <a:xfrm>
-              <a:off x="-1058778" y="128337"/>
-              <a:ext cx="15865642" cy="7780421"/>
-              <a:chOff x="-1058778" y="128337"/>
-              <a:chExt cx="15865642" cy="7780421"/>
+              <a:off x="-3513220" y="-2791326"/>
+              <a:ext cx="18408316" cy="10144626"/>
+              <a:chOff x="-3513220" y="-2791326"/>
+              <a:chExt cx="18408316" cy="10144626"/>
             </a:xfrm>
           </p:grpSpPr>
           <p:grpSp>
             <p:nvGrpSpPr>
-              <p:cNvPr id="89" name="Grupo 88"/>
+              <p:cNvPr id="116" name="Grupo 115"/>
               <p:cNvGrpSpPr/>
               <p:nvPr/>
             </p:nvGrpSpPr>
             <p:grpSpPr>
               <a:xfrm>
-                <a:off x="-1058778" y="128337"/>
-                <a:ext cx="15865642" cy="7780421"/>
-                <a:chOff x="-1058778" y="128337"/>
-                <a:chExt cx="15865642" cy="7780421"/>
+                <a:off x="-3513220" y="-2791326"/>
+                <a:ext cx="18408316" cy="10144626"/>
+                <a:chOff x="-3513220" y="-2791326"/>
+                <a:chExt cx="18408316" cy="10144626"/>
               </a:xfrm>
             </p:grpSpPr>
             <p:sp>
               <p:nvSpPr>
-                <p:cNvPr id="82" name="Rectángulo 81"/>
+                <p:cNvPr id="27" name="Rectángulo 26"/>
                 <p:cNvSpPr/>
                 <p:nvPr/>
               </p:nvSpPr>
               <p:spPr>
                 <a:xfrm>
-                  <a:off x="-1058778" y="128337"/>
-                  <a:ext cx="15865642" cy="7780421"/>
+                  <a:off x="-3513220" y="-2791326"/>
+                  <a:ext cx="18408316" cy="10144626"/>
                 </a:xfrm>
                 <a:prstGeom prst="rect">
                   <a:avLst/>
@@ -32693,7 +32695,7 @@
               </p:nvSpPr>
               <p:spPr>
                 <a:xfrm>
-                  <a:off x="2293372" y="1724085"/>
+                  <a:off x="-61144" y="1700763"/>
                   <a:ext cx="2205200" cy="1581874"/>
                 </a:xfrm>
                 <a:prstGeom prst="flowChartDecision">
@@ -32790,7 +32792,7 @@
               </p:nvSpPr>
               <p:spPr>
                 <a:xfrm>
-                  <a:off x="6110682" y="4320910"/>
+                  <a:off x="8952525" y="-332100"/>
                   <a:ext cx="1440000" cy="1080000"/>
                 </a:xfrm>
                 <a:prstGeom prst="roundRect">
@@ -32865,8 +32867,8 @@
               </p:nvCxnSpPr>
               <p:spPr>
                 <a:xfrm>
-                  <a:off x="411807" y="2515022"/>
-                  <a:ext cx="1881565" cy="0"/>
+                  <a:off x="-2017103" y="2491700"/>
+                  <a:ext cx="1955959" cy="0"/>
                 </a:xfrm>
                 <a:prstGeom prst="straightConnector1">
                   <a:avLst/>
@@ -32898,14 +32900,14 @@
                 <p:cNvPr id="15" name="Conector recto de flecha 14"/>
                 <p:cNvCxnSpPr>
                   <a:stCxn id="5" idx="3"/>
-                  <a:endCxn id="24" idx="1"/>
+                  <a:endCxn id="30" idx="1"/>
                 </p:cNvCxnSpPr>
                 <p:nvPr/>
               </p:nvCxnSpPr>
               <p:spPr>
-                <a:xfrm flipV="1">
-                  <a:off x="4498572" y="2491701"/>
-                  <a:ext cx="1213969" cy="23321"/>
+                <a:xfrm>
+                  <a:off x="2144056" y="2491700"/>
+                  <a:ext cx="1424590" cy="23322"/>
                 </a:xfrm>
                 <a:prstGeom prst="straightConnector1">
                   <a:avLst/>
@@ -32938,14 +32940,13 @@
                 <p:cNvPr id="35" name="Conector recto de flecha 34"/>
                 <p:cNvCxnSpPr>
                   <a:stCxn id="44" idx="3"/>
-                  <a:endCxn id="28" idx="2"/>
                 </p:cNvCxnSpPr>
                 <p:nvPr/>
               </p:nvCxnSpPr>
               <p:spPr>
                 <a:xfrm>
-                  <a:off x="11269381" y="2462089"/>
-                  <a:ext cx="1990863" cy="8901"/>
+                  <a:off x="7771895" y="5090366"/>
+                  <a:ext cx="3501733" cy="9335"/>
                 </a:xfrm>
                 <a:prstGeom prst="straightConnector1">
                   <a:avLst/>
@@ -32980,7 +32981,7 @@
               </p:nvSpPr>
               <p:spPr>
                 <a:xfrm>
-                  <a:off x="4498572" y="2172744"/>
+                  <a:off x="2079962" y="2083991"/>
                   <a:ext cx="475643" cy="369332"/>
                 </a:xfrm>
                 <a:prstGeom prst="rect">
@@ -33022,7 +33023,7 @@
               </p:nvSpPr>
               <p:spPr bwMode="auto">
                 <a:xfrm>
-                  <a:off x="6248593" y="6321982"/>
+                  <a:off x="8952525" y="-2547019"/>
                   <a:ext cx="1379397" cy="1304464"/>
                 </a:xfrm>
                 <a:prstGeom prst="roundRect">
@@ -33088,7 +33089,7 @@
               </p:nvSpPr>
               <p:spPr>
                 <a:xfrm>
-                  <a:off x="6547442" y="6436658"/>
+                  <a:off x="9251374" y="-2432343"/>
                   <a:ext cx="838443" cy="276999"/>
                 </a:xfrm>
                 <a:prstGeom prst="rect">
@@ -33126,7 +33127,7 @@
               </p:nvSpPr>
               <p:spPr>
                 <a:xfrm rot="16200000">
-                  <a:off x="6505707" y="5760625"/>
+                  <a:off x="9280456" y="-906882"/>
                   <a:ext cx="720000" cy="212903"/>
                 </a:xfrm>
                 <a:prstGeom prst="leftRightArrow">
@@ -33196,7 +33197,7 @@
               </p:blipFill>
               <p:spPr>
                 <a:xfrm>
-                  <a:off x="7014098" y="6903812"/>
+                  <a:off x="9718030" y="-1965189"/>
                   <a:ext cx="444124" cy="445566"/>
                 </a:xfrm>
                 <a:prstGeom prst="rect">
@@ -33226,7 +33227,7 @@
               </p:blipFill>
               <p:spPr>
                 <a:xfrm>
-                  <a:off x="6385650" y="6878019"/>
+                  <a:off x="9089582" y="-1990982"/>
                   <a:ext cx="586509" cy="539588"/>
                 </a:xfrm>
                 <a:prstGeom prst="rect">
@@ -33242,8 +33243,8 @@
               </p:nvSpPr>
               <p:spPr>
                 <a:xfrm>
-                  <a:off x="450142" y="2517445"/>
-                  <a:ext cx="1137299" cy="338554"/>
+                  <a:off x="-1986637" y="2532563"/>
+                  <a:ext cx="1584408" cy="584775"/>
                 </a:xfrm>
                 <a:prstGeom prst="rect">
                   <a:avLst/>
@@ -33295,6 +33296,47 @@
                     </a:rPr>
                     <a:t>=0</a:t>
                   </a:r>
+                </a:p>
+                <a:p>
+                  <a:r>
+                    <a:rPr lang="es-ES" sz="1600" dirty="0" smtClean="0">
+                      <a:solidFill>
+                        <a:schemeClr val="tx1">
+                          <a:lumMod val="50000"/>
+                          <a:lumOff val="50000"/>
+                        </a:schemeClr>
+                      </a:solidFill>
+                      <a:latin typeface="+mj-lt"/>
+                      <a:cs typeface="Aharoni" panose="02010803020104030203" pitchFamily="2" charset="-79"/>
+                    </a:rPr>
+                    <a:t>$</a:t>
+                  </a:r>
+                  <a:r>
+                    <a:rPr lang="es-ES" sz="1600" dirty="0" err="1" smtClean="0">
+                      <a:solidFill>
+                        <a:schemeClr val="tx1">
+                          <a:lumMod val="50000"/>
+                          <a:lumOff val="50000"/>
+                        </a:schemeClr>
+                      </a:solidFill>
+                      <a:latin typeface="+mj-lt"/>
+                      <a:cs typeface="Aharoni" panose="02010803020104030203" pitchFamily="2" charset="-79"/>
+                    </a:rPr>
+                    <a:t>Summary</a:t>
+                  </a:r>
+                  <a:r>
+                    <a:rPr lang="es-ES" sz="1600" dirty="0" smtClean="0">
+                      <a:solidFill>
+                        <a:schemeClr val="tx1">
+                          <a:lumMod val="50000"/>
+                          <a:lumOff val="50000"/>
+                        </a:schemeClr>
+                      </a:solidFill>
+                      <a:latin typeface="+mj-lt"/>
+                      <a:cs typeface="Aharoni" panose="02010803020104030203" pitchFamily="2" charset="-79"/>
+                    </a:rPr>
+                    <a:t>=False</a:t>
+                  </a:r>
                   <a:endParaRPr lang="es-ES" sz="1600" dirty="0">
                     <a:solidFill>
                       <a:schemeClr val="tx1">
@@ -33361,8 +33403,17 @@
                       </a:solidFill>
                       <a:latin typeface="Arial Rounded MT Bold" panose="020F0704030504030204" pitchFamily="34" charset="0"/>
                     </a:rPr>
-                    <a:t>CHECK SUMMARY</a:t>
+                    <a:t>CHECK</a:t>
                   </a:r>
+                  <a:endParaRPr lang="es-ES" sz="1200" dirty="0" smtClean="0">
+                    <a:solidFill>
+                      <a:schemeClr val="tx1">
+                        <a:lumMod val="65000"/>
+                        <a:lumOff val="35000"/>
+                      </a:schemeClr>
+                    </a:solidFill>
+                    <a:latin typeface="Arial Rounded MT Bold" panose="020F0704030504030204" pitchFamily="34" charset="0"/>
+                  </a:endParaRPr>
                 </a:p>
                 <a:p>
                   <a:pPr algn="ctr"/>
@@ -33413,7 +33464,7 @@
               </p:nvSpPr>
               <p:spPr>
                 <a:xfrm>
-                  <a:off x="-848193" y="2011022"/>
+                  <a:off x="-3277103" y="1987700"/>
                   <a:ext cx="1260000" cy="1008000"/>
                 </a:xfrm>
                 <a:prstGeom prst="ellipse">
@@ -33448,7 +33499,7 @@
                 <a:p>
                   <a:pPr algn="ctr"/>
                   <a:r>
-                    <a:rPr lang="es-ES" sz="1200" dirty="0" smtClean="0">
+                    <a:rPr lang="es-ES" sz="1600" dirty="0" smtClean="0">
                       <a:solidFill>
                         <a:schemeClr val="tx1">
                           <a:lumMod val="75000"/>
@@ -33514,7 +33565,7 @@
                 <a:p>
                   <a:pPr algn="ctr"/>
                   <a:r>
-                    <a:rPr lang="es-ES" sz="1200" dirty="0" smtClean="0">
+                    <a:rPr lang="es-ES" sz="1600" dirty="0" smtClean="0">
                       <a:solidFill>
                         <a:schemeClr val="tx1">
                           <a:lumMod val="75000"/>
@@ -33523,7 +33574,7 @@
                       </a:solidFill>
                       <a:latin typeface="Arial Rounded MT Bold" panose="020F0704030504030204" pitchFamily="34" charset="0"/>
                     </a:rPr>
-                    <a:t>RESPONSE</a:t>
+                    <a:t>END</a:t>
                   </a:r>
                   <a:endParaRPr lang="es-ES" sz="1200" dirty="0">
                     <a:solidFill>
@@ -33541,15 +33592,15 @@
               <p:nvCxnSpPr>
                 <p:cNvPr id="36" name="Conector recto de flecha 35"/>
                 <p:cNvCxnSpPr>
-                  <a:stCxn id="24" idx="3"/>
-                  <a:endCxn id="44" idx="1"/>
+                  <a:stCxn id="24" idx="2"/>
+                  <a:endCxn id="44" idx="0"/>
                 </p:cNvCxnSpPr>
                 <p:nvPr/>
               </p:nvCxnSpPr>
               <p:spPr>
-                <a:xfrm flipV="1">
-                  <a:off x="7934764" y="2462089"/>
-                  <a:ext cx="1438132" cy="29612"/>
+                <a:xfrm>
+                  <a:off x="6823653" y="3212037"/>
+                  <a:ext cx="0" cy="1134956"/>
                 </a:xfrm>
                 <a:prstGeom prst="straightConnector1">
                   <a:avLst/>
@@ -33584,7 +33635,7 @@
               </p:nvSpPr>
               <p:spPr>
                 <a:xfrm>
-                  <a:off x="7880792" y="2101658"/>
+                  <a:off x="6931077" y="3321311"/>
                   <a:ext cx="1055545" cy="369332"/>
                 </a:xfrm>
                 <a:prstGeom prst="rect">
@@ -33626,7 +33677,7 @@
               </p:nvSpPr>
               <p:spPr>
                 <a:xfrm>
-                  <a:off x="6830682" y="3154482"/>
+                  <a:off x="6355040" y="1378743"/>
                   <a:ext cx="475643" cy="369332"/>
                 </a:xfrm>
                 <a:prstGeom prst="rect">
@@ -33664,15 +33715,15 @@
               <p:nvCxnSpPr>
                 <p:cNvPr id="39" name="Conector recto de flecha 38"/>
                 <p:cNvCxnSpPr>
-                  <a:stCxn id="24" idx="2"/>
-                  <a:endCxn id="7" idx="0"/>
+                  <a:stCxn id="24" idx="3"/>
+                  <a:endCxn id="77" idx="1"/>
                 </p:cNvCxnSpPr>
                 <p:nvPr/>
               </p:nvCxnSpPr>
               <p:spPr>
-                <a:xfrm>
-                  <a:off x="6823653" y="3212037"/>
-                  <a:ext cx="7029" cy="1108873"/>
+                <a:xfrm flipV="1">
+                  <a:off x="7934764" y="2491208"/>
+                  <a:ext cx="2742048" cy="493"/>
                 </a:xfrm>
                 <a:prstGeom prst="straightConnector1">
                   <a:avLst/>
@@ -33709,8 +33760,8 @@
               </p:nvCxnSpPr>
               <p:spPr>
                 <a:xfrm flipV="1">
-                  <a:off x="7550682" y="4847259"/>
-                  <a:ext cx="4989806" cy="13651"/>
+                  <a:off x="10392525" y="188204"/>
+                  <a:ext cx="3443215" cy="19696"/>
                 </a:xfrm>
                 <a:prstGeom prst="straightConnector1">
                   <a:avLst/>
@@ -33737,31 +33788,1956 @@
                 </a:fontRef>
               </p:style>
             </p:cxnSp>
+            <p:sp>
+              <p:nvSpPr>
+                <p:cNvPr id="92" name="Rectángulo redondeado 91"/>
+                <p:cNvSpPr/>
+                <p:nvPr/>
+              </p:nvSpPr>
+              <p:spPr>
+                <a:xfrm>
+                  <a:off x="-443559" y="-802159"/>
+                  <a:ext cx="12908276" cy="1804437"/>
+                </a:xfrm>
+                <a:prstGeom prst="roundRect">
+                  <a:avLst>
+                    <a:gd name="adj" fmla="val 3452"/>
+                  </a:avLst>
+                </a:prstGeom>
+                <a:noFill/>
+                <a:ln>
+                  <a:solidFill>
+                    <a:schemeClr val="bg1">
+                      <a:lumMod val="75000"/>
+                    </a:schemeClr>
+                  </a:solidFill>
+                  <a:prstDash val="sysDash"/>
+                </a:ln>
+              </p:spPr>
+              <p:style>
+                <a:lnRef idx="2">
+                  <a:schemeClr val="accent1">
+                    <a:shade val="50000"/>
+                  </a:schemeClr>
+                </a:lnRef>
+                <a:fillRef idx="1">
+                  <a:schemeClr val="accent1"/>
+                </a:fillRef>
+                <a:effectRef idx="0">
+                  <a:schemeClr val="accent1"/>
+                </a:effectRef>
+                <a:fontRef idx="minor">
+                  <a:schemeClr val="lt1"/>
+                </a:fontRef>
+              </p:style>
+              <p:txBody>
+                <a:bodyPr rtlCol="0" anchor="ctr"/>
+                <a:lstStyle/>
+                <a:p>
+                  <a:pPr algn="ctr"/>
+                  <a:endParaRPr lang="es-ES"/>
+                </a:p>
+              </p:txBody>
+            </p:sp>
+            <p:sp>
+              <p:nvSpPr>
+                <p:cNvPr id="93" name="CuadroTexto 92"/>
+                <p:cNvSpPr txBox="1"/>
+                <p:nvPr/>
+              </p:nvSpPr>
+              <p:spPr>
+                <a:xfrm>
+                  <a:off x="0" y="6104050"/>
+                  <a:ext cx="3039200" cy="338554"/>
+                </a:xfrm>
+                <a:prstGeom prst="rect">
+                  <a:avLst/>
+                </a:prstGeom>
+                <a:noFill/>
+              </p:spPr>
+              <p:txBody>
+                <a:bodyPr wrap="square" rtlCol="0">
+                  <a:spAutoFit/>
+                </a:bodyPr>
+                <a:lstStyle/>
+                <a:p>
+                  <a:r>
+                    <a:rPr lang="es-ES" sz="1600" b="1" dirty="0" smtClean="0">
+                      <a:solidFill>
+                        <a:schemeClr val="tx1">
+                          <a:lumMod val="50000"/>
+                          <a:lumOff val="50000"/>
+                        </a:schemeClr>
+                      </a:solidFill>
+                      <a:latin typeface="Arial Rounded MT Bold" panose="020F0704030504030204" pitchFamily="34" charset="0"/>
+                      <a:cs typeface="Aharoni" panose="02010803020104030203" pitchFamily="2" charset="-79"/>
+                    </a:rPr>
+                    <a:t>WATSON CONVERSATION</a:t>
+                  </a:r>
+                  <a:endParaRPr lang="es-ES" sz="1600" b="1" dirty="0">
+                    <a:solidFill>
+                      <a:schemeClr val="tx1">
+                        <a:lumMod val="50000"/>
+                        <a:lumOff val="50000"/>
+                      </a:schemeClr>
+                    </a:solidFill>
+                    <a:latin typeface="Arial Rounded MT Bold" panose="020F0704030504030204" pitchFamily="34" charset="0"/>
+                    <a:cs typeface="Aharoni" panose="02010803020104030203" pitchFamily="2" charset="-79"/>
+                  </a:endParaRPr>
+                </a:p>
+              </p:txBody>
+            </p:sp>
+            <p:sp>
+              <p:nvSpPr>
+                <p:cNvPr id="98" name="Rectángulo redondeado 97"/>
+                <p:cNvSpPr/>
+                <p:nvPr/>
+              </p:nvSpPr>
+              <p:spPr>
+                <a:xfrm>
+                  <a:off x="-443560" y="1279632"/>
+                  <a:ext cx="12908277" cy="5377842"/>
+                </a:xfrm>
+                <a:prstGeom prst="roundRect">
+                  <a:avLst>
+                    <a:gd name="adj" fmla="val 3452"/>
+                  </a:avLst>
+                </a:prstGeom>
+                <a:noFill/>
+                <a:ln>
+                  <a:solidFill>
+                    <a:schemeClr val="bg1">
+                      <a:lumMod val="75000"/>
+                    </a:schemeClr>
+                  </a:solidFill>
+                  <a:prstDash val="sysDash"/>
+                </a:ln>
+              </p:spPr>
+              <p:style>
+                <a:lnRef idx="2">
+                  <a:schemeClr val="accent1">
+                    <a:shade val="50000"/>
+                  </a:schemeClr>
+                </a:lnRef>
+                <a:fillRef idx="1">
+                  <a:schemeClr val="accent1"/>
+                </a:fillRef>
+                <a:effectRef idx="0">
+                  <a:schemeClr val="accent1"/>
+                </a:effectRef>
+                <a:fontRef idx="minor">
+                  <a:schemeClr val="lt1"/>
+                </a:fontRef>
+              </p:style>
+              <p:txBody>
+                <a:bodyPr rtlCol="0" anchor="ctr"/>
+                <a:lstStyle/>
+                <a:p>
+                  <a:pPr algn="ctr"/>
+                  <a:endParaRPr lang="es-ES"/>
+                </a:p>
+              </p:txBody>
+            </p:sp>
+            <p:sp>
+              <p:nvSpPr>
+                <p:cNvPr id="99" name="CuadroTexto 98"/>
+                <p:cNvSpPr txBox="1"/>
+                <p:nvPr/>
+              </p:nvSpPr>
+              <p:spPr>
+                <a:xfrm>
+                  <a:off x="0" y="-628795"/>
+                  <a:ext cx="2983174" cy="338554"/>
+                </a:xfrm>
+                <a:prstGeom prst="rect">
+                  <a:avLst/>
+                </a:prstGeom>
+                <a:noFill/>
+              </p:spPr>
+              <p:txBody>
+                <a:bodyPr wrap="square" rtlCol="0">
+                  <a:spAutoFit/>
+                </a:bodyPr>
+                <a:lstStyle/>
+                <a:p>
+                  <a:r>
+                    <a:rPr lang="es-ES" sz="1600" b="1" dirty="0" smtClean="0">
+                      <a:solidFill>
+                        <a:schemeClr val="tx1">
+                          <a:lumMod val="50000"/>
+                          <a:lumOff val="50000"/>
+                        </a:schemeClr>
+                      </a:solidFill>
+                      <a:latin typeface="Arial Rounded MT Bold" panose="020F0704030504030204" pitchFamily="34" charset="0"/>
+                      <a:cs typeface="Aharoni" panose="02010803020104030203" pitchFamily="2" charset="-79"/>
+                    </a:rPr>
+                    <a:t>ORCHESTRATION ENGINE</a:t>
+                  </a:r>
+                  <a:endParaRPr lang="es-ES" sz="1600" b="1" dirty="0">
+                    <a:solidFill>
+                      <a:schemeClr val="tx1">
+                        <a:lumMod val="50000"/>
+                        <a:lumOff val="50000"/>
+                      </a:schemeClr>
+                    </a:solidFill>
+                    <a:latin typeface="Arial Rounded MT Bold" panose="020F0704030504030204" pitchFamily="34" charset="0"/>
+                    <a:cs typeface="Aharoni" panose="02010803020104030203" pitchFamily="2" charset="-79"/>
+                  </a:endParaRPr>
+                </a:p>
+              </p:txBody>
+            </p:sp>
+            <p:cxnSp>
+              <p:nvCxnSpPr>
+                <p:cNvPr id="34" name="Conector recto de flecha 33"/>
+                <p:cNvCxnSpPr/>
+                <p:nvPr/>
+              </p:nvCxnSpPr>
+              <p:spPr>
+                <a:xfrm flipH="1" flipV="1">
+                  <a:off x="2812129" y="2501036"/>
+                  <a:ext cx="4490" cy="2589329"/>
+                </a:xfrm>
+                <a:prstGeom prst="straightConnector1">
+                  <a:avLst/>
+                </a:prstGeom>
+                <a:ln w="28575">
+                  <a:solidFill>
+                    <a:srgbClr val="7240F0"/>
+                  </a:solidFill>
+                  <a:tailEnd type="triangle" w="lg" len="lg"/>
+                </a:ln>
+              </p:spPr>
+              <p:style>
+                <a:lnRef idx="1">
+                  <a:schemeClr val="accent1"/>
+                </a:lnRef>
+                <a:fillRef idx="0">
+                  <a:schemeClr val="accent1"/>
+                </a:fillRef>
+                <a:effectRef idx="0">
+                  <a:schemeClr val="accent1"/>
+                </a:effectRef>
+                <a:fontRef idx="minor">
+                  <a:schemeClr val="tx1"/>
+                </a:fontRef>
+              </p:style>
+            </p:cxnSp>
+            <p:cxnSp>
+              <p:nvCxnSpPr>
+                <p:cNvPr id="40" name="Conector recto de flecha 39"/>
+                <p:cNvCxnSpPr>
+                  <a:stCxn id="44" idx="1"/>
+                </p:cNvCxnSpPr>
+                <p:nvPr/>
+              </p:nvCxnSpPr>
+              <p:spPr>
+                <a:xfrm flipH="1">
+                  <a:off x="2812129" y="5090366"/>
+                  <a:ext cx="3063281" cy="9335"/>
+                </a:xfrm>
+                <a:prstGeom prst="straightConnector1">
+                  <a:avLst/>
+                </a:prstGeom>
+                <a:ln w="28575">
+                  <a:solidFill>
+                    <a:srgbClr val="7240F0"/>
+                  </a:solidFill>
+                  <a:tailEnd type="triangle" w="lg" len="lg"/>
+                </a:ln>
+              </p:spPr>
+              <p:style>
+                <a:lnRef idx="1">
+                  <a:schemeClr val="accent1"/>
+                </a:lnRef>
+                <a:fillRef idx="0">
+                  <a:schemeClr val="accent1"/>
+                </a:fillRef>
+                <a:effectRef idx="0">
+                  <a:schemeClr val="accent1"/>
+                </a:effectRef>
+                <a:fontRef idx="minor">
+                  <a:schemeClr val="tx1"/>
+                </a:fontRef>
+              </p:style>
+            </p:cxnSp>
+            <p:cxnSp>
+              <p:nvCxnSpPr>
+                <p:cNvPr id="41" name="Conector recto de flecha 40"/>
+                <p:cNvCxnSpPr/>
+                <p:nvPr/>
+              </p:nvCxnSpPr>
+              <p:spPr>
+                <a:xfrm flipH="1" flipV="1">
+                  <a:off x="6823653" y="205947"/>
+                  <a:ext cx="7030" cy="1565417"/>
+                </a:xfrm>
+                <a:prstGeom prst="straightConnector1">
+                  <a:avLst/>
+                </a:prstGeom>
+                <a:ln w="28575">
+                  <a:solidFill>
+                    <a:srgbClr val="7240F0"/>
+                  </a:solidFill>
+                  <a:tailEnd type="triangle" w="lg" len="lg"/>
+                </a:ln>
+              </p:spPr>
+              <p:style>
+                <a:lnRef idx="1">
+                  <a:schemeClr val="accent1"/>
+                </a:lnRef>
+                <a:fillRef idx="0">
+                  <a:schemeClr val="accent1"/>
+                </a:fillRef>
+                <a:effectRef idx="0">
+                  <a:schemeClr val="accent1"/>
+                </a:effectRef>
+                <a:fontRef idx="minor">
+                  <a:schemeClr val="tx1"/>
+                </a:fontRef>
+              </p:style>
+            </p:cxnSp>
+            <p:sp>
+              <p:nvSpPr>
+                <p:cNvPr id="44" name="Decisión 43"/>
+                <p:cNvSpPr/>
+                <p:nvPr/>
+              </p:nvSpPr>
+              <p:spPr>
+                <a:xfrm>
+                  <a:off x="5875410" y="4346993"/>
+                  <a:ext cx="1896485" cy="1486745"/>
+                </a:xfrm>
+                <a:prstGeom prst="flowChartDecision">
+                  <a:avLst/>
+                </a:prstGeom>
+                <a:noFill/>
+                <a:ln w="38100">
+                  <a:solidFill>
+                    <a:srgbClr val="46DACC"/>
+                  </a:solidFill>
+                  <a:prstDash val="sysDot"/>
+                </a:ln>
+              </p:spPr>
+              <p:style>
+                <a:lnRef idx="2">
+                  <a:schemeClr val="accent1">
+                    <a:shade val="50000"/>
+                  </a:schemeClr>
+                </a:lnRef>
+                <a:fillRef idx="1">
+                  <a:schemeClr val="accent1"/>
+                </a:fillRef>
+                <a:effectRef idx="0">
+                  <a:schemeClr val="accent1"/>
+                </a:effectRef>
+                <a:fontRef idx="minor">
+                  <a:schemeClr val="lt1"/>
+                </a:fontRef>
+              </p:style>
+              <p:txBody>
+                <a:bodyPr lIns="0" tIns="0" rIns="0" bIns="0" rtlCol="0" anchor="ctr"/>
+                <a:lstStyle/>
+                <a:p>
+                  <a:pPr algn="ctr"/>
+                  <a:r>
+                    <a:rPr lang="es-ES" sz="1200" dirty="0" smtClean="0">
+                      <a:solidFill>
+                        <a:schemeClr val="tx1">
+                          <a:lumMod val="65000"/>
+                          <a:lumOff val="35000"/>
+                        </a:schemeClr>
+                      </a:solidFill>
+                      <a:latin typeface="Arial Rounded MT Bold" panose="020F0704030504030204" pitchFamily="34" charset="0"/>
+                    </a:rPr>
+                    <a:t>FIRST </a:t>
+                  </a:r>
+                </a:p>
+                <a:p>
+                  <a:pPr algn="ctr"/>
+                  <a:r>
+                    <a:rPr lang="es-ES" sz="1200" dirty="0" smtClean="0">
+                      <a:solidFill>
+                        <a:schemeClr val="tx1">
+                          <a:lumMod val="65000"/>
+                          <a:lumOff val="35000"/>
+                        </a:schemeClr>
+                      </a:solidFill>
+                      <a:latin typeface="Arial Rounded MT Bold" panose="020F0704030504030204" pitchFamily="34" charset="0"/>
+                    </a:rPr>
+                    <a:t>TIME</a:t>
+                  </a:r>
+                  <a:endParaRPr lang="es-ES" sz="1200" dirty="0">
+                    <a:solidFill>
+                      <a:schemeClr val="tx1">
+                        <a:lumMod val="65000"/>
+                        <a:lumOff val="35000"/>
+                      </a:schemeClr>
+                    </a:solidFill>
+                    <a:latin typeface="Arial Rounded MT Bold" panose="020F0704030504030204" pitchFamily="34" charset="0"/>
+                  </a:endParaRPr>
+                </a:p>
+              </p:txBody>
+            </p:sp>
+            <p:sp>
+              <p:nvSpPr>
+                <p:cNvPr id="56" name="CuadroTexto 55"/>
+                <p:cNvSpPr txBox="1"/>
+                <p:nvPr/>
+              </p:nvSpPr>
+              <p:spPr>
+                <a:xfrm>
+                  <a:off x="7850178" y="2060626"/>
+                  <a:ext cx="1524585" cy="369332"/>
+                </a:xfrm>
+                <a:prstGeom prst="rect">
+                  <a:avLst/>
+                </a:prstGeom>
+                <a:noFill/>
+              </p:spPr>
+              <p:txBody>
+                <a:bodyPr wrap="none" rtlCol="0">
+                  <a:spAutoFit/>
+                </a:bodyPr>
+                <a:lstStyle/>
+                <a:p>
+                  <a:r>
+                    <a:rPr lang="es-ES" b="1" dirty="0" smtClean="0">
+                      <a:solidFill>
+                        <a:srgbClr val="FF3300"/>
+                      </a:solidFill>
+                      <a:latin typeface="+mj-lt"/>
+                      <a:cs typeface="Aharoni" panose="02010803020104030203" pitchFamily="2" charset="-79"/>
+                    </a:rPr>
+                    <a:t>No / </a:t>
+                  </a:r>
+                  <a:r>
+                    <a:rPr lang="es-ES" b="1" dirty="0" err="1" smtClean="0">
+                      <a:solidFill>
+                        <a:srgbClr val="FF3300"/>
+                      </a:solidFill>
+                      <a:latin typeface="+mj-lt"/>
+                      <a:cs typeface="Aharoni" panose="02010803020104030203" pitchFamily="2" charset="-79"/>
+                    </a:rPr>
+                    <a:t>Uncertain</a:t>
+                  </a:r>
+                  <a:endParaRPr lang="es-ES" b="1" dirty="0">
+                    <a:solidFill>
+                      <a:srgbClr val="FF3300"/>
+                    </a:solidFill>
+                    <a:latin typeface="+mj-lt"/>
+                    <a:cs typeface="Aharoni" panose="02010803020104030203" pitchFamily="2" charset="-79"/>
+                  </a:endParaRPr>
+                </a:p>
+              </p:txBody>
+            </p:sp>
+            <p:sp>
+              <p:nvSpPr>
+                <p:cNvPr id="86" name="CuadroTexto 85"/>
+                <p:cNvSpPr txBox="1"/>
+                <p:nvPr/>
+              </p:nvSpPr>
+              <p:spPr>
+                <a:xfrm>
+                  <a:off x="5357828" y="4669276"/>
+                  <a:ext cx="475643" cy="369332"/>
+                </a:xfrm>
+                <a:prstGeom prst="rect">
+                  <a:avLst/>
+                </a:prstGeom>
+                <a:noFill/>
+              </p:spPr>
+              <p:txBody>
+                <a:bodyPr wrap="none" rtlCol="0">
+                  <a:spAutoFit/>
+                </a:bodyPr>
+                <a:lstStyle/>
+                <a:p>
+                  <a:r>
+                    <a:rPr lang="es-ES" b="1" dirty="0" smtClean="0">
+                      <a:solidFill>
+                        <a:srgbClr val="FF3300"/>
+                      </a:solidFill>
+                      <a:latin typeface="+mj-lt"/>
+                      <a:cs typeface="Aharoni" panose="02010803020104030203" pitchFamily="2" charset="-79"/>
+                    </a:rPr>
+                    <a:t>Yes</a:t>
+                  </a:r>
+                  <a:endParaRPr lang="es-ES" b="1" dirty="0">
+                    <a:solidFill>
+                      <a:srgbClr val="FF3300"/>
+                    </a:solidFill>
+                    <a:latin typeface="+mj-lt"/>
+                    <a:cs typeface="Aharoni" panose="02010803020104030203" pitchFamily="2" charset="-79"/>
+                  </a:endParaRPr>
+                </a:p>
+              </p:txBody>
+            </p:sp>
+            <p:sp>
+              <p:nvSpPr>
+                <p:cNvPr id="87" name="CuadroTexto 86"/>
+                <p:cNvSpPr txBox="1"/>
+                <p:nvPr/>
+              </p:nvSpPr>
+              <p:spPr>
+                <a:xfrm>
+                  <a:off x="7735912" y="4705793"/>
+                  <a:ext cx="501419" cy="369332"/>
+                </a:xfrm>
+                <a:prstGeom prst="rect">
+                  <a:avLst/>
+                </a:prstGeom>
+                <a:noFill/>
+              </p:spPr>
+              <p:txBody>
+                <a:bodyPr wrap="square" rtlCol="0">
+                  <a:spAutoFit/>
+                </a:bodyPr>
+                <a:lstStyle/>
+                <a:p>
+                  <a:r>
+                    <a:rPr lang="es-ES" b="1" dirty="0" smtClean="0">
+                      <a:solidFill>
+                        <a:srgbClr val="FF3300"/>
+                      </a:solidFill>
+                      <a:latin typeface="+mj-lt"/>
+                      <a:cs typeface="Aharoni" panose="02010803020104030203" pitchFamily="2" charset="-79"/>
+                    </a:rPr>
+                    <a:t>No</a:t>
+                  </a:r>
+                  <a:endParaRPr lang="es-ES" b="1" dirty="0">
+                    <a:solidFill>
+                      <a:srgbClr val="FF3300"/>
+                    </a:solidFill>
+                    <a:latin typeface="+mj-lt"/>
+                    <a:cs typeface="Aharoni" panose="02010803020104030203" pitchFamily="2" charset="-79"/>
+                  </a:endParaRPr>
+                </a:p>
+              </p:txBody>
+            </p:sp>
+            <p:cxnSp>
+              <p:nvCxnSpPr>
+                <p:cNvPr id="91" name="Conector recto de flecha 90"/>
+                <p:cNvCxnSpPr>
+                  <a:endCxn id="77" idx="2"/>
+                </p:cNvCxnSpPr>
+                <p:nvPr/>
+              </p:nvCxnSpPr>
+              <p:spPr>
+                <a:xfrm flipV="1">
+                  <a:off x="11273628" y="2824951"/>
+                  <a:ext cx="1" cy="2250174"/>
+                </a:xfrm>
+                <a:prstGeom prst="straightConnector1">
+                  <a:avLst/>
+                </a:prstGeom>
+                <a:ln w="28575">
+                  <a:solidFill>
+                    <a:srgbClr val="7240F0"/>
+                  </a:solidFill>
+                  <a:tailEnd type="triangle" w="lg" len="lg"/>
+                </a:ln>
+              </p:spPr>
+              <p:style>
+                <a:lnRef idx="1">
+                  <a:schemeClr val="accent1"/>
+                </a:lnRef>
+                <a:fillRef idx="0">
+                  <a:schemeClr val="accent1"/>
+                </a:fillRef>
+                <a:effectRef idx="0">
+                  <a:schemeClr val="accent1"/>
+                </a:effectRef>
+                <a:fontRef idx="minor">
+                  <a:schemeClr val="tx1"/>
+                </a:fontRef>
+              </p:style>
+            </p:cxnSp>
+            <p:sp>
+              <p:nvSpPr>
+                <p:cNvPr id="100" name="CuadroTexto 99"/>
+                <p:cNvSpPr txBox="1"/>
+                <p:nvPr/>
+              </p:nvSpPr>
+              <p:spPr>
+                <a:xfrm>
+                  <a:off x="4951240" y="5186210"/>
+                  <a:ext cx="1137299" cy="338554"/>
+                </a:xfrm>
+                <a:prstGeom prst="rect">
+                  <a:avLst/>
+                </a:prstGeom>
+                <a:noFill/>
+              </p:spPr>
+              <p:txBody>
+                <a:bodyPr wrap="none" rtlCol="0">
+                  <a:spAutoFit/>
+                </a:bodyPr>
+                <a:lstStyle/>
+                <a:p>
+                  <a:r>
+                    <a:rPr lang="es-ES" sz="1600" dirty="0" smtClean="0">
+                      <a:solidFill>
+                        <a:schemeClr val="tx1">
+                          <a:lumMod val="50000"/>
+                          <a:lumOff val="50000"/>
+                        </a:schemeClr>
+                      </a:solidFill>
+                      <a:latin typeface="+mj-lt"/>
+                      <a:cs typeface="Aharoni" panose="02010803020104030203" pitchFamily="2" charset="-79"/>
+                    </a:rPr>
+                    <a:t>$</a:t>
+                  </a:r>
+                  <a:r>
+                    <a:rPr lang="es-ES" sz="1600" dirty="0" err="1" smtClean="0">
+                      <a:solidFill>
+                        <a:schemeClr val="tx1">
+                          <a:lumMod val="50000"/>
+                          <a:lumOff val="50000"/>
+                        </a:schemeClr>
+                      </a:solidFill>
+                      <a:latin typeface="+mj-lt"/>
+                      <a:cs typeface="Aharoni" panose="02010803020104030203" pitchFamily="2" charset="-79"/>
+                    </a:rPr>
+                    <a:t>counter</a:t>
+                  </a:r>
+                  <a:r>
+                    <a:rPr lang="es-ES" sz="1600" dirty="0" smtClean="0">
+                      <a:solidFill>
+                        <a:schemeClr val="tx1">
+                          <a:lumMod val="50000"/>
+                          <a:lumOff val="50000"/>
+                        </a:schemeClr>
+                      </a:solidFill>
+                      <a:latin typeface="+mj-lt"/>
+                      <a:cs typeface="Aharoni" panose="02010803020104030203" pitchFamily="2" charset="-79"/>
+                    </a:rPr>
+                    <a:t>=1</a:t>
+                  </a:r>
+                  <a:endParaRPr lang="es-ES" sz="1600" dirty="0">
+                    <a:solidFill>
+                      <a:schemeClr val="tx1">
+                        <a:lumMod val="50000"/>
+                        <a:lumOff val="50000"/>
+                      </a:schemeClr>
+                    </a:solidFill>
+                    <a:latin typeface="+mj-lt"/>
+                    <a:cs typeface="Aharoni" panose="02010803020104030203" pitchFamily="2" charset="-79"/>
+                  </a:endParaRPr>
+                </a:p>
+              </p:txBody>
+            </p:sp>
+            <p:cxnSp>
+              <p:nvCxnSpPr>
+                <p:cNvPr id="70" name="Conector recto de flecha 69"/>
+                <p:cNvCxnSpPr>
+                  <a:stCxn id="77" idx="3"/>
+                  <a:endCxn id="28" idx="2"/>
+                </p:cNvCxnSpPr>
+                <p:nvPr/>
+              </p:nvCxnSpPr>
+              <p:spPr>
+                <a:xfrm flipV="1">
+                  <a:off x="11870445" y="2470990"/>
+                  <a:ext cx="1389799" cy="20218"/>
+                </a:xfrm>
+                <a:prstGeom prst="straightConnector1">
+                  <a:avLst/>
+                </a:prstGeom>
+                <a:ln w="28575">
+                  <a:solidFill>
+                    <a:srgbClr val="7240F0"/>
+                  </a:solidFill>
+                  <a:tailEnd type="triangle" w="lg" len="lg"/>
+                </a:ln>
+              </p:spPr>
+              <p:style>
+                <a:lnRef idx="1">
+                  <a:schemeClr val="accent1"/>
+                </a:lnRef>
+                <a:fillRef idx="0">
+                  <a:schemeClr val="accent1"/>
+                </a:fillRef>
+                <a:effectRef idx="0">
+                  <a:schemeClr val="accent1"/>
+                </a:effectRef>
+                <a:fontRef idx="minor">
+                  <a:schemeClr val="tx1"/>
+                </a:fontRef>
+              </p:style>
+            </p:cxnSp>
+            <p:cxnSp>
+              <p:nvCxnSpPr>
+                <p:cNvPr id="75" name="Conector recto de flecha 74"/>
+                <p:cNvCxnSpPr>
+                  <a:endCxn id="7" idx="1"/>
+                </p:cNvCxnSpPr>
+                <p:nvPr/>
+              </p:nvCxnSpPr>
+              <p:spPr>
+                <a:xfrm flipV="1">
+                  <a:off x="6830683" y="207900"/>
+                  <a:ext cx="2121842" cy="5691"/>
+                </a:xfrm>
+                <a:prstGeom prst="straightConnector1">
+                  <a:avLst/>
+                </a:prstGeom>
+                <a:ln w="28575">
+                  <a:solidFill>
+                    <a:srgbClr val="7240F0"/>
+                  </a:solidFill>
+                  <a:tailEnd type="triangle" w="lg" len="lg"/>
+                </a:ln>
+              </p:spPr>
+              <p:style>
+                <a:lnRef idx="1">
+                  <a:schemeClr val="accent1"/>
+                </a:lnRef>
+                <a:fillRef idx="0">
+                  <a:schemeClr val="accent1"/>
+                </a:fillRef>
+                <a:effectRef idx="0">
+                  <a:schemeClr val="accent1"/>
+                </a:effectRef>
+                <a:fontRef idx="minor">
+                  <a:schemeClr val="tx1"/>
+                </a:fontRef>
+              </p:style>
+            </p:cxnSp>
+            <p:cxnSp>
+              <p:nvCxnSpPr>
+                <p:cNvPr id="46" name="Conector recto de flecha 45"/>
+                <p:cNvCxnSpPr>
+                  <a:stCxn id="30" idx="3"/>
+                  <a:endCxn id="24" idx="1"/>
+                </p:cNvCxnSpPr>
+                <p:nvPr/>
+              </p:nvCxnSpPr>
+              <p:spPr>
+                <a:xfrm flipV="1">
+                  <a:off x="4741961" y="2491701"/>
+                  <a:ext cx="970580" cy="23321"/>
+                </a:xfrm>
+                <a:prstGeom prst="straightConnector1">
+                  <a:avLst/>
+                </a:prstGeom>
+                <a:ln w="28575" cmpd="sng">
+                  <a:solidFill>
+                    <a:srgbClr val="7240F0"/>
+                  </a:solidFill>
+                  <a:prstDash val="solid"/>
+                  <a:tailEnd type="triangle" w="lg" len="lg"/>
+                </a:ln>
+              </p:spPr>
+              <p:style>
+                <a:lnRef idx="1">
+                  <a:schemeClr val="accent1"/>
+                </a:lnRef>
+                <a:fillRef idx="0">
+                  <a:schemeClr val="accent1"/>
+                </a:fillRef>
+                <a:effectRef idx="0">
+                  <a:schemeClr val="accent1"/>
+                </a:effectRef>
+                <a:fontRef idx="minor">
+                  <a:schemeClr val="tx1"/>
+                </a:fontRef>
+              </p:style>
+            </p:cxnSp>
+            <p:sp>
+              <p:nvSpPr>
+                <p:cNvPr id="30" name="Llamada rectangular redondeada 29"/>
+                <p:cNvSpPr/>
+                <p:nvPr/>
+              </p:nvSpPr>
+              <p:spPr>
+                <a:xfrm>
+                  <a:off x="3568646" y="2169595"/>
+                  <a:ext cx="1173315" cy="690853"/>
+                </a:xfrm>
+                <a:prstGeom prst="wedgeRoundRectCallout">
+                  <a:avLst>
+                    <a:gd name="adj1" fmla="val -36481"/>
+                    <a:gd name="adj2" fmla="val 82700"/>
+                    <a:gd name="adj3" fmla="val 16667"/>
+                  </a:avLst>
+                </a:prstGeom>
+                <a:noFill/>
+                <a:ln w="38100">
+                  <a:solidFill>
+                    <a:srgbClr val="46DACC"/>
+                  </a:solidFill>
+                </a:ln>
+              </p:spPr>
+              <p:style>
+                <a:lnRef idx="2">
+                  <a:schemeClr val="accent1">
+                    <a:shade val="50000"/>
+                  </a:schemeClr>
+                </a:lnRef>
+                <a:fillRef idx="1">
+                  <a:schemeClr val="accent1"/>
+                </a:fillRef>
+                <a:effectRef idx="0">
+                  <a:schemeClr val="accent1"/>
+                </a:effectRef>
+                <a:fontRef idx="minor">
+                  <a:schemeClr val="lt1"/>
+                </a:fontRef>
+              </p:style>
+              <p:txBody>
+                <a:bodyPr rtlCol="0" anchor="ctr"/>
+                <a:lstStyle/>
+                <a:p>
+                  <a:pPr algn="ctr"/>
+                  <a:endParaRPr lang="es-ES" sz="1400" dirty="0" smtClean="0">
+                    <a:solidFill>
+                      <a:schemeClr val="tx1">
+                        <a:lumMod val="75000"/>
+                        <a:lumOff val="25000"/>
+                      </a:schemeClr>
+                    </a:solidFill>
+                    <a:latin typeface="Arial Rounded MT Bold" panose="020F0704030504030204" pitchFamily="34" charset="0"/>
+                  </a:endParaRPr>
+                </a:p>
+                <a:p>
+                  <a:pPr algn="ctr"/>
+                  <a:r>
+                    <a:rPr lang="es-ES" sz="1200" dirty="0" smtClean="0">
+                      <a:solidFill>
+                        <a:schemeClr val="tx1">
+                          <a:lumMod val="75000"/>
+                          <a:lumOff val="25000"/>
+                        </a:schemeClr>
+                      </a:solidFill>
+                      <a:latin typeface="Arial Rounded MT Bold" panose="020F0704030504030204" pitchFamily="34" charset="0"/>
+                    </a:rPr>
+                    <a:t>SUMMARY</a:t>
+                  </a:r>
+                  <a:r>
+                    <a:rPr lang="es-ES" sz="1200" dirty="0">
+                      <a:solidFill>
+                        <a:schemeClr val="tx1">
+                          <a:lumMod val="75000"/>
+                          <a:lumOff val="25000"/>
+                        </a:schemeClr>
+                      </a:solidFill>
+                      <a:latin typeface="Arial Rounded MT Bold" panose="020F0704030504030204" pitchFamily="34" charset="0"/>
+                    </a:rPr>
+                    <a:t>?</a:t>
+                  </a:r>
+                </a:p>
+                <a:p>
+                  <a:pPr algn="ctr"/>
+                  <a:endParaRPr lang="es-ES" dirty="0"/>
+                </a:p>
+              </p:txBody>
+            </p:sp>
+            <p:sp>
+              <p:nvSpPr>
+                <p:cNvPr id="77" name="Llamada rectangular redondeada 76"/>
+                <p:cNvSpPr/>
+                <p:nvPr/>
+              </p:nvSpPr>
+              <p:spPr>
+                <a:xfrm>
+                  <a:off x="10676812" y="2157464"/>
+                  <a:ext cx="1193633" cy="667487"/>
+                </a:xfrm>
+                <a:prstGeom prst="wedgeRoundRectCallout">
+                  <a:avLst>
+                    <a:gd name="adj1" fmla="val -36481"/>
+                    <a:gd name="adj2" fmla="val 82700"/>
+                    <a:gd name="adj3" fmla="val 16667"/>
+                  </a:avLst>
+                </a:prstGeom>
+                <a:noFill/>
+                <a:ln w="38100">
+                  <a:solidFill>
+                    <a:srgbClr val="46DACC"/>
+                  </a:solidFill>
+                </a:ln>
+              </p:spPr>
+              <p:style>
+                <a:lnRef idx="2">
+                  <a:schemeClr val="accent1">
+                    <a:shade val="50000"/>
+                  </a:schemeClr>
+                </a:lnRef>
+                <a:fillRef idx="1">
+                  <a:schemeClr val="accent1"/>
+                </a:fillRef>
+                <a:effectRef idx="0">
+                  <a:schemeClr val="accent1"/>
+                </a:effectRef>
+                <a:fontRef idx="minor">
+                  <a:schemeClr val="lt1"/>
+                </a:fontRef>
+              </p:style>
+              <p:txBody>
+                <a:bodyPr rtlCol="0" anchor="ctr"/>
+                <a:lstStyle/>
+                <a:p>
+                  <a:pPr algn="ctr"/>
+                  <a:endParaRPr lang="es-ES" sz="1400" dirty="0" smtClean="0">
+                    <a:solidFill>
+                      <a:schemeClr val="tx1">
+                        <a:lumMod val="75000"/>
+                        <a:lumOff val="25000"/>
+                      </a:schemeClr>
+                    </a:solidFill>
+                    <a:latin typeface="Arial Rounded MT Bold" panose="020F0704030504030204" pitchFamily="34" charset="0"/>
+                  </a:endParaRPr>
+                </a:p>
+                <a:p>
+                  <a:pPr algn="ctr"/>
+                  <a:r>
+                    <a:rPr lang="es-ES" sz="1200" dirty="0" smtClean="0">
+                      <a:solidFill>
+                        <a:schemeClr val="tx1">
+                          <a:lumMod val="75000"/>
+                          <a:lumOff val="25000"/>
+                        </a:schemeClr>
+                      </a:solidFill>
+                      <a:latin typeface="Arial Rounded MT Bold" panose="020F0704030504030204" pitchFamily="34" charset="0"/>
+                    </a:rPr>
+                    <a:t>ANYTHING ELSE?</a:t>
+                  </a:r>
+                  <a:endParaRPr lang="es-ES" sz="1200" dirty="0">
+                    <a:solidFill>
+                      <a:schemeClr val="tx1">
+                        <a:lumMod val="75000"/>
+                        <a:lumOff val="25000"/>
+                      </a:schemeClr>
+                    </a:solidFill>
+                    <a:latin typeface="Arial Rounded MT Bold" panose="020F0704030504030204" pitchFamily="34" charset="0"/>
+                  </a:endParaRPr>
+                </a:p>
+                <a:p>
+                  <a:pPr algn="ctr"/>
+                  <a:endParaRPr lang="es-ES" dirty="0"/>
+                </a:p>
+              </p:txBody>
+            </p:sp>
+            <p:cxnSp>
+              <p:nvCxnSpPr>
+                <p:cNvPr id="103" name="Conector recto de flecha 102"/>
+                <p:cNvCxnSpPr/>
+                <p:nvPr/>
+              </p:nvCxnSpPr>
+              <p:spPr>
+                <a:xfrm>
+                  <a:off x="13835740" y="172963"/>
+                  <a:ext cx="0" cy="1814737"/>
+                </a:xfrm>
+                <a:prstGeom prst="straightConnector1">
+                  <a:avLst/>
+                </a:prstGeom>
+                <a:ln w="28575">
+                  <a:solidFill>
+                    <a:srgbClr val="7240F0"/>
+                  </a:solidFill>
+                  <a:tailEnd type="triangle" w="lg" len="lg"/>
+                </a:ln>
+              </p:spPr>
+              <p:style>
+                <a:lnRef idx="1">
+                  <a:schemeClr val="accent1"/>
+                </a:lnRef>
+                <a:fillRef idx="0">
+                  <a:schemeClr val="accent1"/>
+                </a:fillRef>
+                <a:effectRef idx="0">
+                  <a:schemeClr val="accent1"/>
+                </a:effectRef>
+                <a:fontRef idx="minor">
+                  <a:schemeClr val="tx1"/>
+                </a:fontRef>
+              </p:style>
+            </p:cxnSp>
+            <p:pic>
+              <p:nvPicPr>
+                <p:cNvPr id="115" name="Imagen 114"/>
+                <p:cNvPicPr>
+                  <a:picLocks noChangeAspect="1"/>
+                </p:cNvPicPr>
+                <p:nvPr/>
+              </p:nvPicPr>
+              <p:blipFill>
+                <a:blip r:embed="rId4" cstate="print">
+                  <a:duotone>
+                    <a:schemeClr val="bg2">
+                      <a:shade val="45000"/>
+                      <a:satMod val="135000"/>
+                    </a:schemeClr>
+                    <a:prstClr val="white"/>
+                  </a:duotone>
+                  <a:extLst>
+                    <a:ext uri="{28A0092B-C50C-407E-A947-70E740481C1C}">
+                      <a14:useLocalDpi xmlns:a14="http://schemas.microsoft.com/office/drawing/2010/main" val="0"/>
+                    </a:ext>
+                  </a:extLst>
+                </a:blip>
+                <a:stretch>
+                  <a:fillRect/>
+                </a:stretch>
+              </p:blipFill>
+              <p:spPr>
+                <a:xfrm>
+                  <a:off x="4830834" y="2083572"/>
+                  <a:ext cx="342636" cy="342636"/>
+                </a:xfrm>
+                <a:prstGeom prst="rect">
+                  <a:avLst/>
+                </a:prstGeom>
+              </p:spPr>
+            </p:pic>
+            <p:pic>
+              <p:nvPicPr>
+                <p:cNvPr id="118" name="Imagen 117"/>
+                <p:cNvPicPr>
+                  <a:picLocks noChangeAspect="1"/>
+                </p:cNvPicPr>
+                <p:nvPr/>
+              </p:nvPicPr>
+              <p:blipFill>
+                <a:blip r:embed="rId4" cstate="print">
+                  <a:duotone>
+                    <a:schemeClr val="bg2">
+                      <a:shade val="45000"/>
+                      <a:satMod val="135000"/>
+                    </a:schemeClr>
+                    <a:prstClr val="white"/>
+                  </a:duotone>
+                  <a:extLst>
+                    <a:ext uri="{28A0092B-C50C-407E-A947-70E740481C1C}">
+                      <a14:useLocalDpi xmlns:a14="http://schemas.microsoft.com/office/drawing/2010/main" val="0"/>
+                    </a:ext>
+                  </a:extLst>
+                </a:blip>
+                <a:stretch>
+                  <a:fillRect/>
+                </a:stretch>
+              </p:blipFill>
+              <p:spPr>
+                <a:xfrm>
+                  <a:off x="11963755" y="2073974"/>
+                  <a:ext cx="342636" cy="342636"/>
+                </a:xfrm>
+                <a:prstGeom prst="rect">
+                  <a:avLst/>
+                </a:prstGeom>
+              </p:spPr>
+            </p:pic>
+          </p:grpSp>
+          <p:pic>
+            <p:nvPicPr>
+              <p:cNvPr id="123" name="Imagen 122"/>
+              <p:cNvPicPr>
+                <a:picLocks noChangeAspect="1"/>
+              </p:cNvPicPr>
+              <p:nvPr/>
+            </p:nvPicPr>
+            <p:blipFill>
+              <a:blip r:embed="rId5" cstate="print">
+                <a:lum bright="70000" contrast="-70000"/>
+                <a:extLst>
+                  <a:ext uri="{28A0092B-C50C-407E-A947-70E740481C1C}">
+                    <a14:useLocalDpi xmlns:a14="http://schemas.microsoft.com/office/drawing/2010/main" val="0"/>
+                  </a:ext>
+                </a:extLst>
+              </a:blip>
+              <a:stretch>
+                <a:fillRect/>
+              </a:stretch>
+            </p:blipFill>
+            <p:spPr>
+              <a:xfrm>
+                <a:off x="10547446" y="-332100"/>
+                <a:ext cx="479884" cy="479884"/>
+              </a:xfrm>
+              <a:prstGeom prst="rect">
+                <a:avLst/>
+              </a:prstGeom>
+            </p:spPr>
+          </p:pic>
+          <p:sp>
+            <p:nvSpPr>
+              <p:cNvPr id="124" name="CuadroTexto 123"/>
+              <p:cNvSpPr txBox="1"/>
+              <p:nvPr/>
+            </p:nvSpPr>
+            <p:spPr>
+              <a:xfrm>
+                <a:off x="10430755" y="312251"/>
+                <a:ext cx="1071832" cy="338554"/>
+              </a:xfrm>
+              <a:prstGeom prst="rect">
+                <a:avLst/>
+              </a:prstGeom>
+              <a:noFill/>
+            </p:spPr>
+            <p:txBody>
+              <a:bodyPr wrap="none" rtlCol="0">
+                <a:spAutoFit/>
+              </a:bodyPr>
+              <a:lstStyle/>
+              <a:p>
+                <a:r>
+                  <a:rPr lang="es-ES" sz="1600" dirty="0" smtClean="0">
+                    <a:solidFill>
+                      <a:schemeClr val="tx1">
+                        <a:lumMod val="50000"/>
+                        <a:lumOff val="50000"/>
+                      </a:schemeClr>
+                    </a:solidFill>
+                    <a:latin typeface="+mj-lt"/>
+                    <a:cs typeface="Aharoni" panose="02010803020104030203" pitchFamily="2" charset="-79"/>
+                  </a:rPr>
+                  <a:t>SUMMARY</a:t>
+                </a:r>
+                <a:endParaRPr lang="es-ES" sz="1600" dirty="0">
+                  <a:solidFill>
+                    <a:schemeClr val="tx1">
+                      <a:lumMod val="50000"/>
+                      <a:lumOff val="50000"/>
+                    </a:schemeClr>
+                  </a:solidFill>
+                  <a:latin typeface="+mj-lt"/>
+                  <a:cs typeface="Aharoni" panose="02010803020104030203" pitchFamily="2" charset="-79"/>
+                </a:endParaRPr>
+              </a:p>
+            </p:txBody>
+          </p:sp>
+        </p:grpSp>
+        <p:sp>
+          <p:nvSpPr>
+            <p:cNvPr id="127" name="CuadroTexto 126"/>
+            <p:cNvSpPr txBox="1"/>
+            <p:nvPr/>
+          </p:nvSpPr>
+          <p:spPr>
+            <a:xfrm>
+              <a:off x="6823652" y="1404874"/>
+              <a:ext cx="1537409" cy="338554"/>
+            </a:xfrm>
+            <a:prstGeom prst="rect">
+              <a:avLst/>
+            </a:prstGeom>
+            <a:noFill/>
+          </p:spPr>
+          <p:txBody>
+            <a:bodyPr wrap="none" rtlCol="0">
+              <a:spAutoFit/>
+            </a:bodyPr>
+            <a:lstStyle/>
+            <a:p>
+              <a:r>
+                <a:rPr lang="es-ES" sz="1600" dirty="0" smtClean="0">
+                  <a:solidFill>
+                    <a:schemeClr val="tx1">
+                      <a:lumMod val="50000"/>
+                      <a:lumOff val="50000"/>
+                    </a:schemeClr>
+                  </a:solidFill>
+                  <a:latin typeface="+mj-lt"/>
+                  <a:cs typeface="Aharoni" panose="02010803020104030203" pitchFamily="2" charset="-79"/>
+                </a:rPr>
+                <a:t>$</a:t>
+              </a:r>
+              <a:r>
+                <a:rPr lang="es-ES" sz="1600" dirty="0" err="1" smtClean="0">
+                  <a:solidFill>
+                    <a:schemeClr val="tx1">
+                      <a:lumMod val="50000"/>
+                      <a:lumOff val="50000"/>
+                    </a:schemeClr>
+                  </a:solidFill>
+                  <a:latin typeface="+mj-lt"/>
+                  <a:cs typeface="Aharoni" panose="02010803020104030203" pitchFamily="2" charset="-79"/>
+                </a:rPr>
+                <a:t>Summary</a:t>
+              </a:r>
+              <a:r>
+                <a:rPr lang="es-ES" sz="1600" dirty="0" smtClean="0">
+                  <a:solidFill>
+                    <a:schemeClr val="tx1">
+                      <a:lumMod val="50000"/>
+                      <a:lumOff val="50000"/>
+                    </a:schemeClr>
+                  </a:solidFill>
+                  <a:latin typeface="+mj-lt"/>
+                  <a:cs typeface="Aharoni" panose="02010803020104030203" pitchFamily="2" charset="-79"/>
+                </a:rPr>
+                <a:t>=True</a:t>
+              </a:r>
+              <a:endParaRPr lang="es-ES" sz="1600" dirty="0">
+                <a:solidFill>
+                  <a:schemeClr val="tx1">
+                    <a:lumMod val="50000"/>
+                    <a:lumOff val="50000"/>
+                  </a:schemeClr>
+                </a:solidFill>
+                <a:latin typeface="+mj-lt"/>
+                <a:cs typeface="Aharoni" panose="02010803020104030203" pitchFamily="2" charset="-79"/>
+              </a:endParaRPr>
+            </a:p>
+          </p:txBody>
+        </p:sp>
+        <p:sp>
+          <p:nvSpPr>
+            <p:cNvPr id="129" name="CuadroTexto 128"/>
+            <p:cNvSpPr txBox="1"/>
+            <p:nvPr/>
+          </p:nvSpPr>
+          <p:spPr>
+            <a:xfrm>
+              <a:off x="7727656" y="5173015"/>
+              <a:ext cx="1137299" cy="338554"/>
+            </a:xfrm>
+            <a:prstGeom prst="rect">
+              <a:avLst/>
+            </a:prstGeom>
+            <a:noFill/>
+          </p:spPr>
+          <p:txBody>
+            <a:bodyPr wrap="none" rtlCol="0">
+              <a:spAutoFit/>
+            </a:bodyPr>
+            <a:lstStyle/>
+            <a:p>
+              <a:r>
+                <a:rPr lang="es-ES" sz="1600" dirty="0" smtClean="0">
+                  <a:solidFill>
+                    <a:schemeClr val="tx1">
+                      <a:lumMod val="50000"/>
+                      <a:lumOff val="50000"/>
+                    </a:schemeClr>
+                  </a:solidFill>
+                  <a:latin typeface="+mj-lt"/>
+                  <a:cs typeface="Aharoni" panose="02010803020104030203" pitchFamily="2" charset="-79"/>
+                </a:rPr>
+                <a:t>$</a:t>
+              </a:r>
+              <a:r>
+                <a:rPr lang="es-ES" sz="1600" dirty="0" err="1" smtClean="0">
+                  <a:solidFill>
+                    <a:schemeClr val="tx1">
+                      <a:lumMod val="50000"/>
+                      <a:lumOff val="50000"/>
+                    </a:schemeClr>
+                  </a:solidFill>
+                  <a:latin typeface="+mj-lt"/>
+                  <a:cs typeface="Aharoni" panose="02010803020104030203" pitchFamily="2" charset="-79"/>
+                </a:rPr>
+                <a:t>counter</a:t>
+              </a:r>
+              <a:r>
+                <a:rPr lang="es-ES" sz="1600" dirty="0" smtClean="0">
+                  <a:solidFill>
+                    <a:schemeClr val="tx1">
+                      <a:lumMod val="50000"/>
+                      <a:lumOff val="50000"/>
+                    </a:schemeClr>
+                  </a:solidFill>
+                  <a:latin typeface="+mj-lt"/>
+                  <a:cs typeface="Aharoni" panose="02010803020104030203" pitchFamily="2" charset="-79"/>
+                </a:rPr>
+                <a:t>=0</a:t>
+              </a:r>
+              <a:endParaRPr lang="es-ES" sz="1600" dirty="0">
+                <a:solidFill>
+                  <a:schemeClr val="tx1">
+                    <a:lumMod val="50000"/>
+                    <a:lumOff val="50000"/>
+                  </a:schemeClr>
+                </a:solidFill>
+                <a:latin typeface="+mj-lt"/>
+                <a:cs typeface="Aharoni" panose="02010803020104030203" pitchFamily="2" charset="-79"/>
+              </a:endParaRPr>
+            </a:p>
+          </p:txBody>
+        </p:sp>
+      </p:grpSp>
+    </p:spTree>
+    <p:extLst>
+      <p:ext uri="{BB962C8B-B14F-4D97-AF65-F5344CB8AC3E}">
+        <p14:creationId xmlns:p14="http://schemas.microsoft.com/office/powerpoint/2010/main" val="3249433358"/>
+      </p:ext>
+    </p:extLst>
+  </p:cSld>
+  <p:clrMapOvr>
+    <a:masterClrMapping/>
+  </p:clrMapOvr>
+</p:sld>
+</file>
+
+<file path=ppt/slides/slide28.xml><?xml version="1.0" encoding="utf-8"?>
+<p:sld xmlns:a="http://schemas.openxmlformats.org/drawingml/2006/main" xmlns:r="http://schemas.openxmlformats.org/officeDocument/2006/relationships" xmlns:p="http://schemas.openxmlformats.org/presentationml/2006/main">
+  <p:cSld>
+    <p:spTree>
+      <p:nvGrpSpPr>
+        <p:cNvPr id="1" name=""/>
+        <p:cNvGrpSpPr/>
+        <p:nvPr/>
+      </p:nvGrpSpPr>
+      <p:grpSpPr>
+        <a:xfrm>
+          <a:off x="0" y="0"/>
+          <a:ext cx="0" cy="0"/>
+          <a:chOff x="0" y="0"/>
+          <a:chExt cx="0" cy="0"/>
+        </a:xfrm>
+      </p:grpSpPr>
+      <p:grpSp>
+        <p:nvGrpSpPr>
+          <p:cNvPr id="3" name="Grupo 2"/>
+          <p:cNvGrpSpPr/>
+          <p:nvPr/>
+        </p:nvGrpSpPr>
+        <p:grpSpPr>
+          <a:xfrm>
+            <a:off x="-966158" y="-240632"/>
+            <a:ext cx="15463208" cy="4317333"/>
+            <a:chOff x="-966158" y="-240632"/>
+            <a:chExt cx="15463208" cy="4317333"/>
+          </a:xfrm>
+        </p:grpSpPr>
+        <p:grpSp>
+          <p:nvGrpSpPr>
+            <p:cNvPr id="96" name="Grupo 95"/>
+            <p:cNvGrpSpPr/>
+            <p:nvPr/>
+          </p:nvGrpSpPr>
+          <p:grpSpPr>
+            <a:xfrm>
+              <a:off x="-966158" y="-240632"/>
+              <a:ext cx="15463208" cy="4317333"/>
+              <a:chOff x="-1058778" y="-112295"/>
+              <a:chExt cx="15463208" cy="4317333"/>
+            </a:xfrm>
+          </p:grpSpPr>
+          <p:grpSp>
+            <p:nvGrpSpPr>
+              <p:cNvPr id="97" name="Grupo 96"/>
+              <p:cNvGrpSpPr/>
+              <p:nvPr/>
+            </p:nvGrpSpPr>
+            <p:grpSpPr>
+              <a:xfrm>
+                <a:off x="-1058778" y="-112295"/>
+                <a:ext cx="15463208" cy="4317333"/>
+                <a:chOff x="-1058778" y="-112295"/>
+                <a:chExt cx="15463208" cy="4317333"/>
+              </a:xfrm>
+            </p:grpSpPr>
+            <p:grpSp>
+              <p:nvGrpSpPr>
+                <p:cNvPr id="89" name="Grupo 88"/>
+                <p:cNvGrpSpPr/>
+                <p:nvPr/>
+              </p:nvGrpSpPr>
+              <p:grpSpPr>
+                <a:xfrm>
+                  <a:off x="-1058778" y="-112295"/>
+                  <a:ext cx="15463208" cy="4317333"/>
+                  <a:chOff x="-1058778" y="-112295"/>
+                  <a:chExt cx="15463208" cy="4317333"/>
+                </a:xfrm>
+              </p:grpSpPr>
+              <p:sp>
+                <p:nvSpPr>
+                  <p:cNvPr id="82" name="Rectángulo 81"/>
+                  <p:cNvSpPr/>
+                  <p:nvPr/>
+                </p:nvSpPr>
+                <p:spPr>
+                  <a:xfrm>
+                    <a:off x="-1058778" y="-112295"/>
+                    <a:ext cx="15463208" cy="4317333"/>
+                  </a:xfrm>
+                  <a:prstGeom prst="rect">
+                    <a:avLst/>
+                  </a:prstGeom>
+                  <a:solidFill>
+                    <a:schemeClr val="bg1"/>
+                  </a:solidFill>
+                  <a:ln>
+                    <a:noFill/>
+                  </a:ln>
+                </p:spPr>
+                <p:style>
+                  <a:lnRef idx="2">
+                    <a:schemeClr val="accent1">
+                      <a:shade val="50000"/>
+                    </a:schemeClr>
+                  </a:lnRef>
+                  <a:fillRef idx="1">
+                    <a:schemeClr val="accent1"/>
+                  </a:fillRef>
+                  <a:effectRef idx="0">
+                    <a:schemeClr val="accent1"/>
+                  </a:effectRef>
+                  <a:fontRef idx="minor">
+                    <a:schemeClr val="lt1"/>
+                  </a:fontRef>
+                </p:style>
+                <p:txBody>
+                  <a:bodyPr rtlCol="0" anchor="ctr"/>
+                  <a:lstStyle/>
+                  <a:p>
+                    <a:pPr algn="ctr"/>
+                    <a:endParaRPr lang="es-ES"/>
+                  </a:p>
+                </p:txBody>
+              </p:sp>
+              <p:sp>
+                <p:nvSpPr>
+                  <p:cNvPr id="5" name="Decisión 4"/>
+                  <p:cNvSpPr/>
+                  <p:nvPr/>
+                </p:nvSpPr>
+                <p:spPr>
+                  <a:xfrm>
+                    <a:off x="1667258" y="1724085"/>
+                    <a:ext cx="2205200" cy="1581874"/>
+                  </a:xfrm>
+                  <a:prstGeom prst="flowChartDecision">
+                    <a:avLst/>
+                  </a:prstGeom>
+                  <a:noFill/>
+                  <a:ln w="38100">
+                    <a:solidFill>
+                      <a:srgbClr val="46DACC"/>
+                    </a:solidFill>
+                    <a:prstDash val="sysDot"/>
+                  </a:ln>
+                </p:spPr>
+                <p:style>
+                  <a:lnRef idx="2">
+                    <a:schemeClr val="accent1">
+                      <a:shade val="50000"/>
+                    </a:schemeClr>
+                  </a:lnRef>
+                  <a:fillRef idx="1">
+                    <a:schemeClr val="accent1"/>
+                  </a:fillRef>
+                  <a:effectRef idx="0">
+                    <a:schemeClr val="accent1"/>
+                  </a:effectRef>
+                  <a:fontRef idx="minor">
+                    <a:schemeClr val="lt1"/>
+                  </a:fontRef>
+                </p:style>
+                <p:txBody>
+                  <a:bodyPr lIns="0" tIns="0" rIns="0" bIns="0" rtlCol="0" anchor="ctr"/>
+                  <a:lstStyle/>
+                  <a:p>
+                    <a:pPr algn="ctr"/>
+                    <a:r>
+                      <a:rPr lang="es-ES" sz="1200" dirty="0" smtClean="0">
+                        <a:solidFill>
+                          <a:schemeClr val="tx1">
+                            <a:lumMod val="65000"/>
+                            <a:lumOff val="35000"/>
+                          </a:schemeClr>
+                        </a:solidFill>
+                        <a:latin typeface="Arial Rounded MT Bold" panose="020F0704030504030204" pitchFamily="34" charset="0"/>
+                      </a:rPr>
+                      <a:t>CHECK</a:t>
+                    </a:r>
+                  </a:p>
+                  <a:p>
+                    <a:pPr algn="ctr"/>
+                    <a:r>
+                      <a:rPr lang="es-ES" sz="1200" dirty="0" smtClean="0">
+                        <a:solidFill>
+                          <a:schemeClr val="tx1">
+                            <a:lumMod val="65000"/>
+                            <a:lumOff val="35000"/>
+                          </a:schemeClr>
+                        </a:solidFill>
+                        <a:latin typeface="Arial Rounded MT Bold" panose="020F0704030504030204" pitchFamily="34" charset="0"/>
+                      </a:rPr>
+                      <a:t>#NEGATIVE_</a:t>
+                    </a:r>
+                  </a:p>
+                  <a:p>
+                    <a:pPr algn="ctr"/>
+                    <a:r>
+                      <a:rPr lang="es-ES" sz="1200" dirty="0" smtClean="0">
+                        <a:solidFill>
+                          <a:schemeClr val="tx1">
+                            <a:lumMod val="65000"/>
+                            <a:lumOff val="35000"/>
+                          </a:schemeClr>
+                        </a:solidFill>
+                        <a:latin typeface="Arial Rounded MT Bold" panose="020F0704030504030204" pitchFamily="34" charset="0"/>
+                      </a:rPr>
+                      <a:t>REACTION</a:t>
+                    </a:r>
+                    <a:endParaRPr lang="es-ES" sz="1200" dirty="0">
+                      <a:solidFill>
+                        <a:schemeClr val="tx1">
+                          <a:lumMod val="65000"/>
+                          <a:lumOff val="35000"/>
+                        </a:schemeClr>
+                      </a:solidFill>
+                      <a:latin typeface="Arial Rounded MT Bold" panose="020F0704030504030204" pitchFamily="34" charset="0"/>
+                    </a:endParaRPr>
+                  </a:p>
+                </p:txBody>
+              </p:sp>
+              <p:cxnSp>
+                <p:nvCxnSpPr>
+                  <p:cNvPr id="13" name="Conector recto de flecha 12"/>
+                  <p:cNvCxnSpPr>
+                    <a:stCxn id="26" idx="6"/>
+                    <a:endCxn id="5" idx="1"/>
+                  </p:cNvCxnSpPr>
+                  <p:nvPr/>
+                </p:nvCxnSpPr>
+                <p:spPr>
+                  <a:xfrm>
+                    <a:off x="411807" y="2515022"/>
+                    <a:ext cx="1255451" cy="0"/>
+                  </a:xfrm>
+                  <a:prstGeom prst="straightConnector1">
+                    <a:avLst/>
+                  </a:prstGeom>
+                  <a:ln w="28575">
+                    <a:solidFill>
+                      <a:srgbClr val="7240F0"/>
+                    </a:solidFill>
+                    <a:tailEnd type="triangle" w="lg" len="lg"/>
+                  </a:ln>
+                </p:spPr>
+                <p:style>
+                  <a:lnRef idx="1">
+                    <a:schemeClr val="accent1"/>
+                  </a:lnRef>
+                  <a:fillRef idx="0">
+                    <a:schemeClr val="accent1"/>
+                  </a:fillRef>
+                  <a:effectRef idx="0">
+                    <a:schemeClr val="accent1"/>
+                  </a:effectRef>
+                  <a:fontRef idx="minor">
+                    <a:schemeClr val="tx1"/>
+                  </a:fontRef>
+                </p:style>
+              </p:cxnSp>
+              <p:cxnSp>
+                <p:nvCxnSpPr>
+                  <p:cNvPr id="15" name="Conector recto de flecha 14"/>
+                  <p:cNvCxnSpPr>
+                    <a:stCxn id="5" idx="3"/>
+                    <a:endCxn id="43" idx="2"/>
+                  </p:cNvCxnSpPr>
+                  <p:nvPr/>
+                </p:nvCxnSpPr>
+                <p:spPr>
+                  <a:xfrm flipV="1">
+                    <a:off x="3872458" y="2505984"/>
+                    <a:ext cx="1714734" cy="9038"/>
+                  </a:xfrm>
+                  <a:prstGeom prst="straightConnector1">
+                    <a:avLst/>
+                  </a:prstGeom>
+                  <a:ln w="28575" cmpd="sng">
+                    <a:solidFill>
+                      <a:srgbClr val="7240F0"/>
+                    </a:solidFill>
+                    <a:prstDash val="solid"/>
+                    <a:tailEnd type="triangle" w="lg" len="lg"/>
+                  </a:ln>
+                </p:spPr>
+                <p:style>
+                  <a:lnRef idx="1">
+                    <a:schemeClr val="accent1"/>
+                  </a:lnRef>
+                  <a:fillRef idx="0">
+                    <a:schemeClr val="accent1"/>
+                  </a:fillRef>
+                  <a:effectRef idx="0">
+                    <a:schemeClr val="accent1"/>
+                  </a:effectRef>
+                  <a:fontRef idx="minor">
+                    <a:schemeClr val="tx1"/>
+                  </a:fontRef>
+                </p:style>
+              </p:cxnSp>
+              <p:sp>
+                <p:nvSpPr>
+                  <p:cNvPr id="122" name="CuadroTexto 121"/>
+                  <p:cNvSpPr txBox="1"/>
+                  <p:nvPr/>
+                </p:nvSpPr>
+                <p:spPr>
+                  <a:xfrm>
+                    <a:off x="3866325" y="2151715"/>
+                    <a:ext cx="475643" cy="369332"/>
+                  </a:xfrm>
+                  <a:prstGeom prst="rect">
+                    <a:avLst/>
+                  </a:prstGeom>
+                  <a:noFill/>
+                </p:spPr>
+                <p:txBody>
+                  <a:bodyPr wrap="none" rtlCol="0">
+                    <a:spAutoFit/>
+                  </a:bodyPr>
+                  <a:lstStyle/>
+                  <a:p>
+                    <a:r>
+                      <a:rPr lang="es-ES" b="1" dirty="0" smtClean="0">
+                        <a:solidFill>
+                          <a:srgbClr val="FF3300"/>
+                        </a:solidFill>
+                        <a:latin typeface="+mj-lt"/>
+                        <a:cs typeface="Aharoni" panose="02010803020104030203" pitchFamily="2" charset="-79"/>
+                      </a:rPr>
+                      <a:t>Yes</a:t>
+                    </a:r>
+                    <a:endParaRPr lang="es-ES" b="1" dirty="0">
+                      <a:solidFill>
+                        <a:srgbClr val="FF3300"/>
+                      </a:solidFill>
+                      <a:latin typeface="+mj-lt"/>
+                      <a:cs typeface="Aharoni" panose="02010803020104030203" pitchFamily="2" charset="-79"/>
+                    </a:endParaRPr>
+                  </a:p>
+                </p:txBody>
+              </p:sp>
+              <p:sp>
+                <p:nvSpPr>
+                  <p:cNvPr id="24" name="Decisión 23"/>
+                  <p:cNvSpPr/>
+                  <p:nvPr/>
+                </p:nvSpPr>
+                <p:spPr>
+                  <a:xfrm>
+                    <a:off x="8092416" y="1766263"/>
+                    <a:ext cx="2222223" cy="1440673"/>
+                  </a:xfrm>
+                  <a:prstGeom prst="flowChartDecision">
+                    <a:avLst/>
+                  </a:prstGeom>
+                  <a:noFill/>
+                  <a:ln w="38100">
+                    <a:solidFill>
+                      <a:srgbClr val="46DACC"/>
+                    </a:solidFill>
+                    <a:prstDash val="sysDot"/>
+                  </a:ln>
+                </p:spPr>
+                <p:style>
+                  <a:lnRef idx="2">
+                    <a:schemeClr val="accent1">
+                      <a:shade val="50000"/>
+                    </a:schemeClr>
+                  </a:lnRef>
+                  <a:fillRef idx="1">
+                    <a:schemeClr val="accent1"/>
+                  </a:fillRef>
+                  <a:effectRef idx="0">
+                    <a:schemeClr val="accent1"/>
+                  </a:effectRef>
+                  <a:fontRef idx="minor">
+                    <a:schemeClr val="lt1"/>
+                  </a:fontRef>
+                </p:style>
+                <p:txBody>
+                  <a:bodyPr lIns="0" tIns="0" rIns="0" bIns="0" rtlCol="0" anchor="ctr"/>
+                  <a:lstStyle/>
+                  <a:p>
+                    <a:pPr algn="ctr"/>
+                    <a:r>
+                      <a:rPr lang="es-ES" sz="1200" dirty="0" smtClean="0">
+                        <a:solidFill>
+                          <a:schemeClr val="tx1">
+                            <a:lumMod val="65000"/>
+                            <a:lumOff val="35000"/>
+                          </a:schemeClr>
+                        </a:solidFill>
+                        <a:latin typeface="Arial Rounded MT Bold" panose="020F0704030504030204" pitchFamily="34" charset="0"/>
+                      </a:rPr>
+                      <a:t>CHECK</a:t>
+                    </a:r>
+                  </a:p>
+                  <a:p>
+                    <a:pPr algn="ctr"/>
+                    <a:r>
+                      <a:rPr lang="es-ES" sz="1200" dirty="0" smtClean="0">
+                        <a:solidFill>
+                          <a:schemeClr val="tx1">
+                            <a:lumMod val="65000"/>
+                            <a:lumOff val="35000"/>
+                          </a:schemeClr>
+                        </a:solidFill>
+                        <a:latin typeface="Arial Rounded MT Bold" panose="020F0704030504030204" pitchFamily="34" charset="0"/>
+                      </a:rPr>
+                      <a:t>$INSULT_</a:t>
+                    </a:r>
+                  </a:p>
+                  <a:p>
+                    <a:pPr algn="ctr"/>
+                    <a:r>
+                      <a:rPr lang="es-ES" sz="1200" dirty="0" smtClean="0">
+                        <a:solidFill>
+                          <a:schemeClr val="tx1">
+                            <a:lumMod val="65000"/>
+                            <a:lumOff val="35000"/>
+                          </a:schemeClr>
+                        </a:solidFill>
+                        <a:latin typeface="Arial Rounded MT Bold" panose="020F0704030504030204" pitchFamily="34" charset="0"/>
+                      </a:rPr>
+                      <a:t>COUNTER </a:t>
+                    </a:r>
+                  </a:p>
+                  <a:p>
+                    <a:pPr algn="ctr"/>
+                    <a:r>
+                      <a:rPr lang="es-ES" sz="1200" dirty="0" smtClean="0">
+                        <a:solidFill>
+                          <a:schemeClr val="tx1">
+                            <a:lumMod val="65000"/>
+                            <a:lumOff val="35000"/>
+                          </a:schemeClr>
+                        </a:solidFill>
+                        <a:latin typeface="Arial Rounded MT Bold" panose="020F0704030504030204" pitchFamily="34" charset="0"/>
+                      </a:rPr>
+                      <a:t>&gt;= 3</a:t>
+                    </a:r>
+                  </a:p>
+                </p:txBody>
+              </p:sp>
+              <p:sp>
+                <p:nvSpPr>
+                  <p:cNvPr id="26" name="Elipse 25"/>
+                  <p:cNvSpPr/>
+                  <p:nvPr/>
+                </p:nvSpPr>
+                <p:spPr>
+                  <a:xfrm>
+                    <a:off x="-848193" y="2011022"/>
+                    <a:ext cx="1260000" cy="1008000"/>
+                  </a:xfrm>
+                  <a:prstGeom prst="ellipse">
+                    <a:avLst/>
+                  </a:prstGeom>
+                  <a:noFill/>
+                  <a:ln w="76200">
+                    <a:solidFill>
+                      <a:srgbClr val="46DACC"/>
+                    </a:solidFill>
+                  </a:ln>
+                </p:spPr>
+                <p:style>
+                  <a:lnRef idx="2">
+                    <a:schemeClr val="accent1">
+                      <a:shade val="50000"/>
+                    </a:schemeClr>
+                  </a:lnRef>
+                  <a:fillRef idx="1">
+                    <a:schemeClr val="accent1"/>
+                  </a:fillRef>
+                  <a:effectRef idx="0">
+                    <a:schemeClr val="accent1"/>
+                  </a:effectRef>
+                  <a:fontRef idx="minor">
+                    <a:schemeClr val="lt1"/>
+                  </a:fontRef>
+                </p:style>
+                <p:txBody>
+                  <a:bodyPr lIns="0" tIns="0" rIns="0" bIns="0" rtlCol="0" anchor="ctr"/>
+                  <a:lstStyle/>
+                  <a:p>
+                    <a:pPr algn="ctr"/>
+                    <a:r>
+                      <a:rPr lang="es-ES" sz="1200" dirty="0" smtClean="0">
+                        <a:solidFill>
+                          <a:schemeClr val="tx1">
+                            <a:lumMod val="75000"/>
+                            <a:lumOff val="25000"/>
+                          </a:schemeClr>
+                        </a:solidFill>
+                        <a:latin typeface="Arial Rounded MT Bold" panose="020F0704030504030204" pitchFamily="34" charset="0"/>
+                      </a:rPr>
+                      <a:t>START</a:t>
+                    </a:r>
+                    <a:endParaRPr lang="es-ES" sz="1200" dirty="0">
+                      <a:solidFill>
+                        <a:schemeClr val="tx1">
+                          <a:lumMod val="75000"/>
+                          <a:lumOff val="25000"/>
+                        </a:schemeClr>
+                      </a:solidFill>
+                      <a:latin typeface="Arial Rounded MT Bold" panose="020F0704030504030204" pitchFamily="34" charset="0"/>
+                    </a:endParaRPr>
+                  </a:p>
+                </p:txBody>
+              </p:sp>
+              <p:cxnSp>
+                <p:nvCxnSpPr>
+                  <p:cNvPr id="36" name="Conector recto de flecha 35"/>
+                  <p:cNvCxnSpPr>
+                    <a:stCxn id="24" idx="3"/>
+                    <a:endCxn id="44" idx="1"/>
+                  </p:cNvCxnSpPr>
+                  <p:nvPr/>
+                </p:nvCxnSpPr>
+                <p:spPr>
+                  <a:xfrm flipV="1">
+                    <a:off x="10314639" y="2467458"/>
+                    <a:ext cx="1784741" cy="19142"/>
+                  </a:xfrm>
+                  <a:prstGeom prst="straightConnector1">
+                    <a:avLst/>
+                  </a:prstGeom>
+                  <a:ln w="28575">
+                    <a:solidFill>
+                      <a:srgbClr val="7240F0"/>
+                    </a:solidFill>
+                    <a:prstDash val="sysDash"/>
+                    <a:tailEnd type="triangle" w="lg" len="lg"/>
+                  </a:ln>
+                </p:spPr>
+                <p:style>
+                  <a:lnRef idx="1">
+                    <a:schemeClr val="accent1"/>
+                  </a:lnRef>
+                  <a:fillRef idx="0">
+                    <a:schemeClr val="accent1"/>
+                  </a:fillRef>
+                  <a:effectRef idx="0">
+                    <a:schemeClr val="accent1"/>
+                  </a:effectRef>
+                  <a:fontRef idx="minor">
+                    <a:schemeClr val="tx1"/>
+                  </a:fontRef>
+                </p:style>
+              </p:cxnSp>
+            </p:grpSp>
+            <p:sp>
+              <p:nvSpPr>
+                <p:cNvPr id="93" name="CuadroTexto 92"/>
+                <p:cNvSpPr txBox="1"/>
+                <p:nvPr/>
+              </p:nvSpPr>
+              <p:spPr>
+                <a:xfrm>
+                  <a:off x="1856288" y="374198"/>
+                  <a:ext cx="3039200" cy="338554"/>
+                </a:xfrm>
+                <a:prstGeom prst="rect">
+                  <a:avLst/>
+                </a:prstGeom>
+                <a:noFill/>
+              </p:spPr>
+              <p:txBody>
+                <a:bodyPr wrap="square" rtlCol="0">
+                  <a:spAutoFit/>
+                </a:bodyPr>
+                <a:lstStyle/>
+                <a:p>
+                  <a:r>
+                    <a:rPr lang="es-ES" sz="1600" b="1" dirty="0" smtClean="0">
+                      <a:solidFill>
+                        <a:schemeClr val="tx1">
+                          <a:lumMod val="50000"/>
+                          <a:lumOff val="50000"/>
+                        </a:schemeClr>
+                      </a:solidFill>
+                      <a:latin typeface="Arial Rounded MT Bold" panose="020F0704030504030204" pitchFamily="34" charset="0"/>
+                      <a:cs typeface="Aharoni" panose="02010803020104030203" pitchFamily="2" charset="-79"/>
+                    </a:rPr>
+                    <a:t>WATSON CONVERSATION</a:t>
+                  </a:r>
+                  <a:endParaRPr lang="es-ES" sz="1600" b="1" dirty="0">
+                    <a:solidFill>
+                      <a:schemeClr val="tx1">
+                        <a:lumMod val="50000"/>
+                        <a:lumOff val="50000"/>
+                      </a:schemeClr>
+                    </a:solidFill>
+                    <a:latin typeface="Arial Rounded MT Bold" panose="020F0704030504030204" pitchFamily="34" charset="0"/>
+                    <a:cs typeface="Aharoni" panose="02010803020104030203" pitchFamily="2" charset="-79"/>
+                  </a:endParaRPr>
+                </a:p>
+              </p:txBody>
+            </p:sp>
+            <p:sp>
+              <p:nvSpPr>
+                <p:cNvPr id="98" name="Rectángulo redondeado 97"/>
+                <p:cNvSpPr/>
+                <p:nvPr/>
+              </p:nvSpPr>
+              <p:spPr>
+                <a:xfrm>
+                  <a:off x="1164680" y="330554"/>
+                  <a:ext cx="13011149" cy="3342037"/>
+                </a:xfrm>
+                <a:prstGeom prst="roundRect">
+                  <a:avLst>
+                    <a:gd name="adj" fmla="val 3452"/>
+                  </a:avLst>
+                </a:prstGeom>
+                <a:noFill/>
+                <a:ln>
+                  <a:solidFill>
+                    <a:schemeClr val="bg1">
+                      <a:lumMod val="75000"/>
+                    </a:schemeClr>
+                  </a:solidFill>
+                  <a:prstDash val="sysDash"/>
+                </a:ln>
+              </p:spPr>
+              <p:style>
+                <a:lnRef idx="2">
+                  <a:schemeClr val="accent1">
+                    <a:shade val="50000"/>
+                  </a:schemeClr>
+                </a:lnRef>
+                <a:fillRef idx="1">
+                  <a:schemeClr val="accent1"/>
+                </a:fillRef>
+                <a:effectRef idx="0">
+                  <a:schemeClr val="accent1"/>
+                </a:effectRef>
+                <a:fontRef idx="minor">
+                  <a:schemeClr val="lt1"/>
+                </a:fontRef>
+              </p:style>
+              <p:txBody>
+                <a:bodyPr rtlCol="0" anchor="ctr"/>
+                <a:lstStyle/>
+                <a:p>
+                  <a:pPr algn="ctr"/>
+                  <a:endParaRPr lang="es-ES"/>
+                </a:p>
+              </p:txBody>
+            </p:sp>
           </p:grpSp>
           <p:sp>
             <p:nvSpPr>
-              <p:cNvPr id="92" name="Rectángulo redondeado 91"/>
+              <p:cNvPr id="44" name="Decisión 43"/>
               <p:cNvSpPr/>
               <p:nvPr/>
             </p:nvSpPr>
             <p:spPr>
               <a:xfrm>
-                <a:off x="1759058" y="3976092"/>
-                <a:ext cx="10176268" cy="1805889"/>
+                <a:off x="12099380" y="1724085"/>
+                <a:ext cx="1896485" cy="1486745"/>
               </a:xfrm>
-              <a:prstGeom prst="roundRect">
-                <a:avLst>
-                  <a:gd name="adj" fmla="val 3452"/>
-                </a:avLst>
+              <a:prstGeom prst="flowChartDecision">
+                <a:avLst/>
               </a:prstGeom>
               <a:noFill/>
-              <a:ln>
+              <a:ln w="38100">
                 <a:solidFill>
-                  <a:schemeClr val="bg1">
-                    <a:lumMod val="75000"/>
-                  </a:schemeClr>
+                  <a:srgbClr val="46DACC"/>
                 </a:solidFill>
-                <a:prstDash val="sysDash"/>
+                <a:prstDash val="sysDot"/>
               </a:ln>
             </p:spPr>
             <p:style>
@@ -33781,292 +35757,128 @@
               </a:fontRef>
             </p:style>
             <p:txBody>
-              <a:bodyPr rtlCol="0" anchor="ctr"/>
+              <a:bodyPr lIns="0" tIns="0" rIns="0" bIns="0" rtlCol="0" anchor="ctr"/>
               <a:lstStyle/>
               <a:p>
                 <a:pPr algn="ctr"/>
-                <a:endParaRPr lang="es-ES"/>
-              </a:p>
-            </p:txBody>
-          </p:sp>
-          <p:sp>
-            <p:nvSpPr>
-              <p:cNvPr id="93" name="CuadroTexto 92"/>
-              <p:cNvSpPr txBox="1"/>
-              <p:nvPr/>
-            </p:nvSpPr>
-            <p:spPr>
-              <a:xfrm>
-                <a:off x="1856288" y="374198"/>
-                <a:ext cx="3039200" cy="338554"/>
-              </a:xfrm>
-              <a:prstGeom prst="rect">
-                <a:avLst/>
-              </a:prstGeom>
-              <a:noFill/>
-            </p:spPr>
-            <p:txBody>
-              <a:bodyPr wrap="square" rtlCol="0">
-                <a:spAutoFit/>
-              </a:bodyPr>
-              <a:lstStyle/>
-              <a:p>
                 <a:r>
-                  <a:rPr lang="es-ES" sz="1600" b="1" dirty="0" smtClean="0">
+                  <a:rPr lang="es-ES" sz="1200" dirty="0" smtClean="0">
                     <a:solidFill>
                       <a:schemeClr val="tx1">
-                        <a:lumMod val="50000"/>
-                        <a:lumOff val="50000"/>
+                        <a:lumMod val="65000"/>
+                        <a:lumOff val="35000"/>
                       </a:schemeClr>
                     </a:solidFill>
                     <a:latin typeface="Arial Rounded MT Bold" panose="020F0704030504030204" pitchFamily="34" charset="0"/>
-                    <a:cs typeface="Aharoni" panose="02010803020104030203" pitchFamily="2" charset="-79"/>
                   </a:rPr>
-                  <a:t>WATSON CONVERSATION</a:t>
+                  <a:t>#BYE</a:t>
                 </a:r>
-                <a:endParaRPr lang="es-ES" sz="1600" b="1" dirty="0">
+                <a:endParaRPr lang="es-ES" sz="1200" dirty="0">
                   <a:solidFill>
                     <a:schemeClr val="tx1">
-                      <a:lumMod val="50000"/>
-                      <a:lumOff val="50000"/>
+                      <a:lumMod val="65000"/>
+                      <a:lumOff val="35000"/>
                     </a:schemeClr>
                   </a:solidFill>
                   <a:latin typeface="Arial Rounded MT Bold" panose="020F0704030504030204" pitchFamily="34" charset="0"/>
-                  <a:cs typeface="Aharoni" panose="02010803020104030203" pitchFamily="2" charset="-79"/>
-                </a:endParaRPr>
-              </a:p>
-            </p:txBody>
-          </p:sp>
-          <p:sp>
-            <p:nvSpPr>
-              <p:cNvPr id="98" name="Rectángulo redondeado 97"/>
-              <p:cNvSpPr/>
-              <p:nvPr/>
-            </p:nvSpPr>
-            <p:spPr>
-              <a:xfrm>
-                <a:off x="1759059" y="330554"/>
-                <a:ext cx="10176267" cy="3342037"/>
-              </a:xfrm>
-              <a:prstGeom prst="roundRect">
-                <a:avLst>
-                  <a:gd name="adj" fmla="val 3452"/>
-                </a:avLst>
-              </a:prstGeom>
-              <a:noFill/>
-              <a:ln>
-                <a:solidFill>
-                  <a:schemeClr val="bg1">
-                    <a:lumMod val="75000"/>
-                  </a:schemeClr>
-                </a:solidFill>
-                <a:prstDash val="sysDash"/>
-              </a:ln>
-            </p:spPr>
-            <p:style>
-              <a:lnRef idx="2">
-                <a:schemeClr val="accent1">
-                  <a:shade val="50000"/>
-                </a:schemeClr>
-              </a:lnRef>
-              <a:fillRef idx="1">
-                <a:schemeClr val="accent1"/>
-              </a:fillRef>
-              <a:effectRef idx="0">
-                <a:schemeClr val="accent1"/>
-              </a:effectRef>
-              <a:fontRef idx="minor">
-                <a:schemeClr val="lt1"/>
-              </a:fontRef>
-            </p:style>
-            <p:txBody>
-              <a:bodyPr rtlCol="0" anchor="ctr"/>
-              <a:lstStyle/>
-              <a:p>
-                <a:pPr algn="ctr"/>
-                <a:endParaRPr lang="es-ES"/>
-              </a:p>
-            </p:txBody>
-          </p:sp>
-          <p:sp>
-            <p:nvSpPr>
-              <p:cNvPr id="99" name="CuadroTexto 98"/>
-              <p:cNvSpPr txBox="1"/>
-              <p:nvPr/>
-            </p:nvSpPr>
-            <p:spPr>
-              <a:xfrm>
-                <a:off x="1912315" y="5337799"/>
-                <a:ext cx="2983174" cy="338554"/>
-              </a:xfrm>
-              <a:prstGeom prst="rect">
-                <a:avLst/>
-              </a:prstGeom>
-              <a:noFill/>
-            </p:spPr>
-            <p:txBody>
-              <a:bodyPr wrap="square" rtlCol="0">
-                <a:spAutoFit/>
-              </a:bodyPr>
-              <a:lstStyle/>
-              <a:p>
-                <a:r>
-                  <a:rPr lang="es-ES" sz="1600" b="1" dirty="0" smtClean="0">
-                    <a:solidFill>
-                      <a:schemeClr val="tx1">
-                        <a:lumMod val="50000"/>
-                        <a:lumOff val="50000"/>
-                      </a:schemeClr>
-                    </a:solidFill>
-                    <a:latin typeface="Arial Rounded MT Bold" panose="020F0704030504030204" pitchFamily="34" charset="0"/>
-                    <a:cs typeface="Aharoni" panose="02010803020104030203" pitchFamily="2" charset="-79"/>
-                  </a:rPr>
-                  <a:t>ORCHESTRATION ENGINE</a:t>
-                </a:r>
-                <a:endParaRPr lang="es-ES" sz="1600" b="1" dirty="0">
-                  <a:solidFill>
-                    <a:schemeClr val="tx1">
-                      <a:lumMod val="50000"/>
-                      <a:lumOff val="50000"/>
-                    </a:schemeClr>
-                  </a:solidFill>
-                  <a:latin typeface="Arial Rounded MT Bold" panose="020F0704030504030204" pitchFamily="34" charset="0"/>
-                  <a:cs typeface="Aharoni" panose="02010803020104030203" pitchFamily="2" charset="-79"/>
                 </a:endParaRPr>
               </a:p>
             </p:txBody>
           </p:sp>
         </p:grpSp>
-        <p:cxnSp>
-          <p:nvCxnSpPr>
-            <p:cNvPr id="34" name="Conector recto de flecha 33"/>
-            <p:cNvCxnSpPr/>
+        <p:sp>
+          <p:nvSpPr>
+            <p:cNvPr id="42" name="CuadroTexto 41"/>
+            <p:cNvSpPr txBox="1"/>
             <p:nvPr/>
-          </p:nvCxnSpPr>
+          </p:nvSpPr>
           <p:spPr>
-            <a:xfrm flipH="1" flipV="1">
-              <a:off x="10331234" y="601677"/>
-              <a:ext cx="2" cy="1156745"/>
+            <a:xfrm>
+              <a:off x="3872458" y="2572565"/>
+              <a:ext cx="1691360" cy="338554"/>
             </a:xfrm>
-            <a:prstGeom prst="straightConnector1">
+            <a:prstGeom prst="rect">
               <a:avLst/>
             </a:prstGeom>
-            <a:ln w="28575">
-              <a:solidFill>
-                <a:srgbClr val="7240F0"/>
-              </a:solidFill>
-              <a:tailEnd type="triangle" w="lg" len="lg"/>
-            </a:ln>
+            <a:noFill/>
           </p:spPr>
-          <p:style>
-            <a:lnRef idx="1">
-              <a:schemeClr val="accent1"/>
-            </a:lnRef>
-            <a:fillRef idx="0">
-              <a:schemeClr val="accent1"/>
-            </a:fillRef>
-            <a:effectRef idx="0">
-              <a:schemeClr val="accent1"/>
-            </a:effectRef>
-            <a:fontRef idx="minor">
-              <a:schemeClr val="tx1"/>
-            </a:fontRef>
-          </p:style>
-        </p:cxnSp>
-        <p:cxnSp>
-          <p:nvCxnSpPr>
-            <p:cNvPr id="40" name="Conector recto de flecha 39"/>
-            <p:cNvCxnSpPr/>
-            <p:nvPr/>
-          </p:nvCxnSpPr>
-          <p:spPr>
-            <a:xfrm flipH="1">
-              <a:off x="6814637" y="641859"/>
-              <a:ext cx="3532643" cy="12187"/>
-            </a:xfrm>
-            <a:prstGeom prst="straightConnector1">
-              <a:avLst/>
-            </a:prstGeom>
-            <a:ln w="28575">
-              <a:solidFill>
-                <a:srgbClr val="7240F0"/>
-              </a:solidFill>
-              <a:tailEnd type="triangle" w="lg" len="lg"/>
-            </a:ln>
-          </p:spPr>
-          <p:style>
-            <a:lnRef idx="1">
-              <a:schemeClr val="accent1"/>
-            </a:lnRef>
-            <a:fillRef idx="0">
-              <a:schemeClr val="accent1"/>
-            </a:fillRef>
-            <a:effectRef idx="0">
-              <a:schemeClr val="accent1"/>
-            </a:effectRef>
-            <a:fontRef idx="minor">
-              <a:schemeClr val="tx1"/>
-            </a:fontRef>
-          </p:style>
-        </p:cxnSp>
-        <p:cxnSp>
-          <p:nvCxnSpPr>
-            <p:cNvPr id="41" name="Conector recto de flecha 40"/>
-            <p:cNvCxnSpPr>
-              <a:endCxn id="24" idx="0"/>
-            </p:cNvCxnSpPr>
-            <p:nvPr/>
-          </p:nvCxnSpPr>
-          <p:spPr>
-            <a:xfrm flipH="1">
-              <a:off x="6823653" y="641858"/>
-              <a:ext cx="7029" cy="1129506"/>
-            </a:xfrm>
-            <a:prstGeom prst="straightConnector1">
-              <a:avLst/>
-            </a:prstGeom>
-            <a:ln w="28575">
-              <a:solidFill>
-                <a:srgbClr val="7240F0"/>
-              </a:solidFill>
-              <a:tailEnd type="triangle" w="lg" len="lg"/>
-            </a:ln>
-          </p:spPr>
-          <p:style>
-            <a:lnRef idx="1">
-              <a:schemeClr val="accent1"/>
-            </a:lnRef>
-            <a:fillRef idx="0">
-              <a:schemeClr val="accent1"/>
-            </a:fillRef>
-            <a:effectRef idx="0">
-              <a:schemeClr val="accent1"/>
-            </a:effectRef>
-            <a:fontRef idx="minor">
-              <a:schemeClr val="tx1"/>
-            </a:fontRef>
-          </p:style>
-        </p:cxnSp>
+          <p:txBody>
+            <a:bodyPr wrap="none" rtlCol="0">
+              <a:spAutoFit/>
+            </a:bodyPr>
+            <a:lstStyle/>
+            <a:p>
+              <a:r>
+                <a:rPr lang="es-ES" sz="1600" dirty="0" smtClean="0">
+                  <a:solidFill>
+                    <a:schemeClr val="tx1">
+                      <a:lumMod val="50000"/>
+                      <a:lumOff val="50000"/>
+                    </a:schemeClr>
+                  </a:solidFill>
+                  <a:latin typeface="+mj-lt"/>
+                  <a:cs typeface="Aharoni" panose="02010803020104030203" pitchFamily="2" charset="-79"/>
+                </a:rPr>
+                <a:t>$</a:t>
+              </a:r>
+              <a:r>
+                <a:rPr lang="es-ES" sz="1600" dirty="0" err="1" smtClean="0">
+                  <a:solidFill>
+                    <a:schemeClr val="tx1">
+                      <a:lumMod val="50000"/>
+                      <a:lumOff val="50000"/>
+                    </a:schemeClr>
+                  </a:solidFill>
+                  <a:latin typeface="+mj-lt"/>
+                  <a:cs typeface="Aharoni" panose="02010803020104030203" pitchFamily="2" charset="-79"/>
+                </a:rPr>
+                <a:t>insult_counter</a:t>
+              </a:r>
+              <a:r>
+                <a:rPr lang="es-ES" sz="1600" dirty="0" smtClean="0">
+                  <a:solidFill>
+                    <a:schemeClr val="tx1">
+                      <a:lumMod val="50000"/>
+                      <a:lumOff val="50000"/>
+                    </a:schemeClr>
+                  </a:solidFill>
+                  <a:latin typeface="+mj-lt"/>
+                  <a:cs typeface="Aharoni" panose="02010803020104030203" pitchFamily="2" charset="-79"/>
+                </a:rPr>
+                <a:t>++</a:t>
+              </a:r>
+              <a:endParaRPr lang="es-ES" sz="1600" dirty="0">
+                <a:solidFill>
+                  <a:schemeClr val="tx1">
+                    <a:lumMod val="50000"/>
+                    <a:lumOff val="50000"/>
+                  </a:schemeClr>
+                </a:solidFill>
+                <a:latin typeface="+mj-lt"/>
+                <a:cs typeface="Aharoni" panose="02010803020104030203" pitchFamily="2" charset="-79"/>
+              </a:endParaRPr>
+            </a:p>
+          </p:txBody>
+        </p:sp>
         <p:sp>
           <p:nvSpPr>
-            <p:cNvPr id="44" name="Decisión 43"/>
+            <p:cNvPr id="43" name="Elipse 42"/>
             <p:cNvSpPr/>
             <p:nvPr/>
           </p:nvSpPr>
           <p:spPr>
             <a:xfrm>
-              <a:off x="9372896" y="1718716"/>
-              <a:ext cx="1896485" cy="1486745"/>
+              <a:off x="5679812" y="1873235"/>
+              <a:ext cx="1260000" cy="1008823"/>
             </a:xfrm>
-            <a:prstGeom prst="flowChartDecision">
+            <a:prstGeom prst="ellipse">
               <a:avLst/>
             </a:prstGeom>
             <a:noFill/>
-            <a:ln w="38100">
+            <a:ln w="76200">
               <a:solidFill>
                 <a:srgbClr val="46DACC"/>
               </a:solidFill>
-              <a:prstDash val="sysDot"/>
             </a:ln>
           </p:spPr>
           <p:style>
@@ -34094,34 +35906,19 @@
                 <a:rPr lang="es-ES" sz="1200" dirty="0" smtClean="0">
                   <a:solidFill>
                     <a:schemeClr val="tx1">
-                      <a:lumMod val="65000"/>
-                      <a:lumOff val="35000"/>
+                      <a:lumMod val="75000"/>
+                      <a:lumOff val="25000"/>
                     </a:schemeClr>
                   </a:solidFill>
                   <a:latin typeface="Arial Rounded MT Bold" panose="020F0704030504030204" pitchFamily="34" charset="0"/>
                 </a:rPr>
-                <a:t>FIRST </a:t>
-              </a:r>
-            </a:p>
-            <a:p>
-              <a:pPr algn="ctr"/>
-              <a:r>
-                <a:rPr lang="es-ES" sz="1200" dirty="0" smtClean="0">
-                  <a:solidFill>
-                    <a:schemeClr val="tx1">
-                      <a:lumMod val="65000"/>
-                      <a:lumOff val="35000"/>
-                    </a:schemeClr>
-                  </a:solidFill>
-                  <a:latin typeface="Arial Rounded MT Bold" panose="020F0704030504030204" pitchFamily="34" charset="0"/>
-                </a:rPr>
-                <a:t>TIME</a:t>
+                <a:t>RESPONSE</a:t>
               </a:r>
               <a:endParaRPr lang="es-ES" sz="1200" dirty="0">
                 <a:solidFill>
                   <a:schemeClr val="tx1">
-                    <a:lumMod val="65000"/>
-                    <a:lumOff val="35000"/>
+                    <a:lumMod val="75000"/>
+                    <a:lumOff val="25000"/>
                   </a:schemeClr>
                 </a:solidFill>
                 <a:latin typeface="Arial Rounded MT Bold" panose="020F0704030504030204" pitchFamily="34" charset="0"/>
@@ -34129,170 +35926,28 @@
             </a:p>
           </p:txBody>
         </p:sp>
-        <p:sp>
-          <p:nvSpPr>
-            <p:cNvPr id="56" name="CuadroTexto 55"/>
-            <p:cNvSpPr txBox="1"/>
-            <p:nvPr/>
-          </p:nvSpPr>
-          <p:spPr>
-            <a:xfrm>
-              <a:off x="6830682" y="1019162"/>
-              <a:ext cx="1524585" cy="369332"/>
-            </a:xfrm>
-            <a:prstGeom prst="rect">
-              <a:avLst/>
-            </a:prstGeom>
-            <a:noFill/>
-          </p:spPr>
-          <p:txBody>
-            <a:bodyPr wrap="none" rtlCol="0">
-              <a:spAutoFit/>
-            </a:bodyPr>
-            <a:lstStyle/>
-            <a:p>
-              <a:r>
-                <a:rPr lang="es-ES" b="1" dirty="0" smtClean="0">
-                  <a:solidFill>
-                    <a:srgbClr val="FF3300"/>
-                  </a:solidFill>
-                  <a:latin typeface="+mj-lt"/>
-                  <a:cs typeface="Aharoni" panose="02010803020104030203" pitchFamily="2" charset="-79"/>
-                </a:rPr>
-                <a:t>No </a:t>
-              </a:r>
-              <a:r>
-                <a:rPr lang="es-ES" b="1" dirty="0" smtClean="0">
-                  <a:solidFill>
-                    <a:srgbClr val="FF3300"/>
-                  </a:solidFill>
-                  <a:latin typeface="+mj-lt"/>
-                  <a:cs typeface="Aharoni" panose="02010803020104030203" pitchFamily="2" charset="-79"/>
-                </a:rPr>
-                <a:t>/ </a:t>
-              </a:r>
-              <a:r>
-                <a:rPr lang="es-ES" b="1" dirty="0" err="1" smtClean="0">
-                  <a:solidFill>
-                    <a:srgbClr val="FF3300"/>
-                  </a:solidFill>
-                  <a:latin typeface="+mj-lt"/>
-                  <a:cs typeface="Aharoni" panose="02010803020104030203" pitchFamily="2" charset="-79"/>
-                </a:rPr>
-                <a:t>Uncertain</a:t>
-              </a:r>
-              <a:endParaRPr lang="es-ES" b="1" dirty="0">
-                <a:solidFill>
-                  <a:srgbClr val="FF3300"/>
-                </a:solidFill>
-                <a:latin typeface="+mj-lt"/>
-                <a:cs typeface="Aharoni" panose="02010803020104030203" pitchFamily="2" charset="-79"/>
-              </a:endParaRPr>
-            </a:p>
-          </p:txBody>
-        </p:sp>
-        <p:sp>
-          <p:nvSpPr>
-            <p:cNvPr id="86" name="CuadroTexto 85"/>
-            <p:cNvSpPr txBox="1"/>
-            <p:nvPr/>
-          </p:nvSpPr>
-          <p:spPr>
-            <a:xfrm>
-              <a:off x="10347279" y="1013465"/>
-              <a:ext cx="475643" cy="369332"/>
-            </a:xfrm>
-            <a:prstGeom prst="rect">
-              <a:avLst/>
-            </a:prstGeom>
-            <a:noFill/>
-          </p:spPr>
-          <p:txBody>
-            <a:bodyPr wrap="none" rtlCol="0">
-              <a:spAutoFit/>
-            </a:bodyPr>
-            <a:lstStyle/>
-            <a:p>
-              <a:r>
-                <a:rPr lang="es-ES" b="1" dirty="0" smtClean="0">
-                  <a:solidFill>
-                    <a:srgbClr val="FF3300"/>
-                  </a:solidFill>
-                  <a:latin typeface="+mj-lt"/>
-                  <a:cs typeface="Aharoni" panose="02010803020104030203" pitchFamily="2" charset="-79"/>
-                </a:rPr>
-                <a:t>Yes</a:t>
-              </a:r>
-              <a:endParaRPr lang="es-ES" b="1" dirty="0">
-                <a:solidFill>
-                  <a:srgbClr val="FF3300"/>
-                </a:solidFill>
-                <a:latin typeface="+mj-lt"/>
-                <a:cs typeface="Aharoni" panose="02010803020104030203" pitchFamily="2" charset="-79"/>
-              </a:endParaRPr>
-            </a:p>
-          </p:txBody>
-        </p:sp>
-        <p:sp>
-          <p:nvSpPr>
-            <p:cNvPr id="87" name="CuadroTexto 86"/>
-            <p:cNvSpPr txBox="1"/>
-            <p:nvPr/>
-          </p:nvSpPr>
-          <p:spPr>
-            <a:xfrm>
-              <a:off x="11252755" y="2117759"/>
-              <a:ext cx="501419" cy="369332"/>
-            </a:xfrm>
-            <a:prstGeom prst="rect">
-              <a:avLst/>
-            </a:prstGeom>
-            <a:noFill/>
-          </p:spPr>
-          <p:txBody>
-            <a:bodyPr wrap="square" rtlCol="0">
-              <a:spAutoFit/>
-            </a:bodyPr>
-            <a:lstStyle/>
-            <a:p>
-              <a:r>
-                <a:rPr lang="es-ES" b="1" dirty="0" smtClean="0">
-                  <a:solidFill>
-                    <a:srgbClr val="FF3300"/>
-                  </a:solidFill>
-                  <a:latin typeface="+mj-lt"/>
-                  <a:cs typeface="Aharoni" panose="02010803020104030203" pitchFamily="2" charset="-79"/>
-                </a:rPr>
-                <a:t>No</a:t>
-              </a:r>
-              <a:endParaRPr lang="es-ES" b="1" dirty="0">
-                <a:solidFill>
-                  <a:srgbClr val="FF3300"/>
-                </a:solidFill>
-                <a:latin typeface="+mj-lt"/>
-                <a:cs typeface="Aharoni" panose="02010803020104030203" pitchFamily="2" charset="-79"/>
-              </a:endParaRPr>
-            </a:p>
-          </p:txBody>
-        </p:sp>
         <p:cxnSp>
           <p:nvCxnSpPr>
-            <p:cNvPr id="91" name="Conector recto de flecha 90"/>
-            <p:cNvCxnSpPr/>
+            <p:cNvPr id="45" name="Conector recto de flecha 44"/>
+            <p:cNvCxnSpPr>
+              <a:stCxn id="43" idx="6"/>
+              <a:endCxn id="24" idx="1"/>
+            </p:cNvCxnSpPr>
             <p:nvPr/>
           </p:nvCxnSpPr>
           <p:spPr>
             <a:xfrm flipV="1">
-              <a:off x="12540488" y="2474522"/>
-              <a:ext cx="0" cy="2372737"/>
+              <a:off x="6939812" y="2358263"/>
+              <a:ext cx="1245224" cy="19384"/>
             </a:xfrm>
             <a:prstGeom prst="straightConnector1">
               <a:avLst/>
             </a:prstGeom>
-            <a:ln w="28575">
+            <a:ln w="28575" cmpd="sng">
               <a:solidFill>
                 <a:srgbClr val="7240F0"/>
               </a:solidFill>
+              <a:prstDash val="solid"/>
               <a:tailEnd type="triangle" w="lg" len="lg"/>
             </a:ln>
           </p:spPr>
@@ -34313,14 +35968,14 @@
         </p:cxnSp>
         <p:sp>
           <p:nvSpPr>
-            <p:cNvPr id="100" name="CuadroTexto 99"/>
+            <p:cNvPr id="70" name="CuadroTexto 69"/>
             <p:cNvSpPr txBox="1"/>
             <p:nvPr/>
           </p:nvSpPr>
           <p:spPr>
             <a:xfrm>
-              <a:off x="10303700" y="1402954"/>
-              <a:ext cx="1137299" cy="338554"/>
+              <a:off x="10407259" y="2470713"/>
+              <a:ext cx="1691938" cy="338554"/>
             </a:xfrm>
             <a:prstGeom prst="rect">
               <a:avLst/>
@@ -34357,7 +36012,7 @@
                   <a:latin typeface="+mj-lt"/>
                   <a:cs typeface="Aharoni" panose="02010803020104030203" pitchFamily="2" charset="-79"/>
                 </a:rPr>
-                <a:t>counter</a:t>
+                <a:t>insult_counter</a:t>
               </a:r>
               <a:r>
                 <a:rPr lang="es-ES" sz="1600" dirty="0" smtClean="0">
@@ -34370,7 +36025,7 @@
                   <a:latin typeface="+mj-lt"/>
                   <a:cs typeface="Aharoni" panose="02010803020104030203" pitchFamily="2" charset="-79"/>
                 </a:rPr>
-                <a:t>=1</a:t>
+                <a:t>=0</a:t>
               </a:r>
               <a:endParaRPr lang="es-ES" sz="1600" dirty="0">
                 <a:solidFill>
@@ -34385,11 +36040,629 @@
             </a:p>
           </p:txBody>
         </p:sp>
+        <p:sp>
+          <p:nvSpPr>
+            <p:cNvPr id="73" name="CuadroTexto 72"/>
+            <p:cNvSpPr txBox="1"/>
+            <p:nvPr/>
+          </p:nvSpPr>
+          <p:spPr>
+            <a:xfrm>
+              <a:off x="10380874" y="1938931"/>
+              <a:ext cx="475643" cy="369332"/>
+            </a:xfrm>
+            <a:prstGeom prst="rect">
+              <a:avLst/>
+            </a:prstGeom>
+            <a:noFill/>
+          </p:spPr>
+          <p:txBody>
+            <a:bodyPr wrap="none" rtlCol="0">
+              <a:spAutoFit/>
+            </a:bodyPr>
+            <a:lstStyle/>
+            <a:p>
+              <a:r>
+                <a:rPr lang="es-ES" b="1" dirty="0" smtClean="0">
+                  <a:solidFill>
+                    <a:srgbClr val="FF3300"/>
+                  </a:solidFill>
+                  <a:latin typeface="+mj-lt"/>
+                  <a:cs typeface="Aharoni" panose="02010803020104030203" pitchFamily="2" charset="-79"/>
+                </a:rPr>
+                <a:t>Yes</a:t>
+              </a:r>
+              <a:endParaRPr lang="es-ES" b="1" dirty="0">
+                <a:solidFill>
+                  <a:srgbClr val="FF3300"/>
+                </a:solidFill>
+                <a:latin typeface="+mj-lt"/>
+                <a:cs typeface="Aharoni" panose="02010803020104030203" pitchFamily="2" charset="-79"/>
+              </a:endParaRPr>
+            </a:p>
+          </p:txBody>
+        </p:sp>
       </p:grpSp>
     </p:spTree>
     <p:extLst>
       <p:ext uri="{BB962C8B-B14F-4D97-AF65-F5344CB8AC3E}">
-        <p14:creationId xmlns:p14="http://schemas.microsoft.com/office/powerpoint/2010/main" val="1409027070"/>
+        <p14:creationId xmlns:p14="http://schemas.microsoft.com/office/powerpoint/2010/main" val="2630367450"/>
+      </p:ext>
+    </p:extLst>
+  </p:cSld>
+  <p:clrMapOvr>
+    <a:masterClrMapping/>
+  </p:clrMapOvr>
+</p:sld>
+</file>
+
+<file path=ppt/slides/slide29.xml><?xml version="1.0" encoding="utf-8"?>
+<p:sld xmlns:a="http://schemas.openxmlformats.org/drawingml/2006/main" xmlns:r="http://schemas.openxmlformats.org/officeDocument/2006/relationships" xmlns:p="http://schemas.openxmlformats.org/presentationml/2006/main">
+  <p:cSld>
+    <p:spTree>
+      <p:nvGrpSpPr>
+        <p:cNvPr id="1" name=""/>
+        <p:cNvGrpSpPr/>
+        <p:nvPr/>
+      </p:nvGrpSpPr>
+      <p:grpSpPr>
+        <a:xfrm>
+          <a:off x="0" y="0"/>
+          <a:ext cx="0" cy="0"/>
+          <a:chOff x="0" y="0"/>
+          <a:chExt cx="0" cy="0"/>
+        </a:xfrm>
+      </p:grpSpPr>
+      <p:grpSp>
+        <p:nvGrpSpPr>
+          <p:cNvPr id="45" name="Grupo 44"/>
+          <p:cNvGrpSpPr/>
+          <p:nvPr/>
+        </p:nvGrpSpPr>
+        <p:grpSpPr>
+          <a:xfrm>
+            <a:off x="297563" y="546615"/>
+            <a:ext cx="11785605" cy="5641834"/>
+            <a:chOff x="297563" y="546615"/>
+            <a:chExt cx="11785605" cy="5641834"/>
+          </a:xfrm>
+        </p:grpSpPr>
+        <p:grpSp>
+          <p:nvGrpSpPr>
+            <p:cNvPr id="31" name="Grupo 30"/>
+            <p:cNvGrpSpPr/>
+            <p:nvPr/>
+          </p:nvGrpSpPr>
+          <p:grpSpPr>
+            <a:xfrm>
+              <a:off x="357789" y="563171"/>
+              <a:ext cx="11665152" cy="5608722"/>
+              <a:chOff x="554493" y="613610"/>
+              <a:chExt cx="11665152" cy="5608722"/>
+            </a:xfrm>
+          </p:grpSpPr>
+          <p:grpSp>
+            <p:nvGrpSpPr>
+              <p:cNvPr id="9" name="Grupo 8"/>
+              <p:cNvGrpSpPr/>
+              <p:nvPr/>
+            </p:nvGrpSpPr>
+            <p:grpSpPr>
+              <a:xfrm>
+                <a:off x="554493" y="725957"/>
+                <a:ext cx="11665152" cy="5494371"/>
+                <a:chOff x="554493" y="725957"/>
+                <a:chExt cx="11665152" cy="5494371"/>
+              </a:xfrm>
+            </p:grpSpPr>
+            <p:pic>
+              <p:nvPicPr>
+                <p:cNvPr id="3" name="Imagen 2"/>
+                <p:cNvPicPr>
+                  <a:picLocks noChangeAspect="1"/>
+                </p:cNvPicPr>
+                <p:nvPr/>
+              </p:nvPicPr>
+              <p:blipFill rotWithShape="1">
+                <a:blip r:embed="rId2">
+                  <a:extLst>
+                    <a:ext uri="{28A0092B-C50C-407E-A947-70E740481C1C}">
+                      <a14:useLocalDpi xmlns:a14="http://schemas.microsoft.com/office/drawing/2010/main" val="0"/>
+                    </a:ext>
+                  </a:extLst>
+                </a:blip>
+                <a:srcRect t="11930" b="13684"/>
+                <a:stretch/>
+              </p:blipFill>
+              <p:spPr>
+                <a:xfrm>
+                  <a:off x="554493" y="1104900"/>
+                  <a:ext cx="3855749" cy="5101390"/>
+                </a:xfrm>
+                <a:prstGeom prst="rect">
+                  <a:avLst/>
+                </a:prstGeom>
+              </p:spPr>
+            </p:pic>
+            <p:pic>
+              <p:nvPicPr>
+                <p:cNvPr id="4" name="Imagen 3"/>
+                <p:cNvPicPr>
+                  <a:picLocks noChangeAspect="1"/>
+                </p:cNvPicPr>
+                <p:nvPr/>
+              </p:nvPicPr>
+              <p:blipFill rotWithShape="1">
+                <a:blip r:embed="rId3">
+                  <a:extLst>
+                    <a:ext uri="{28A0092B-C50C-407E-A947-70E740481C1C}">
+                      <a14:useLocalDpi xmlns:a14="http://schemas.microsoft.com/office/drawing/2010/main" val="0"/>
+                    </a:ext>
+                  </a:extLst>
+                </a:blip>
+                <a:srcRect t="11930" b="13684"/>
+                <a:stretch/>
+              </p:blipFill>
+              <p:spPr>
+                <a:xfrm>
+                  <a:off x="8363896" y="1118938"/>
+                  <a:ext cx="3855749" cy="5101390"/>
+                </a:xfrm>
+                <a:prstGeom prst="rect">
+                  <a:avLst/>
+                </a:prstGeom>
+              </p:spPr>
+            </p:pic>
+            <p:pic>
+              <p:nvPicPr>
+                <p:cNvPr id="5" name="Imagen 4"/>
+                <p:cNvPicPr>
+                  <a:picLocks noChangeAspect="1"/>
+                </p:cNvPicPr>
+                <p:nvPr/>
+              </p:nvPicPr>
+              <p:blipFill rotWithShape="1">
+                <a:blip r:embed="rId4">
+                  <a:extLst>
+                    <a:ext uri="{28A0092B-C50C-407E-A947-70E740481C1C}">
+                      <a14:useLocalDpi xmlns:a14="http://schemas.microsoft.com/office/drawing/2010/main" val="0"/>
+                    </a:ext>
+                  </a:extLst>
+                </a:blip>
+                <a:srcRect t="12105" b="13684"/>
+                <a:stretch/>
+              </p:blipFill>
+              <p:spPr>
+                <a:xfrm>
+                  <a:off x="4508147" y="1118938"/>
+                  <a:ext cx="3855749" cy="5089357"/>
+                </a:xfrm>
+                <a:prstGeom prst="rect">
+                  <a:avLst/>
+                </a:prstGeom>
+              </p:spPr>
+            </p:pic>
+            <p:sp>
+              <p:nvSpPr>
+                <p:cNvPr id="6" name="CuadroTexto 5"/>
+                <p:cNvSpPr txBox="1"/>
+                <p:nvPr/>
+              </p:nvSpPr>
+              <p:spPr>
+                <a:xfrm>
+                  <a:off x="1954017" y="752232"/>
+                  <a:ext cx="1056700" cy="369332"/>
+                </a:xfrm>
+                <a:prstGeom prst="rect">
+                  <a:avLst/>
+                </a:prstGeom>
+                <a:noFill/>
+              </p:spPr>
+              <p:txBody>
+                <a:bodyPr wrap="none" rtlCol="0">
+                  <a:spAutoFit/>
+                </a:bodyPr>
+                <a:lstStyle/>
+                <a:p>
+                  <a:r>
+                    <a:rPr lang="es-ES" b="1" dirty="0" smtClean="0">
+                      <a:solidFill>
+                        <a:srgbClr val="FFC000"/>
+                      </a:solidFill>
+                    </a:rPr>
+                    <a:t>POSITIVE</a:t>
+                  </a:r>
+                  <a:endParaRPr lang="es-ES" b="1" dirty="0">
+                    <a:solidFill>
+                      <a:srgbClr val="FFC000"/>
+                    </a:solidFill>
+                  </a:endParaRPr>
+                </a:p>
+              </p:txBody>
+            </p:sp>
+            <p:sp>
+              <p:nvSpPr>
+                <p:cNvPr id="7" name="CuadroTexto 6"/>
+                <p:cNvSpPr txBox="1"/>
+                <p:nvPr/>
+              </p:nvSpPr>
+              <p:spPr>
+                <a:xfrm>
+                  <a:off x="5208057" y="749606"/>
+                  <a:ext cx="2455929" cy="369332"/>
+                </a:xfrm>
+                <a:prstGeom prst="rect">
+                  <a:avLst/>
+                </a:prstGeom>
+                <a:noFill/>
+              </p:spPr>
+              <p:txBody>
+                <a:bodyPr wrap="none" rtlCol="0">
+                  <a:spAutoFit/>
+                </a:bodyPr>
+                <a:lstStyle/>
+                <a:p>
+                  <a:r>
+                    <a:rPr lang="es-ES" b="1" dirty="0" smtClean="0">
+                      <a:solidFill>
+                        <a:srgbClr val="FFC000"/>
+                      </a:solidFill>
+                    </a:rPr>
+                    <a:t>UNKNOWN + NEGATIVE</a:t>
+                  </a:r>
+                  <a:endParaRPr lang="es-ES" b="1" dirty="0">
+                    <a:solidFill>
+                      <a:srgbClr val="FFC000"/>
+                    </a:solidFill>
+                  </a:endParaRPr>
+                </a:p>
+              </p:txBody>
+            </p:sp>
+            <p:sp>
+              <p:nvSpPr>
+                <p:cNvPr id="8" name="CuadroTexto 7"/>
+                <p:cNvSpPr txBox="1"/>
+                <p:nvPr/>
+              </p:nvSpPr>
+              <p:spPr>
+                <a:xfrm>
+                  <a:off x="9642970" y="725957"/>
+                  <a:ext cx="1297599" cy="369332"/>
+                </a:xfrm>
+                <a:prstGeom prst="rect">
+                  <a:avLst/>
+                </a:prstGeom>
+                <a:noFill/>
+              </p:spPr>
+              <p:txBody>
+                <a:bodyPr wrap="none" rtlCol="0">
+                  <a:spAutoFit/>
+                </a:bodyPr>
+                <a:lstStyle/>
+                <a:p>
+                  <a:r>
+                    <a:rPr lang="es-ES" b="1" dirty="0" smtClean="0">
+                      <a:solidFill>
+                        <a:srgbClr val="FFC000"/>
+                      </a:solidFill>
+                    </a:rPr>
+                    <a:t>UNCERTAIN</a:t>
+                  </a:r>
+                  <a:endParaRPr lang="es-ES" b="1" dirty="0">
+                    <a:solidFill>
+                      <a:srgbClr val="FFC000"/>
+                    </a:solidFill>
+                  </a:endParaRPr>
+                </a:p>
+              </p:txBody>
+            </p:sp>
+          </p:grpSp>
+          <p:cxnSp>
+            <p:nvCxnSpPr>
+              <p:cNvPr id="11" name="Conector recto 10"/>
+              <p:cNvCxnSpPr/>
+              <p:nvPr/>
+            </p:nvCxnSpPr>
+            <p:spPr>
+              <a:xfrm flipH="1">
+                <a:off x="4348867" y="627647"/>
+                <a:ext cx="32635" cy="5594685"/>
+              </a:xfrm>
+              <a:prstGeom prst="line">
+                <a:avLst/>
+              </a:prstGeom>
+              <a:ln w="38100">
+                <a:solidFill>
+                  <a:srgbClr val="FFC000"/>
+                </a:solidFill>
+              </a:ln>
+            </p:spPr>
+            <p:style>
+              <a:lnRef idx="1">
+                <a:schemeClr val="accent1"/>
+              </a:lnRef>
+              <a:fillRef idx="0">
+                <a:schemeClr val="accent1"/>
+              </a:fillRef>
+              <a:effectRef idx="0">
+                <a:schemeClr val="accent1"/>
+              </a:effectRef>
+              <a:fontRef idx="minor">
+                <a:schemeClr val="tx1"/>
+              </a:fontRef>
+            </p:style>
+          </p:cxnSp>
+          <p:cxnSp>
+            <p:nvCxnSpPr>
+              <p:cNvPr id="12" name="Conector recto 11"/>
+              <p:cNvCxnSpPr/>
+              <p:nvPr/>
+            </p:nvCxnSpPr>
+            <p:spPr>
+              <a:xfrm flipH="1">
+                <a:off x="8314214" y="613610"/>
+                <a:ext cx="2459" cy="5590675"/>
+              </a:xfrm>
+              <a:prstGeom prst="line">
+                <a:avLst/>
+              </a:prstGeom>
+              <a:ln w="38100">
+                <a:solidFill>
+                  <a:srgbClr val="FFC000"/>
+                </a:solidFill>
+              </a:ln>
+            </p:spPr>
+            <p:style>
+              <a:lnRef idx="1">
+                <a:schemeClr val="accent1"/>
+              </a:lnRef>
+              <a:fillRef idx="0">
+                <a:schemeClr val="accent1"/>
+              </a:fillRef>
+              <a:effectRef idx="0">
+                <a:schemeClr val="accent1"/>
+              </a:effectRef>
+              <a:fontRef idx="minor">
+                <a:schemeClr val="tx1"/>
+              </a:fontRef>
+            </p:style>
+          </p:cxnSp>
+        </p:grpSp>
+        <p:sp>
+          <p:nvSpPr>
+            <p:cNvPr id="40" name="Rectángulo 39"/>
+            <p:cNvSpPr/>
+            <p:nvPr/>
+          </p:nvSpPr>
+          <p:spPr>
+            <a:xfrm>
+              <a:off x="297563" y="546615"/>
+              <a:ext cx="11785605" cy="5641834"/>
+            </a:xfrm>
+            <a:prstGeom prst="rect">
+              <a:avLst/>
+            </a:prstGeom>
+            <a:noFill/>
+            <a:ln w="38100">
+              <a:solidFill>
+                <a:srgbClr val="FFC000"/>
+              </a:solidFill>
+            </a:ln>
+          </p:spPr>
+          <p:style>
+            <a:lnRef idx="2">
+              <a:schemeClr val="accent1">
+                <a:shade val="50000"/>
+              </a:schemeClr>
+            </a:lnRef>
+            <a:fillRef idx="1">
+              <a:schemeClr val="accent1"/>
+            </a:fillRef>
+            <a:effectRef idx="0">
+              <a:schemeClr val="accent1"/>
+            </a:effectRef>
+            <a:fontRef idx="minor">
+              <a:schemeClr val="lt1"/>
+            </a:fontRef>
+          </p:style>
+          <p:txBody>
+            <a:bodyPr rtlCol="0" anchor="ctr"/>
+            <a:lstStyle/>
+            <a:p>
+              <a:pPr algn="ctr"/>
+              <a:endParaRPr lang="es-ES"/>
+            </a:p>
+          </p:txBody>
+        </p:sp>
+        <p:sp>
+          <p:nvSpPr>
+            <p:cNvPr id="41" name="Rectángulo 40"/>
+            <p:cNvSpPr/>
+            <p:nvPr/>
+          </p:nvSpPr>
+          <p:spPr>
+            <a:xfrm>
+              <a:off x="1066520" y="2784143"/>
+              <a:ext cx="2017874" cy="279246"/>
+            </a:xfrm>
+            <a:prstGeom prst="rect">
+              <a:avLst/>
+            </a:prstGeom>
+            <a:noFill/>
+            <a:ln w="19050">
+              <a:solidFill>
+                <a:srgbClr val="FFC000"/>
+              </a:solidFill>
+            </a:ln>
+          </p:spPr>
+          <p:style>
+            <a:lnRef idx="2">
+              <a:schemeClr val="accent1">
+                <a:shade val="50000"/>
+              </a:schemeClr>
+            </a:lnRef>
+            <a:fillRef idx="1">
+              <a:schemeClr val="accent1"/>
+            </a:fillRef>
+            <a:effectRef idx="0">
+              <a:schemeClr val="accent1"/>
+            </a:effectRef>
+            <a:fontRef idx="minor">
+              <a:schemeClr val="lt1"/>
+            </a:fontRef>
+          </p:style>
+          <p:txBody>
+            <a:bodyPr rtlCol="0" anchor="ctr"/>
+            <a:lstStyle/>
+            <a:p>
+              <a:pPr algn="ctr"/>
+              <a:endParaRPr lang="es-ES"/>
+            </a:p>
+          </p:txBody>
+        </p:sp>
+        <p:sp>
+          <p:nvSpPr>
+            <p:cNvPr id="42" name="Rectángulo 41"/>
+            <p:cNvSpPr/>
+            <p:nvPr/>
+          </p:nvSpPr>
+          <p:spPr>
+            <a:xfrm>
+              <a:off x="5026924" y="3714465"/>
+              <a:ext cx="2017874" cy="279246"/>
+            </a:xfrm>
+            <a:prstGeom prst="rect">
+              <a:avLst/>
+            </a:prstGeom>
+            <a:noFill/>
+            <a:ln w="19050">
+              <a:solidFill>
+                <a:srgbClr val="FFC000"/>
+              </a:solidFill>
+            </a:ln>
+          </p:spPr>
+          <p:style>
+            <a:lnRef idx="2">
+              <a:schemeClr val="accent1">
+                <a:shade val="50000"/>
+              </a:schemeClr>
+            </a:lnRef>
+            <a:fillRef idx="1">
+              <a:schemeClr val="accent1"/>
+            </a:fillRef>
+            <a:effectRef idx="0">
+              <a:schemeClr val="accent1"/>
+            </a:effectRef>
+            <a:fontRef idx="minor">
+              <a:schemeClr val="lt1"/>
+            </a:fontRef>
+          </p:style>
+          <p:txBody>
+            <a:bodyPr rtlCol="0" anchor="ctr"/>
+            <a:lstStyle/>
+            <a:p>
+              <a:pPr algn="ctr"/>
+              <a:endParaRPr lang="es-ES"/>
+            </a:p>
+          </p:txBody>
+        </p:sp>
+        <p:sp>
+          <p:nvSpPr>
+            <p:cNvPr id="43" name="Rectángulo 42"/>
+            <p:cNvSpPr/>
+            <p:nvPr/>
+          </p:nvSpPr>
+          <p:spPr>
+            <a:xfrm>
+              <a:off x="5026924" y="5133833"/>
+              <a:ext cx="2017874" cy="279246"/>
+            </a:xfrm>
+            <a:prstGeom prst="rect">
+              <a:avLst/>
+            </a:prstGeom>
+            <a:noFill/>
+            <a:ln w="19050">
+              <a:solidFill>
+                <a:srgbClr val="FFC000"/>
+              </a:solidFill>
+            </a:ln>
+          </p:spPr>
+          <p:style>
+            <a:lnRef idx="2">
+              <a:schemeClr val="accent1">
+                <a:shade val="50000"/>
+              </a:schemeClr>
+            </a:lnRef>
+            <a:fillRef idx="1">
+              <a:schemeClr val="accent1"/>
+            </a:fillRef>
+            <a:effectRef idx="0">
+              <a:schemeClr val="accent1"/>
+            </a:effectRef>
+            <a:fontRef idx="minor">
+              <a:schemeClr val="lt1"/>
+            </a:fontRef>
+          </p:style>
+          <p:txBody>
+            <a:bodyPr rtlCol="0" anchor="ctr"/>
+            <a:lstStyle/>
+            <a:p>
+              <a:pPr algn="ctr"/>
+              <a:endParaRPr lang="es-ES"/>
+            </a:p>
+          </p:txBody>
+        </p:sp>
+        <p:sp>
+          <p:nvSpPr>
+            <p:cNvPr id="44" name="Rectángulo 43"/>
+            <p:cNvSpPr/>
+            <p:nvPr/>
+          </p:nvSpPr>
+          <p:spPr>
+            <a:xfrm>
+              <a:off x="8882673" y="5133833"/>
+              <a:ext cx="2263754" cy="279246"/>
+            </a:xfrm>
+            <a:prstGeom prst="rect">
+              <a:avLst/>
+            </a:prstGeom>
+            <a:noFill/>
+            <a:ln w="19050">
+              <a:solidFill>
+                <a:srgbClr val="FFC000"/>
+              </a:solidFill>
+            </a:ln>
+          </p:spPr>
+          <p:style>
+            <a:lnRef idx="2">
+              <a:schemeClr val="accent1">
+                <a:shade val="50000"/>
+              </a:schemeClr>
+            </a:lnRef>
+            <a:fillRef idx="1">
+              <a:schemeClr val="accent1"/>
+            </a:fillRef>
+            <a:effectRef idx="0">
+              <a:schemeClr val="accent1"/>
+            </a:effectRef>
+            <a:fontRef idx="minor">
+              <a:schemeClr val="lt1"/>
+            </a:fontRef>
+          </p:style>
+          <p:txBody>
+            <a:bodyPr rtlCol="0" anchor="ctr"/>
+            <a:lstStyle/>
+            <a:p>
+              <a:pPr algn="ctr"/>
+              <a:endParaRPr lang="es-ES"/>
+            </a:p>
+          </p:txBody>
+        </p:sp>
+      </p:grpSp>
+    </p:spTree>
+    <p:extLst>
+      <p:ext uri="{BB962C8B-B14F-4D97-AF65-F5344CB8AC3E}">
+        <p14:creationId xmlns:p14="http://schemas.microsoft.com/office/powerpoint/2010/main" val="2689650859"/>
       </p:ext>
     </p:extLst>
   </p:cSld>

</xml_diff>